<commit_message>
Change the logo file
</commit_message>
<xml_diff>
--- a/Frontend/Assets/Images/Logo/logo.pptx
+++ b/Frontend/Assets/Images/Logo/logo.pptx
@@ -6,6 +6,8 @@
   </p:sldMasterIdLst>
   <p:sldIdLst>
     <p:sldId id="256" r:id="rId2"/>
+    <p:sldId id="258" r:id="rId3"/>
+    <p:sldId id="257" r:id="rId4"/>
   </p:sldIdLst>
   <p:sldSz cx="12192000" cy="6858000"/>
   <p:notesSz cx="6858000" cy="9144000"/>
@@ -261,7 +263,7 @@
           <a:p>
             <a:fld id="{01388C3B-F653-40C1-A75A-A31762BB095D}" type="datetimeFigureOut">
               <a:rPr lang="en-IN" smtClean="0"/>
-              <a:t>24-01-2025</a:t>
+              <a:t>31-01-2025</a:t>
             </a:fld>
             <a:endParaRPr lang="en-IN"/>
           </a:p>
@@ -461,7 +463,7 @@
           <a:p>
             <a:fld id="{01388C3B-F653-40C1-A75A-A31762BB095D}" type="datetimeFigureOut">
               <a:rPr lang="en-IN" smtClean="0"/>
-              <a:t>24-01-2025</a:t>
+              <a:t>31-01-2025</a:t>
             </a:fld>
             <a:endParaRPr lang="en-IN"/>
           </a:p>
@@ -671,7 +673,7 @@
           <a:p>
             <a:fld id="{01388C3B-F653-40C1-A75A-A31762BB095D}" type="datetimeFigureOut">
               <a:rPr lang="en-IN" smtClean="0"/>
-              <a:t>24-01-2025</a:t>
+              <a:t>31-01-2025</a:t>
             </a:fld>
             <a:endParaRPr lang="en-IN"/>
           </a:p>
@@ -871,7 +873,7 @@
           <a:p>
             <a:fld id="{01388C3B-F653-40C1-A75A-A31762BB095D}" type="datetimeFigureOut">
               <a:rPr lang="en-IN" smtClean="0"/>
-              <a:t>24-01-2025</a:t>
+              <a:t>31-01-2025</a:t>
             </a:fld>
             <a:endParaRPr lang="en-IN"/>
           </a:p>
@@ -1147,7 +1149,7 @@
           <a:p>
             <a:fld id="{01388C3B-F653-40C1-A75A-A31762BB095D}" type="datetimeFigureOut">
               <a:rPr lang="en-IN" smtClean="0"/>
-              <a:t>24-01-2025</a:t>
+              <a:t>31-01-2025</a:t>
             </a:fld>
             <a:endParaRPr lang="en-IN"/>
           </a:p>
@@ -1415,7 +1417,7 @@
           <a:p>
             <a:fld id="{01388C3B-F653-40C1-A75A-A31762BB095D}" type="datetimeFigureOut">
               <a:rPr lang="en-IN" smtClean="0"/>
-              <a:t>24-01-2025</a:t>
+              <a:t>31-01-2025</a:t>
             </a:fld>
             <a:endParaRPr lang="en-IN"/>
           </a:p>
@@ -1830,7 +1832,7 @@
           <a:p>
             <a:fld id="{01388C3B-F653-40C1-A75A-A31762BB095D}" type="datetimeFigureOut">
               <a:rPr lang="en-IN" smtClean="0"/>
-              <a:t>24-01-2025</a:t>
+              <a:t>31-01-2025</a:t>
             </a:fld>
             <a:endParaRPr lang="en-IN"/>
           </a:p>
@@ -1972,7 +1974,7 @@
           <a:p>
             <a:fld id="{01388C3B-F653-40C1-A75A-A31762BB095D}" type="datetimeFigureOut">
               <a:rPr lang="en-IN" smtClean="0"/>
-              <a:t>24-01-2025</a:t>
+              <a:t>31-01-2025</a:t>
             </a:fld>
             <a:endParaRPr lang="en-IN"/>
           </a:p>
@@ -2085,7 +2087,7 @@
           <a:p>
             <a:fld id="{01388C3B-F653-40C1-A75A-A31762BB095D}" type="datetimeFigureOut">
               <a:rPr lang="en-IN" smtClean="0"/>
-              <a:t>24-01-2025</a:t>
+              <a:t>31-01-2025</a:t>
             </a:fld>
             <a:endParaRPr lang="en-IN"/>
           </a:p>
@@ -2398,7 +2400,7 @@
           <a:p>
             <a:fld id="{01388C3B-F653-40C1-A75A-A31762BB095D}" type="datetimeFigureOut">
               <a:rPr lang="en-IN" smtClean="0"/>
-              <a:t>24-01-2025</a:t>
+              <a:t>31-01-2025</a:t>
             </a:fld>
             <a:endParaRPr lang="en-IN"/>
           </a:p>
@@ -2687,7 +2689,7 @@
           <a:p>
             <a:fld id="{01388C3B-F653-40C1-A75A-A31762BB095D}" type="datetimeFigureOut">
               <a:rPr lang="en-IN" smtClean="0"/>
-              <a:t>24-01-2025</a:t>
+              <a:t>31-01-2025</a:t>
             </a:fld>
             <a:endParaRPr lang="en-IN"/>
           </a:p>
@@ -2930,7 +2932,7 @@
           <a:p>
             <a:fld id="{01388C3B-F653-40C1-A75A-A31762BB095D}" type="datetimeFigureOut">
               <a:rPr lang="en-IN" smtClean="0"/>
-              <a:t>24-01-2025</a:t>
+              <a:t>31-01-2025</a:t>
             </a:fld>
             <a:endParaRPr lang="en-IN"/>
           </a:p>
@@ -3347,77 +3349,696 @@
           <a:chExt cx="0" cy="0"/>
         </a:xfrm>
       </p:grpSpPr>
-      <p:sp>
-        <p:nvSpPr>
-          <p:cNvPr id="4" name="Oval 3">
-            <a:extLst>
-              <a:ext uri="{FF2B5EF4-FFF2-40B4-BE49-F238E27FC236}">
-                <a16:creationId xmlns:a16="http://schemas.microsoft.com/office/drawing/2014/main" id="{6E1D1A32-36CB-1123-2704-DF52D5C3FBBF}"/>
-              </a:ext>
-            </a:extLst>
-          </p:cNvPr>
-          <p:cNvSpPr/>
+      <p:grpSp>
+        <p:nvGrpSpPr>
+          <p:cNvPr id="42" name="Group 41">
+            <a:extLst>
+              <a:ext uri="{FF2B5EF4-FFF2-40B4-BE49-F238E27FC236}">
+                <a16:creationId xmlns:a16="http://schemas.microsoft.com/office/drawing/2014/main" id="{01EC0C9B-7B36-FC0D-8305-440E03EFF53A}"/>
+              </a:ext>
+            </a:extLst>
+          </p:cNvPr>
+          <p:cNvGrpSpPr/>
           <p:nvPr/>
-        </p:nvSpPr>
-        <p:spPr>
-          <a:xfrm rot="313311">
-            <a:off x="2505076" y="171729"/>
-            <a:ext cx="6505574" cy="6505574"/>
+        </p:nvGrpSpPr>
+        <p:grpSpPr>
+          <a:xfrm>
+            <a:off x="1484504" y="742599"/>
+            <a:ext cx="2033396" cy="2221220"/>
+            <a:chOff x="2614804" y="2050699"/>
+            <a:chExt cx="2033396" cy="2221220"/>
           </a:xfrm>
-          <a:prstGeom prst="ellipse">
-            <a:avLst/>
-          </a:prstGeom>
-          <a:noFill/>
-          <a:ln w="228600">
+        </p:grpSpPr>
+        <p:sp>
+          <p:nvSpPr>
+            <p:cNvPr id="4" name="Oval 3">
+              <a:extLst>
+                <a:ext uri="{FF2B5EF4-FFF2-40B4-BE49-F238E27FC236}">
+                  <a16:creationId xmlns:a16="http://schemas.microsoft.com/office/drawing/2014/main" id="{6E1D1A32-36CB-1123-2704-DF52D5C3FBBF}"/>
+                </a:ext>
+              </a:extLst>
+            </p:cNvPr>
+            <p:cNvSpPr/>
+            <p:nvPr/>
+          </p:nvSpPr>
+          <p:spPr>
+            <a:xfrm rot="313311">
+              <a:off x="2614804" y="2050699"/>
+              <a:ext cx="2033396" cy="2078431"/>
+            </a:xfrm>
+            <a:prstGeom prst="ellipse">
+              <a:avLst/>
+            </a:prstGeom>
+            <a:noFill/>
+            <a:ln w="228600">
+              <a:solidFill>
+                <a:schemeClr val="tx1"/>
+              </a:solidFill>
+            </a:ln>
+            <a:effectLst/>
+          </p:spPr>
+          <p:style>
+            <a:lnRef idx="2">
+              <a:schemeClr val="accent1">
+                <a:shade val="15000"/>
+              </a:schemeClr>
+            </a:lnRef>
+            <a:fillRef idx="1">
+              <a:schemeClr val="accent1"/>
+            </a:fillRef>
+            <a:effectRef idx="0">
+              <a:schemeClr val="accent1"/>
+            </a:effectRef>
+            <a:fontRef idx="minor">
+              <a:schemeClr val="lt1"/>
+            </a:fontRef>
+          </p:style>
+          <p:txBody>
+            <a:bodyPr rtlCol="0" anchor="ctr"/>
+            <a:lstStyle/>
+            <a:p>
+              <a:pPr algn="ctr"/>
+              <a:endParaRPr lang="en-IN" dirty="0">
+                <a:ln w="0"/>
+                <a:solidFill>
+                  <a:schemeClr val="tx1"/>
+                </a:solidFill>
+                <a:effectLst>
+                  <a:outerShdw blurRad="38100" dist="19050" dir="2700000" algn="tl" rotWithShape="0">
+                    <a:schemeClr val="dk1">
+                      <a:alpha val="40000"/>
+                    </a:schemeClr>
+                  </a:outerShdw>
+                </a:effectLst>
+              </a:endParaRPr>
+            </a:p>
+          </p:txBody>
+        </p:sp>
+        <p:sp>
+          <p:nvSpPr>
+            <p:cNvPr id="7" name="Rectangle 4">
+              <a:extLst>
+                <a:ext uri="{FF2B5EF4-FFF2-40B4-BE49-F238E27FC236}">
+                  <a16:creationId xmlns:a16="http://schemas.microsoft.com/office/drawing/2014/main" id="{E51A5B58-85C1-7270-059D-4C17EB8D2B6F}"/>
+                </a:ext>
+              </a:extLst>
+            </p:cNvPr>
+            <p:cNvSpPr/>
+            <p:nvPr/>
+          </p:nvSpPr>
+          <p:spPr>
+            <a:xfrm rot="19649320">
+              <a:off x="3177401" y="2339465"/>
+              <a:ext cx="245480" cy="1889266"/>
+            </a:xfrm>
+            <a:custGeom>
+              <a:avLst/>
+              <a:gdLst>
+                <a:gd name="connsiteX0" fmla="*/ 0 w 417282"/>
+                <a:gd name="connsiteY0" fmla="*/ 0 h 4119367"/>
+                <a:gd name="connsiteX1" fmla="*/ 417282 w 417282"/>
+                <a:gd name="connsiteY1" fmla="*/ 0 h 4119367"/>
+                <a:gd name="connsiteX2" fmla="*/ 417282 w 417282"/>
+                <a:gd name="connsiteY2" fmla="*/ 4119367 h 4119367"/>
+                <a:gd name="connsiteX3" fmla="*/ 0 w 417282"/>
+                <a:gd name="connsiteY3" fmla="*/ 4119367 h 4119367"/>
+                <a:gd name="connsiteX4" fmla="*/ 0 w 417282"/>
+                <a:gd name="connsiteY4" fmla="*/ 0 h 4119367"/>
+                <a:gd name="connsiteX0" fmla="*/ 0 w 419794"/>
+                <a:gd name="connsiteY0" fmla="*/ 335280 h 4119367"/>
+                <a:gd name="connsiteX1" fmla="*/ 419794 w 419794"/>
+                <a:gd name="connsiteY1" fmla="*/ 0 h 4119367"/>
+                <a:gd name="connsiteX2" fmla="*/ 419794 w 419794"/>
+                <a:gd name="connsiteY2" fmla="*/ 4119367 h 4119367"/>
+                <a:gd name="connsiteX3" fmla="*/ 2512 w 419794"/>
+                <a:gd name="connsiteY3" fmla="*/ 4119367 h 4119367"/>
+                <a:gd name="connsiteX4" fmla="*/ 0 w 419794"/>
+                <a:gd name="connsiteY4" fmla="*/ 335280 h 4119367"/>
+                <a:gd name="connsiteX0" fmla="*/ 0 w 422424"/>
+                <a:gd name="connsiteY0" fmla="*/ 335280 h 4281985"/>
+                <a:gd name="connsiteX1" fmla="*/ 419794 w 422424"/>
+                <a:gd name="connsiteY1" fmla="*/ 0 h 4281985"/>
+                <a:gd name="connsiteX2" fmla="*/ 422424 w 422424"/>
+                <a:gd name="connsiteY2" fmla="*/ 4281985 h 4281985"/>
+                <a:gd name="connsiteX3" fmla="*/ 2512 w 422424"/>
+                <a:gd name="connsiteY3" fmla="*/ 4119367 h 4281985"/>
+                <a:gd name="connsiteX4" fmla="*/ 0 w 422424"/>
+                <a:gd name="connsiteY4" fmla="*/ 335280 h 4281985"/>
+              </a:gdLst>
+              <a:ahLst/>
+              <a:cxnLst>
+                <a:cxn ang="0">
+                  <a:pos x="connsiteX0" y="connsiteY0"/>
+                </a:cxn>
+                <a:cxn ang="0">
+                  <a:pos x="connsiteX1" y="connsiteY1"/>
+                </a:cxn>
+                <a:cxn ang="0">
+                  <a:pos x="connsiteX2" y="connsiteY2"/>
+                </a:cxn>
+                <a:cxn ang="0">
+                  <a:pos x="connsiteX3" y="connsiteY3"/>
+                </a:cxn>
+                <a:cxn ang="0">
+                  <a:pos x="connsiteX4" y="connsiteY4"/>
+                </a:cxn>
+              </a:cxnLst>
+              <a:rect l="l" t="t" r="r" b="b"/>
+              <a:pathLst>
+                <a:path w="422424" h="4281985">
+                  <a:moveTo>
+                    <a:pt x="0" y="335280"/>
+                  </a:moveTo>
+                  <a:lnTo>
+                    <a:pt x="419794" y="0"/>
+                  </a:lnTo>
+                  <a:cubicBezTo>
+                    <a:pt x="420671" y="1427328"/>
+                    <a:pt x="421547" y="2854657"/>
+                    <a:pt x="422424" y="4281985"/>
+                  </a:cubicBezTo>
+                  <a:lnTo>
+                    <a:pt x="2512" y="4119367"/>
+                  </a:lnTo>
+                  <a:cubicBezTo>
+                    <a:pt x="1675" y="2858005"/>
+                    <a:pt x="837" y="1596642"/>
+                    <a:pt x="0" y="335280"/>
+                  </a:cubicBezTo>
+                  <a:close/>
+                </a:path>
+              </a:pathLst>
+            </a:custGeom>
             <a:solidFill>
               <a:schemeClr val="tx1"/>
             </a:solidFill>
-          </a:ln>
-          <a:effectLst/>
-        </p:spPr>
-        <p:style>
-          <a:lnRef idx="2">
-            <a:schemeClr val="accent1">
-              <a:shade val="15000"/>
-            </a:schemeClr>
-          </a:lnRef>
-          <a:fillRef idx="1">
-            <a:schemeClr val="accent1"/>
-          </a:fillRef>
-          <a:effectRef idx="0">
-            <a:schemeClr val="accent1"/>
-          </a:effectRef>
-          <a:fontRef idx="minor">
-            <a:schemeClr val="lt1"/>
-          </a:fontRef>
-        </p:style>
-        <p:txBody>
-          <a:bodyPr rtlCol="0" anchor="ctr"/>
-          <a:lstStyle/>
-          <a:p>
-            <a:pPr algn="ctr"/>
-            <a:endParaRPr lang="en-IN" dirty="0">
-              <a:ln w="0"/>
-              <a:solidFill>
-                <a:schemeClr val="tx1"/>
-              </a:solidFill>
-              <a:effectLst>
-                <a:outerShdw blurRad="38100" dist="19050" dir="2700000" algn="tl" rotWithShape="0">
-                  <a:schemeClr val="dk1">
-                    <a:alpha val="40000"/>
-                  </a:schemeClr>
-                </a:outerShdw>
-              </a:effectLst>
-            </a:endParaRPr>
-          </a:p>
-        </p:txBody>
-      </p:sp>
-      <p:sp>
-        <p:nvSpPr>
-          <p:cNvPr id="5" name="Rectangle 4">
-            <a:extLst>
-              <a:ext uri="{FF2B5EF4-FFF2-40B4-BE49-F238E27FC236}">
-                <a16:creationId xmlns:a16="http://schemas.microsoft.com/office/drawing/2014/main" id="{8F41DCEA-5F8E-94CF-2C3C-6DCFC35DAE63}"/>
+            <a:ln>
+              <a:noFill/>
+            </a:ln>
+          </p:spPr>
+          <p:style>
+            <a:lnRef idx="2">
+              <a:schemeClr val="accent1">
+                <a:shade val="15000"/>
+              </a:schemeClr>
+            </a:lnRef>
+            <a:fillRef idx="1">
+              <a:schemeClr val="accent1"/>
+            </a:fillRef>
+            <a:effectRef idx="0">
+              <a:schemeClr val="accent1"/>
+            </a:effectRef>
+            <a:fontRef idx="minor">
+              <a:schemeClr val="lt1"/>
+            </a:fontRef>
+          </p:style>
+          <p:txBody>
+            <a:bodyPr rtlCol="0" anchor="ctr"/>
+            <a:lstStyle/>
+            <a:p>
+              <a:pPr algn="ctr"/>
+              <a:endParaRPr lang="en-IN" dirty="0"/>
+            </a:p>
+          </p:txBody>
+        </p:sp>
+        <p:sp>
+          <p:nvSpPr>
+            <p:cNvPr id="3" name="Rectangle 4">
+              <a:extLst>
+                <a:ext uri="{FF2B5EF4-FFF2-40B4-BE49-F238E27FC236}">
+                  <a16:creationId xmlns:a16="http://schemas.microsoft.com/office/drawing/2014/main" id="{5B583220-F69D-BD02-61AD-0B67DDA54ECA}"/>
+                </a:ext>
+              </a:extLst>
+            </p:cNvPr>
+            <p:cNvSpPr/>
+            <p:nvPr/>
+          </p:nvSpPr>
+          <p:spPr>
+            <a:xfrm rot="19649320">
+              <a:off x="2881686" y="2664170"/>
+              <a:ext cx="245480" cy="1607749"/>
+            </a:xfrm>
+            <a:custGeom>
+              <a:avLst/>
+              <a:gdLst>
+                <a:gd name="connsiteX0" fmla="*/ 0 w 417282"/>
+                <a:gd name="connsiteY0" fmla="*/ 0 h 4119367"/>
+                <a:gd name="connsiteX1" fmla="*/ 417282 w 417282"/>
+                <a:gd name="connsiteY1" fmla="*/ 0 h 4119367"/>
+                <a:gd name="connsiteX2" fmla="*/ 417282 w 417282"/>
+                <a:gd name="connsiteY2" fmla="*/ 4119367 h 4119367"/>
+                <a:gd name="connsiteX3" fmla="*/ 0 w 417282"/>
+                <a:gd name="connsiteY3" fmla="*/ 4119367 h 4119367"/>
+                <a:gd name="connsiteX4" fmla="*/ 0 w 417282"/>
+                <a:gd name="connsiteY4" fmla="*/ 0 h 4119367"/>
+                <a:gd name="connsiteX0" fmla="*/ 0 w 419794"/>
+                <a:gd name="connsiteY0" fmla="*/ 335280 h 4119367"/>
+                <a:gd name="connsiteX1" fmla="*/ 419794 w 419794"/>
+                <a:gd name="connsiteY1" fmla="*/ 0 h 4119367"/>
+                <a:gd name="connsiteX2" fmla="*/ 419794 w 419794"/>
+                <a:gd name="connsiteY2" fmla="*/ 4119367 h 4119367"/>
+                <a:gd name="connsiteX3" fmla="*/ 2512 w 419794"/>
+                <a:gd name="connsiteY3" fmla="*/ 4119367 h 4119367"/>
+                <a:gd name="connsiteX4" fmla="*/ 0 w 419794"/>
+                <a:gd name="connsiteY4" fmla="*/ 335280 h 4119367"/>
+                <a:gd name="connsiteX0" fmla="*/ 0 w 422424"/>
+                <a:gd name="connsiteY0" fmla="*/ 335280 h 4281985"/>
+                <a:gd name="connsiteX1" fmla="*/ 419794 w 422424"/>
+                <a:gd name="connsiteY1" fmla="*/ 0 h 4281985"/>
+                <a:gd name="connsiteX2" fmla="*/ 422424 w 422424"/>
+                <a:gd name="connsiteY2" fmla="*/ 4281985 h 4281985"/>
+                <a:gd name="connsiteX3" fmla="*/ 2512 w 422424"/>
+                <a:gd name="connsiteY3" fmla="*/ 4119367 h 4281985"/>
+                <a:gd name="connsiteX4" fmla="*/ 0 w 422424"/>
+                <a:gd name="connsiteY4" fmla="*/ 335280 h 4281985"/>
+              </a:gdLst>
+              <a:ahLst/>
+              <a:cxnLst>
+                <a:cxn ang="0">
+                  <a:pos x="connsiteX0" y="connsiteY0"/>
+                </a:cxn>
+                <a:cxn ang="0">
+                  <a:pos x="connsiteX1" y="connsiteY1"/>
+                </a:cxn>
+                <a:cxn ang="0">
+                  <a:pos x="connsiteX2" y="connsiteY2"/>
+                </a:cxn>
+                <a:cxn ang="0">
+                  <a:pos x="connsiteX3" y="connsiteY3"/>
+                </a:cxn>
+                <a:cxn ang="0">
+                  <a:pos x="connsiteX4" y="connsiteY4"/>
+                </a:cxn>
+              </a:cxnLst>
+              <a:rect l="l" t="t" r="r" b="b"/>
+              <a:pathLst>
+                <a:path w="422424" h="4281985">
+                  <a:moveTo>
+                    <a:pt x="0" y="335280"/>
+                  </a:moveTo>
+                  <a:lnTo>
+                    <a:pt x="419794" y="0"/>
+                  </a:lnTo>
+                  <a:cubicBezTo>
+                    <a:pt x="420671" y="1427328"/>
+                    <a:pt x="421547" y="2854657"/>
+                    <a:pt x="422424" y="4281985"/>
+                  </a:cubicBezTo>
+                  <a:lnTo>
+                    <a:pt x="2512" y="4119367"/>
+                  </a:lnTo>
+                  <a:cubicBezTo>
+                    <a:pt x="1675" y="2858005"/>
+                    <a:pt x="837" y="1596642"/>
+                    <a:pt x="0" y="335280"/>
+                  </a:cubicBezTo>
+                  <a:close/>
+                </a:path>
+              </a:pathLst>
+            </a:custGeom>
+            <a:solidFill>
+              <a:schemeClr val="tx1"/>
+            </a:solidFill>
+            <a:ln>
+              <a:noFill/>
+            </a:ln>
+          </p:spPr>
+          <p:style>
+            <a:lnRef idx="2">
+              <a:schemeClr val="accent1">
+                <a:shade val="15000"/>
+              </a:schemeClr>
+            </a:lnRef>
+            <a:fillRef idx="1">
+              <a:schemeClr val="accent1"/>
+            </a:fillRef>
+            <a:effectRef idx="0">
+              <a:schemeClr val="accent1"/>
+            </a:effectRef>
+            <a:fontRef idx="minor">
+              <a:schemeClr val="lt1"/>
+            </a:fontRef>
+          </p:style>
+          <p:txBody>
+            <a:bodyPr rtlCol="0" anchor="ctr"/>
+            <a:lstStyle/>
+            <a:p>
+              <a:pPr algn="ctr"/>
+              <a:endParaRPr lang="en-IN" dirty="0"/>
+            </a:p>
+          </p:txBody>
+        </p:sp>
+        <p:sp>
+          <p:nvSpPr>
+            <p:cNvPr id="41" name="Freeform: Shape 40">
+              <a:extLst>
+                <a:ext uri="{FF2B5EF4-FFF2-40B4-BE49-F238E27FC236}">
+                  <a16:creationId xmlns:a16="http://schemas.microsoft.com/office/drawing/2014/main" id="{D6E34E70-52BA-148C-3D3B-6ADA7FEF0B2F}"/>
+                </a:ext>
+              </a:extLst>
+            </p:cNvPr>
+            <p:cNvSpPr/>
+            <p:nvPr/>
+          </p:nvSpPr>
+          <p:spPr>
+            <a:xfrm rot="16200000">
+              <a:off x="3323285" y="2800603"/>
+              <a:ext cx="1585797" cy="1035982"/>
+            </a:xfrm>
+            <a:custGeom>
+              <a:avLst/>
+              <a:gdLst>
+                <a:gd name="connsiteX0" fmla="*/ 602814 w 1585797"/>
+                <a:gd name="connsiteY0" fmla="*/ 265355 h 1035982"/>
+                <a:gd name="connsiteX1" fmla="*/ 602814 w 1585797"/>
+                <a:gd name="connsiteY1" fmla="*/ 533233 h 1035982"/>
+                <a:gd name="connsiteX2" fmla="*/ 0 w 1585797"/>
+                <a:gd name="connsiteY2" fmla="*/ 208911 h 1035982"/>
+                <a:gd name="connsiteX3" fmla="*/ 170311 w 1585797"/>
+                <a:gd name="connsiteY3" fmla="*/ 32701 h 1035982"/>
+                <a:gd name="connsiteX4" fmla="*/ 731739 w 1585797"/>
+                <a:gd name="connsiteY4" fmla="*/ 602597 h 1035982"/>
+                <a:gd name="connsiteX5" fmla="*/ 731739 w 1585797"/>
+                <a:gd name="connsiteY5" fmla="*/ 935040 h 1035982"/>
+                <a:gd name="connsiteX6" fmla="*/ 602814 w 1585797"/>
+                <a:gd name="connsiteY6" fmla="*/ 935040 h 1035982"/>
+                <a:gd name="connsiteX7" fmla="*/ 602814 w 1585797"/>
+                <a:gd name="connsiteY7" fmla="*/ 533233 h 1035982"/>
+                <a:gd name="connsiteX8" fmla="*/ 1537268 w 1585797"/>
+                <a:gd name="connsiteY8" fmla="*/ 1035982 h 1035982"/>
+                <a:gd name="connsiteX9" fmla="*/ 731739 w 1585797"/>
+                <a:gd name="connsiteY9" fmla="*/ 602597 h 1035982"/>
+                <a:gd name="connsiteX10" fmla="*/ 731739 w 1585797"/>
+                <a:gd name="connsiteY10" fmla="*/ 334707 h 1035982"/>
+                <a:gd name="connsiteX11" fmla="*/ 1456873 w 1585797"/>
+                <a:gd name="connsiteY11" fmla="*/ 724775 h 1035982"/>
+                <a:gd name="connsiteX12" fmla="*/ 1456873 w 1585797"/>
+                <a:gd name="connsiteY12" fmla="*/ 935040 h 1035982"/>
+                <a:gd name="connsiteX13" fmla="*/ 1534160 w 1585797"/>
+                <a:gd name="connsiteY13" fmla="*/ 935040 h 1035982"/>
+                <a:gd name="connsiteX14" fmla="*/ 1585797 w 1585797"/>
+                <a:gd name="connsiteY14" fmla="*/ 155843 h 1035982"/>
+                <a:gd name="connsiteX15" fmla="*/ 1585797 w 1585797"/>
+                <a:gd name="connsiteY15" fmla="*/ 935040 h 1035982"/>
+                <a:gd name="connsiteX16" fmla="*/ 1534160 w 1585797"/>
+                <a:gd name="connsiteY16" fmla="*/ 935040 h 1035982"/>
+                <a:gd name="connsiteX17" fmla="*/ 1528879 w 1585797"/>
+                <a:gd name="connsiteY17" fmla="*/ 763509 h 1035982"/>
+                <a:gd name="connsiteX18" fmla="*/ 1456873 w 1585797"/>
+                <a:gd name="connsiteY18" fmla="*/ 724775 h 1035982"/>
+                <a:gd name="connsiteX19" fmla="*/ 1456873 w 1585797"/>
+                <a:gd name="connsiteY19" fmla="*/ 255810 h 1035982"/>
+                <a:gd name="connsiteX20" fmla="*/ 1336015 w 1585797"/>
+                <a:gd name="connsiteY20" fmla="*/ 140847 h 1035982"/>
+                <a:gd name="connsiteX21" fmla="*/ 852598 w 1585797"/>
+                <a:gd name="connsiteY21" fmla="*/ 140847 h 1035982"/>
+                <a:gd name="connsiteX22" fmla="*/ 731739 w 1585797"/>
+                <a:gd name="connsiteY22" fmla="*/ 255810 h 1035982"/>
+                <a:gd name="connsiteX23" fmla="*/ 731739 w 1585797"/>
+                <a:gd name="connsiteY23" fmla="*/ 334707 h 1035982"/>
+                <a:gd name="connsiteX24" fmla="*/ 602814 w 1585797"/>
+                <a:gd name="connsiteY24" fmla="*/ 265355 h 1035982"/>
+                <a:gd name="connsiteX25" fmla="*/ 602814 w 1585797"/>
+                <a:gd name="connsiteY25" fmla="*/ 155843 h 1035982"/>
+                <a:gd name="connsiteX26" fmla="*/ 766648 w 1585797"/>
+                <a:gd name="connsiteY26" fmla="*/ 0 h 1035982"/>
+                <a:gd name="connsiteX27" fmla="*/ 1421963 w 1585797"/>
+                <a:gd name="connsiteY27" fmla="*/ 0 h 1035982"/>
+                <a:gd name="connsiteX28" fmla="*/ 1585797 w 1585797"/>
+                <a:gd name="connsiteY28" fmla="*/ 155843 h 1035982"/>
+              </a:gdLst>
+              <a:ahLst/>
+              <a:cxnLst>
+                <a:cxn ang="0">
+                  <a:pos x="connsiteX0" y="connsiteY0"/>
+                </a:cxn>
+                <a:cxn ang="0">
+                  <a:pos x="connsiteX1" y="connsiteY1"/>
+                </a:cxn>
+                <a:cxn ang="0">
+                  <a:pos x="connsiteX2" y="connsiteY2"/>
+                </a:cxn>
+                <a:cxn ang="0">
+                  <a:pos x="connsiteX3" y="connsiteY3"/>
+                </a:cxn>
+                <a:cxn ang="0">
+                  <a:pos x="connsiteX4" y="connsiteY4"/>
+                </a:cxn>
+                <a:cxn ang="0">
+                  <a:pos x="connsiteX5" y="connsiteY5"/>
+                </a:cxn>
+                <a:cxn ang="0">
+                  <a:pos x="connsiteX6" y="connsiteY6"/>
+                </a:cxn>
+                <a:cxn ang="0">
+                  <a:pos x="connsiteX7" y="connsiteY7"/>
+                </a:cxn>
+                <a:cxn ang="0">
+                  <a:pos x="connsiteX8" y="connsiteY8"/>
+                </a:cxn>
+                <a:cxn ang="0">
+                  <a:pos x="connsiteX9" y="connsiteY9"/>
+                </a:cxn>
+                <a:cxn ang="0">
+                  <a:pos x="connsiteX10" y="connsiteY10"/>
+                </a:cxn>
+                <a:cxn ang="0">
+                  <a:pos x="connsiteX11" y="connsiteY11"/>
+                </a:cxn>
+                <a:cxn ang="0">
+                  <a:pos x="connsiteX12" y="connsiteY12"/>
+                </a:cxn>
+                <a:cxn ang="0">
+                  <a:pos x="connsiteX13" y="connsiteY13"/>
+                </a:cxn>
+                <a:cxn ang="0">
+                  <a:pos x="connsiteX14" y="connsiteY14"/>
+                </a:cxn>
+                <a:cxn ang="0">
+                  <a:pos x="connsiteX15" y="connsiteY15"/>
+                </a:cxn>
+                <a:cxn ang="0">
+                  <a:pos x="connsiteX16" y="connsiteY16"/>
+                </a:cxn>
+                <a:cxn ang="0">
+                  <a:pos x="connsiteX17" y="connsiteY17"/>
+                </a:cxn>
+                <a:cxn ang="0">
+                  <a:pos x="connsiteX18" y="connsiteY18"/>
+                </a:cxn>
+                <a:cxn ang="0">
+                  <a:pos x="connsiteX19" y="connsiteY19"/>
+                </a:cxn>
+                <a:cxn ang="0">
+                  <a:pos x="connsiteX20" y="connsiteY20"/>
+                </a:cxn>
+                <a:cxn ang="0">
+                  <a:pos x="connsiteX21" y="connsiteY21"/>
+                </a:cxn>
+                <a:cxn ang="0">
+                  <a:pos x="connsiteX22" y="connsiteY22"/>
+                </a:cxn>
+                <a:cxn ang="0">
+                  <a:pos x="connsiteX23" y="connsiteY23"/>
+                </a:cxn>
+                <a:cxn ang="0">
+                  <a:pos x="connsiteX24" y="connsiteY24"/>
+                </a:cxn>
+                <a:cxn ang="0">
+                  <a:pos x="connsiteX25" y="connsiteY25"/>
+                </a:cxn>
+                <a:cxn ang="0">
+                  <a:pos x="connsiteX26" y="connsiteY26"/>
+                </a:cxn>
+                <a:cxn ang="0">
+                  <a:pos x="connsiteX27" y="connsiteY27"/>
+                </a:cxn>
+                <a:cxn ang="0">
+                  <a:pos x="connsiteX28" y="connsiteY28"/>
+                </a:cxn>
+              </a:cxnLst>
+              <a:rect l="l" t="t" r="r" b="b"/>
+              <a:pathLst>
+                <a:path w="1585797" h="1035982">
+                  <a:moveTo>
+                    <a:pt x="602814" y="265355"/>
+                  </a:moveTo>
+                  <a:lnTo>
+                    <a:pt x="602814" y="533233"/>
+                  </a:lnTo>
+                  <a:lnTo>
+                    <a:pt x="0" y="208911"/>
+                  </a:lnTo>
+                  <a:lnTo>
+                    <a:pt x="170311" y="32701"/>
+                  </a:lnTo>
+                  <a:close/>
+                  <a:moveTo>
+                    <a:pt x="731739" y="602597"/>
+                  </a:moveTo>
+                  <a:lnTo>
+                    <a:pt x="731739" y="935040"/>
+                  </a:lnTo>
+                  <a:lnTo>
+                    <a:pt x="602814" y="935040"/>
+                  </a:lnTo>
+                  <a:lnTo>
+                    <a:pt x="602814" y="533233"/>
+                  </a:lnTo>
+                  <a:close/>
+                  <a:moveTo>
+                    <a:pt x="1537268" y="1035982"/>
+                  </a:moveTo>
+                  <a:lnTo>
+                    <a:pt x="731739" y="602597"/>
+                  </a:lnTo>
+                  <a:lnTo>
+                    <a:pt x="731739" y="334707"/>
+                  </a:lnTo>
+                  <a:lnTo>
+                    <a:pt x="1456873" y="724775"/>
+                  </a:lnTo>
+                  <a:lnTo>
+                    <a:pt x="1456873" y="935040"/>
+                  </a:lnTo>
+                  <a:lnTo>
+                    <a:pt x="1534160" y="935040"/>
+                  </a:lnTo>
+                  <a:close/>
+                  <a:moveTo>
+                    <a:pt x="1585797" y="155843"/>
+                  </a:moveTo>
+                  <a:lnTo>
+                    <a:pt x="1585797" y="935040"/>
+                  </a:lnTo>
+                  <a:lnTo>
+                    <a:pt x="1534160" y="935040"/>
+                  </a:lnTo>
+                  <a:lnTo>
+                    <a:pt x="1528879" y="763509"/>
+                  </a:lnTo>
+                  <a:lnTo>
+                    <a:pt x="1456873" y="724775"/>
+                  </a:lnTo>
+                  <a:lnTo>
+                    <a:pt x="1456873" y="255810"/>
+                  </a:lnTo>
+                  <a:cubicBezTo>
+                    <a:pt x="1456873" y="192318"/>
+                    <a:pt x="1402763" y="140847"/>
+                    <a:pt x="1336015" y="140847"/>
+                  </a:cubicBezTo>
+                  <a:lnTo>
+                    <a:pt x="852598" y="140847"/>
+                  </a:lnTo>
+                  <a:cubicBezTo>
+                    <a:pt x="785849" y="140847"/>
+                    <a:pt x="731739" y="192318"/>
+                    <a:pt x="731739" y="255810"/>
+                  </a:cubicBezTo>
+                  <a:lnTo>
+                    <a:pt x="731739" y="334707"/>
+                  </a:lnTo>
+                  <a:lnTo>
+                    <a:pt x="602814" y="265355"/>
+                  </a:lnTo>
+                  <a:lnTo>
+                    <a:pt x="602814" y="155843"/>
+                  </a:lnTo>
+                  <a:cubicBezTo>
+                    <a:pt x="602814" y="69773"/>
+                    <a:pt x="676165" y="0"/>
+                    <a:pt x="766648" y="0"/>
+                  </a:cubicBezTo>
+                  <a:lnTo>
+                    <a:pt x="1421963" y="0"/>
+                  </a:lnTo>
+                  <a:cubicBezTo>
+                    <a:pt x="1512446" y="0"/>
+                    <a:pt x="1585797" y="69773"/>
+                    <a:pt x="1585797" y="155843"/>
+                  </a:cubicBezTo>
+                  <a:close/>
+                </a:path>
+              </a:pathLst>
+            </a:custGeom>
+            <a:solidFill>
+              <a:schemeClr val="tx1"/>
+            </a:solidFill>
+            <a:ln>
+              <a:noFill/>
+            </a:ln>
+          </p:spPr>
+          <p:style>
+            <a:lnRef idx="2">
+              <a:schemeClr val="accent1">
+                <a:shade val="15000"/>
+              </a:schemeClr>
+            </a:lnRef>
+            <a:fillRef idx="1">
+              <a:schemeClr val="accent1"/>
+            </a:fillRef>
+            <a:effectRef idx="0">
+              <a:schemeClr val="accent1"/>
+            </a:effectRef>
+            <a:fontRef idx="minor">
+              <a:schemeClr val="lt1"/>
+            </a:fontRef>
+          </p:style>
+          <p:txBody>
+            <a:bodyPr wrap="square" rtlCol="0" anchor="ctr">
+              <a:noAutofit/>
+            </a:bodyPr>
+            <a:lstStyle/>
+            <a:p>
+              <a:pPr algn="ctr"/>
+              <a:endParaRPr lang="en-IN"/>
+            </a:p>
+          </p:txBody>
+        </p:sp>
+      </p:grpSp>
+    </p:spTree>
+    <p:extLst>
+      <p:ext uri="{BB962C8B-B14F-4D97-AF65-F5344CB8AC3E}">
+        <p14:creationId xmlns:p14="http://schemas.microsoft.com/office/powerpoint/2010/main" val="2447756666"/>
+      </p:ext>
+    </p:extLst>
+  </p:cSld>
+  <p:clrMapOvr>
+    <a:masterClrMapping/>
+  </p:clrMapOvr>
+</p:sld>
+</file>
+
+<file path=ppt/slides/slide2.xml><?xml version="1.0" encoding="utf-8"?>
+<p:sld xmlns:a="http://schemas.openxmlformats.org/drawingml/2006/main" xmlns:r="http://schemas.openxmlformats.org/officeDocument/2006/relationships" xmlns:p="http://schemas.openxmlformats.org/presentationml/2006/main">
+  <p:cSld>
+    <p:spTree>
+      <p:nvGrpSpPr>
+        <p:cNvPr id="1" name="">
+          <a:extLst>
+            <a:ext uri="{FF2B5EF4-FFF2-40B4-BE49-F238E27FC236}">
+              <a16:creationId xmlns:a16="http://schemas.microsoft.com/office/drawing/2014/main" id="{EC64311E-9577-3A7C-3D11-74DC901E6270}"/>
+            </a:ext>
+          </a:extLst>
+        </p:cNvPr>
+        <p:cNvGrpSpPr/>
+        <p:nvPr/>
+      </p:nvGrpSpPr>
+      <p:grpSpPr>
+        <a:xfrm>
+          <a:off x="0" y="0"/>
+          <a:ext cx="0" cy="0"/>
+          <a:chOff x="0" y="0"/>
+          <a:chExt cx="0" cy="0"/>
+        </a:xfrm>
+      </p:grpSpPr>
+      <p:sp>
+        <p:nvSpPr>
+          <p:cNvPr id="9" name="Freeform: Shape 8">
+            <a:extLst>
+              <a:ext uri="{FF2B5EF4-FFF2-40B4-BE49-F238E27FC236}">
+                <a16:creationId xmlns:a16="http://schemas.microsoft.com/office/drawing/2014/main" id="{004230EE-13CA-FB80-7B92-6652FAAF9DE4}"/>
               </a:ext>
             </a:extLst>
           </p:cNvPr>
@@ -3425,263 +4046,9 @@
           <p:nvPr/>
         </p:nvSpPr>
         <p:spPr>
-          <a:xfrm rot="19649320">
-            <a:off x="3560597" y="2013063"/>
-            <a:ext cx="529690" cy="5070250"/>
-          </a:xfrm>
-          <a:custGeom>
-            <a:avLst/>
-            <a:gdLst>
-              <a:gd name="connsiteX0" fmla="*/ 0 w 417282"/>
-              <a:gd name="connsiteY0" fmla="*/ 0 h 4119367"/>
-              <a:gd name="connsiteX1" fmla="*/ 417282 w 417282"/>
-              <a:gd name="connsiteY1" fmla="*/ 0 h 4119367"/>
-              <a:gd name="connsiteX2" fmla="*/ 417282 w 417282"/>
-              <a:gd name="connsiteY2" fmla="*/ 4119367 h 4119367"/>
-              <a:gd name="connsiteX3" fmla="*/ 0 w 417282"/>
-              <a:gd name="connsiteY3" fmla="*/ 4119367 h 4119367"/>
-              <a:gd name="connsiteX4" fmla="*/ 0 w 417282"/>
-              <a:gd name="connsiteY4" fmla="*/ 0 h 4119367"/>
-              <a:gd name="connsiteX0" fmla="*/ 0 w 419794"/>
-              <a:gd name="connsiteY0" fmla="*/ 335280 h 4119367"/>
-              <a:gd name="connsiteX1" fmla="*/ 419794 w 419794"/>
-              <a:gd name="connsiteY1" fmla="*/ 0 h 4119367"/>
-              <a:gd name="connsiteX2" fmla="*/ 419794 w 419794"/>
-              <a:gd name="connsiteY2" fmla="*/ 4119367 h 4119367"/>
-              <a:gd name="connsiteX3" fmla="*/ 2512 w 419794"/>
-              <a:gd name="connsiteY3" fmla="*/ 4119367 h 4119367"/>
-              <a:gd name="connsiteX4" fmla="*/ 0 w 419794"/>
-              <a:gd name="connsiteY4" fmla="*/ 335280 h 4119367"/>
-              <a:gd name="connsiteX0" fmla="*/ 0 w 422424"/>
-              <a:gd name="connsiteY0" fmla="*/ 335280 h 4281985"/>
-              <a:gd name="connsiteX1" fmla="*/ 419794 w 422424"/>
-              <a:gd name="connsiteY1" fmla="*/ 0 h 4281985"/>
-              <a:gd name="connsiteX2" fmla="*/ 422424 w 422424"/>
-              <a:gd name="connsiteY2" fmla="*/ 4281985 h 4281985"/>
-              <a:gd name="connsiteX3" fmla="*/ 2512 w 422424"/>
-              <a:gd name="connsiteY3" fmla="*/ 4119367 h 4281985"/>
-              <a:gd name="connsiteX4" fmla="*/ 0 w 422424"/>
-              <a:gd name="connsiteY4" fmla="*/ 335280 h 4281985"/>
-            </a:gdLst>
-            <a:ahLst/>
-            <a:cxnLst>
-              <a:cxn ang="0">
-                <a:pos x="connsiteX0" y="connsiteY0"/>
-              </a:cxn>
-              <a:cxn ang="0">
-                <a:pos x="connsiteX1" y="connsiteY1"/>
-              </a:cxn>
-              <a:cxn ang="0">
-                <a:pos x="connsiteX2" y="connsiteY2"/>
-              </a:cxn>
-              <a:cxn ang="0">
-                <a:pos x="connsiteX3" y="connsiteY3"/>
-              </a:cxn>
-              <a:cxn ang="0">
-                <a:pos x="connsiteX4" y="connsiteY4"/>
-              </a:cxn>
-            </a:cxnLst>
-            <a:rect l="l" t="t" r="r" b="b"/>
-            <a:pathLst>
-              <a:path w="422424" h="4281985">
-                <a:moveTo>
-                  <a:pt x="0" y="335280"/>
-                </a:moveTo>
-                <a:lnTo>
-                  <a:pt x="419794" y="0"/>
-                </a:lnTo>
-                <a:cubicBezTo>
-                  <a:pt x="420671" y="1427328"/>
-                  <a:pt x="421547" y="2854657"/>
-                  <a:pt x="422424" y="4281985"/>
-                </a:cubicBezTo>
-                <a:lnTo>
-                  <a:pt x="2512" y="4119367"/>
-                </a:lnTo>
-                <a:cubicBezTo>
-                  <a:pt x="1675" y="2858005"/>
-                  <a:pt x="837" y="1596642"/>
-                  <a:pt x="0" y="335280"/>
-                </a:cubicBezTo>
-                <a:close/>
-              </a:path>
-            </a:pathLst>
-          </a:custGeom>
-          <a:solidFill>
-            <a:schemeClr val="tx1"/>
-          </a:solidFill>
-          <a:ln>
-            <a:noFill/>
-          </a:ln>
-        </p:spPr>
-        <p:style>
-          <a:lnRef idx="2">
-            <a:schemeClr val="accent1">
-              <a:shade val="15000"/>
-            </a:schemeClr>
-          </a:lnRef>
-          <a:fillRef idx="1">
-            <a:schemeClr val="accent1"/>
-          </a:fillRef>
-          <a:effectRef idx="0">
-            <a:schemeClr val="accent1"/>
-          </a:effectRef>
-          <a:fontRef idx="minor">
-            <a:schemeClr val="lt1"/>
-          </a:fontRef>
-        </p:style>
-        <p:txBody>
-          <a:bodyPr rtlCol="0" anchor="ctr"/>
-          <a:lstStyle/>
-          <a:p>
-            <a:pPr algn="ctr"/>
-            <a:endParaRPr lang="en-IN" dirty="0"/>
-          </a:p>
-        </p:txBody>
-      </p:sp>
-      <p:sp>
-        <p:nvSpPr>
-          <p:cNvPr id="7" name="Rectangle 4">
-            <a:extLst>
-              <a:ext uri="{FF2B5EF4-FFF2-40B4-BE49-F238E27FC236}">
-                <a16:creationId xmlns:a16="http://schemas.microsoft.com/office/drawing/2014/main" id="{E51A5B58-85C1-7270-059D-4C17EB8D2B6F}"/>
-              </a:ext>
-            </a:extLst>
-          </p:cNvPr>
-          <p:cNvSpPr/>
-          <p:nvPr/>
-        </p:nvSpPr>
-        <p:spPr>
-          <a:xfrm rot="19649320">
-            <a:off x="4144984" y="1240710"/>
-            <a:ext cx="518167" cy="5913480"/>
-          </a:xfrm>
-          <a:custGeom>
-            <a:avLst/>
-            <a:gdLst>
-              <a:gd name="connsiteX0" fmla="*/ 0 w 417282"/>
-              <a:gd name="connsiteY0" fmla="*/ 0 h 4119367"/>
-              <a:gd name="connsiteX1" fmla="*/ 417282 w 417282"/>
-              <a:gd name="connsiteY1" fmla="*/ 0 h 4119367"/>
-              <a:gd name="connsiteX2" fmla="*/ 417282 w 417282"/>
-              <a:gd name="connsiteY2" fmla="*/ 4119367 h 4119367"/>
-              <a:gd name="connsiteX3" fmla="*/ 0 w 417282"/>
-              <a:gd name="connsiteY3" fmla="*/ 4119367 h 4119367"/>
-              <a:gd name="connsiteX4" fmla="*/ 0 w 417282"/>
-              <a:gd name="connsiteY4" fmla="*/ 0 h 4119367"/>
-              <a:gd name="connsiteX0" fmla="*/ 0 w 419794"/>
-              <a:gd name="connsiteY0" fmla="*/ 335280 h 4119367"/>
-              <a:gd name="connsiteX1" fmla="*/ 419794 w 419794"/>
-              <a:gd name="connsiteY1" fmla="*/ 0 h 4119367"/>
-              <a:gd name="connsiteX2" fmla="*/ 419794 w 419794"/>
-              <a:gd name="connsiteY2" fmla="*/ 4119367 h 4119367"/>
-              <a:gd name="connsiteX3" fmla="*/ 2512 w 419794"/>
-              <a:gd name="connsiteY3" fmla="*/ 4119367 h 4119367"/>
-              <a:gd name="connsiteX4" fmla="*/ 0 w 419794"/>
-              <a:gd name="connsiteY4" fmla="*/ 335280 h 4119367"/>
-              <a:gd name="connsiteX0" fmla="*/ 0 w 422424"/>
-              <a:gd name="connsiteY0" fmla="*/ 335280 h 4281985"/>
-              <a:gd name="connsiteX1" fmla="*/ 419794 w 422424"/>
-              <a:gd name="connsiteY1" fmla="*/ 0 h 4281985"/>
-              <a:gd name="connsiteX2" fmla="*/ 422424 w 422424"/>
-              <a:gd name="connsiteY2" fmla="*/ 4281985 h 4281985"/>
-              <a:gd name="connsiteX3" fmla="*/ 2512 w 422424"/>
-              <a:gd name="connsiteY3" fmla="*/ 4119367 h 4281985"/>
-              <a:gd name="connsiteX4" fmla="*/ 0 w 422424"/>
-              <a:gd name="connsiteY4" fmla="*/ 335280 h 4281985"/>
-            </a:gdLst>
-            <a:ahLst/>
-            <a:cxnLst>
-              <a:cxn ang="0">
-                <a:pos x="connsiteX0" y="connsiteY0"/>
-              </a:cxn>
-              <a:cxn ang="0">
-                <a:pos x="connsiteX1" y="connsiteY1"/>
-              </a:cxn>
-              <a:cxn ang="0">
-                <a:pos x="connsiteX2" y="connsiteY2"/>
-              </a:cxn>
-              <a:cxn ang="0">
-                <a:pos x="connsiteX3" y="connsiteY3"/>
-              </a:cxn>
-              <a:cxn ang="0">
-                <a:pos x="connsiteX4" y="connsiteY4"/>
-              </a:cxn>
-            </a:cxnLst>
-            <a:rect l="l" t="t" r="r" b="b"/>
-            <a:pathLst>
-              <a:path w="422424" h="4281985">
-                <a:moveTo>
-                  <a:pt x="0" y="335280"/>
-                </a:moveTo>
-                <a:lnTo>
-                  <a:pt x="419794" y="0"/>
-                </a:lnTo>
-                <a:cubicBezTo>
-                  <a:pt x="420671" y="1427328"/>
-                  <a:pt x="421547" y="2854657"/>
-                  <a:pt x="422424" y="4281985"/>
-                </a:cubicBezTo>
-                <a:lnTo>
-                  <a:pt x="2512" y="4119367"/>
-                </a:lnTo>
-                <a:cubicBezTo>
-                  <a:pt x="1675" y="2858005"/>
-                  <a:pt x="837" y="1596642"/>
-                  <a:pt x="0" y="335280"/>
-                </a:cubicBezTo>
-                <a:close/>
-              </a:path>
-            </a:pathLst>
-          </a:custGeom>
-          <a:solidFill>
-            <a:schemeClr val="tx1"/>
-          </a:solidFill>
-          <a:ln>
-            <a:noFill/>
-          </a:ln>
-        </p:spPr>
-        <p:style>
-          <a:lnRef idx="2">
-            <a:schemeClr val="accent1">
-              <a:shade val="15000"/>
-            </a:schemeClr>
-          </a:lnRef>
-          <a:fillRef idx="1">
-            <a:schemeClr val="accent1"/>
-          </a:fillRef>
-          <a:effectRef idx="0">
-            <a:schemeClr val="accent1"/>
-          </a:effectRef>
-          <a:fontRef idx="minor">
-            <a:schemeClr val="lt1"/>
-          </a:fontRef>
-        </p:style>
-        <p:txBody>
-          <a:bodyPr rtlCol="0" anchor="ctr"/>
-          <a:lstStyle/>
-          <a:p>
-            <a:pPr algn="ctr"/>
-            <a:endParaRPr lang="en-IN" dirty="0"/>
-          </a:p>
-        </p:txBody>
-      </p:sp>
-      <p:sp>
-        <p:nvSpPr>
-          <p:cNvPr id="9" name="Freeform: Shape 8">
-            <a:extLst>
-              <a:ext uri="{FF2B5EF4-FFF2-40B4-BE49-F238E27FC236}">
-                <a16:creationId xmlns:a16="http://schemas.microsoft.com/office/drawing/2014/main" id="{563EE6A8-81BC-AC9F-716A-6DB18CCA5934}"/>
-              </a:ext>
-            </a:extLst>
-          </p:cNvPr>
-          <p:cNvSpPr/>
-          <p:nvPr/>
-        </p:nvSpPr>
-        <p:spPr>
           <a:xfrm rot="15999561">
-            <a:off x="4578069" y="2348297"/>
-            <a:ext cx="5059656" cy="3516241"/>
+            <a:off x="4723282" y="1926929"/>
+            <a:ext cx="1616482" cy="1708738"/>
           </a:xfrm>
           <a:custGeom>
             <a:avLst/>
@@ -4038,10 +4405,1340 @@
           </a:p>
         </p:txBody>
       </p:sp>
+      <p:sp>
+        <p:nvSpPr>
+          <p:cNvPr id="11" name="Block Arc 10">
+            <a:extLst>
+              <a:ext uri="{FF2B5EF4-FFF2-40B4-BE49-F238E27FC236}">
+                <a16:creationId xmlns:a16="http://schemas.microsoft.com/office/drawing/2014/main" id="{745D6ED8-5B09-A4EE-A54A-D4AAEED3660A}"/>
+              </a:ext>
+            </a:extLst>
+          </p:cNvPr>
+          <p:cNvSpPr/>
+          <p:nvPr/>
+        </p:nvSpPr>
+        <p:spPr>
+          <a:xfrm rot="15921863">
+            <a:off x="1981698" y="2268673"/>
+            <a:ext cx="1362075" cy="1354814"/>
+          </a:xfrm>
+          <a:prstGeom prst="blockArc">
+            <a:avLst>
+              <a:gd name="adj1" fmla="val 10800000"/>
+              <a:gd name="adj2" fmla="val 1245465"/>
+              <a:gd name="adj3" fmla="val 5595"/>
+            </a:avLst>
+          </a:prstGeom>
+        </p:spPr>
+        <p:style>
+          <a:lnRef idx="2">
+            <a:schemeClr val="accent1">
+              <a:shade val="15000"/>
+            </a:schemeClr>
+          </a:lnRef>
+          <a:fillRef idx="1">
+            <a:schemeClr val="accent1"/>
+          </a:fillRef>
+          <a:effectRef idx="0">
+            <a:schemeClr val="accent1"/>
+          </a:effectRef>
+          <a:fontRef idx="minor">
+            <a:schemeClr val="lt1"/>
+          </a:fontRef>
+        </p:style>
+        <p:txBody>
+          <a:bodyPr rtlCol="0" anchor="ctr"/>
+          <a:lstStyle/>
+          <a:p>
+            <a:pPr algn="ctr"/>
+            <a:endParaRPr lang="en-IN">
+              <a:solidFill>
+                <a:schemeClr val="tx1"/>
+              </a:solidFill>
+            </a:endParaRPr>
+          </a:p>
+        </p:txBody>
+      </p:sp>
     </p:spTree>
     <p:extLst>
       <p:ext uri="{BB962C8B-B14F-4D97-AF65-F5344CB8AC3E}">
-        <p14:creationId xmlns:p14="http://schemas.microsoft.com/office/powerpoint/2010/main" val="2447756666"/>
+        <p14:creationId xmlns:p14="http://schemas.microsoft.com/office/powerpoint/2010/main" val="3311745448"/>
+      </p:ext>
+    </p:extLst>
+  </p:cSld>
+  <p:clrMapOvr>
+    <a:masterClrMapping/>
+  </p:clrMapOvr>
+</p:sld>
+</file>
+
+<file path=ppt/slides/slide3.xml><?xml version="1.0" encoding="utf-8"?>
+<p:sld xmlns:a="http://schemas.openxmlformats.org/drawingml/2006/main" xmlns:r="http://schemas.openxmlformats.org/officeDocument/2006/relationships" xmlns:p="http://schemas.openxmlformats.org/presentationml/2006/main">
+  <p:cSld>
+    <p:spTree>
+      <p:nvGrpSpPr>
+        <p:cNvPr id="1" name="">
+          <a:extLst>
+            <a:ext uri="{FF2B5EF4-FFF2-40B4-BE49-F238E27FC236}">
+              <a16:creationId xmlns:a16="http://schemas.microsoft.com/office/drawing/2014/main" id="{B960BFAE-7BA3-697B-FBEB-428298303F9E}"/>
+            </a:ext>
+          </a:extLst>
+        </p:cNvPr>
+        <p:cNvGrpSpPr/>
+        <p:nvPr/>
+      </p:nvGrpSpPr>
+      <p:grpSpPr>
+        <a:xfrm>
+          <a:off x="0" y="0"/>
+          <a:ext cx="0" cy="0"/>
+          <a:chOff x="0" y="0"/>
+          <a:chExt cx="0" cy="0"/>
+        </a:xfrm>
+      </p:grpSpPr>
+      <p:sp>
+        <p:nvSpPr>
+          <p:cNvPr id="2" name="Rectangle: Rounded Corners 1">
+            <a:extLst>
+              <a:ext uri="{FF2B5EF4-FFF2-40B4-BE49-F238E27FC236}">
+                <a16:creationId xmlns:a16="http://schemas.microsoft.com/office/drawing/2014/main" id="{B98C684C-879C-31E0-AF32-6F4C796F0747}"/>
+              </a:ext>
+            </a:extLst>
+          </p:cNvPr>
+          <p:cNvSpPr/>
+          <p:nvPr/>
+        </p:nvSpPr>
+        <p:spPr>
+          <a:xfrm>
+            <a:off x="2843418" y="133350"/>
+            <a:ext cx="6505164" cy="6440825"/>
+          </a:xfrm>
+          <a:prstGeom prst="roundRect">
+            <a:avLst/>
+          </a:prstGeom>
+          <a:solidFill>
+            <a:schemeClr val="tx1"/>
+          </a:solidFill>
+          <a:ln>
+            <a:noFill/>
+          </a:ln>
+        </p:spPr>
+        <p:style>
+          <a:lnRef idx="2">
+            <a:schemeClr val="accent1">
+              <a:shade val="15000"/>
+            </a:schemeClr>
+          </a:lnRef>
+          <a:fillRef idx="1">
+            <a:schemeClr val="accent1"/>
+          </a:fillRef>
+          <a:effectRef idx="0">
+            <a:schemeClr val="accent1"/>
+          </a:effectRef>
+          <a:fontRef idx="minor">
+            <a:schemeClr val="lt1"/>
+          </a:fontRef>
+        </p:style>
+        <p:txBody>
+          <a:bodyPr rtlCol="0" anchor="ctr"/>
+          <a:lstStyle>
+            <a:defPPr>
+              <a:defRPr lang="en-US"/>
+            </a:defPPr>
+            <a:lvl1pPr marL="0" algn="l" defTabSz="914400" rtl="0" eaLnBrk="1" latinLnBrk="0" hangingPunct="1">
+              <a:defRPr sz="1800" kern="1200">
+                <a:solidFill>
+                  <a:schemeClr val="lt1"/>
+                </a:solidFill>
+                <a:latin typeface="+mn-lt"/>
+                <a:ea typeface="+mn-ea"/>
+                <a:cs typeface="+mn-cs"/>
+              </a:defRPr>
+            </a:lvl1pPr>
+            <a:lvl2pPr marL="457200" algn="l" defTabSz="914400" rtl="0" eaLnBrk="1" latinLnBrk="0" hangingPunct="1">
+              <a:defRPr sz="1800" kern="1200">
+                <a:solidFill>
+                  <a:schemeClr val="lt1"/>
+                </a:solidFill>
+                <a:latin typeface="+mn-lt"/>
+                <a:ea typeface="+mn-ea"/>
+                <a:cs typeface="+mn-cs"/>
+              </a:defRPr>
+            </a:lvl2pPr>
+            <a:lvl3pPr marL="914400" algn="l" defTabSz="914400" rtl="0" eaLnBrk="1" latinLnBrk="0" hangingPunct="1">
+              <a:defRPr sz="1800" kern="1200">
+                <a:solidFill>
+                  <a:schemeClr val="lt1"/>
+                </a:solidFill>
+                <a:latin typeface="+mn-lt"/>
+                <a:ea typeface="+mn-ea"/>
+                <a:cs typeface="+mn-cs"/>
+              </a:defRPr>
+            </a:lvl3pPr>
+            <a:lvl4pPr marL="1371600" algn="l" defTabSz="914400" rtl="0" eaLnBrk="1" latinLnBrk="0" hangingPunct="1">
+              <a:defRPr sz="1800" kern="1200">
+                <a:solidFill>
+                  <a:schemeClr val="lt1"/>
+                </a:solidFill>
+                <a:latin typeface="+mn-lt"/>
+                <a:ea typeface="+mn-ea"/>
+                <a:cs typeface="+mn-cs"/>
+              </a:defRPr>
+            </a:lvl4pPr>
+            <a:lvl5pPr marL="1828800" algn="l" defTabSz="914400" rtl="0" eaLnBrk="1" latinLnBrk="0" hangingPunct="1">
+              <a:defRPr sz="1800" kern="1200">
+                <a:solidFill>
+                  <a:schemeClr val="lt1"/>
+                </a:solidFill>
+                <a:latin typeface="+mn-lt"/>
+                <a:ea typeface="+mn-ea"/>
+                <a:cs typeface="+mn-cs"/>
+              </a:defRPr>
+            </a:lvl5pPr>
+            <a:lvl6pPr marL="2286000" algn="l" defTabSz="914400" rtl="0" eaLnBrk="1" latinLnBrk="0" hangingPunct="1">
+              <a:defRPr sz="1800" kern="1200">
+                <a:solidFill>
+                  <a:schemeClr val="lt1"/>
+                </a:solidFill>
+                <a:latin typeface="+mn-lt"/>
+                <a:ea typeface="+mn-ea"/>
+                <a:cs typeface="+mn-cs"/>
+              </a:defRPr>
+            </a:lvl6pPr>
+            <a:lvl7pPr marL="2743200" algn="l" defTabSz="914400" rtl="0" eaLnBrk="1" latinLnBrk="0" hangingPunct="1">
+              <a:defRPr sz="1800" kern="1200">
+                <a:solidFill>
+                  <a:schemeClr val="lt1"/>
+                </a:solidFill>
+                <a:latin typeface="+mn-lt"/>
+                <a:ea typeface="+mn-ea"/>
+                <a:cs typeface="+mn-cs"/>
+              </a:defRPr>
+            </a:lvl7pPr>
+            <a:lvl8pPr marL="3200400" algn="l" defTabSz="914400" rtl="0" eaLnBrk="1" latinLnBrk="0" hangingPunct="1">
+              <a:defRPr sz="1800" kern="1200">
+                <a:solidFill>
+                  <a:schemeClr val="lt1"/>
+                </a:solidFill>
+                <a:latin typeface="+mn-lt"/>
+                <a:ea typeface="+mn-ea"/>
+                <a:cs typeface="+mn-cs"/>
+              </a:defRPr>
+            </a:lvl8pPr>
+            <a:lvl9pPr marL="3657600" algn="l" defTabSz="914400" rtl="0" eaLnBrk="1" latinLnBrk="0" hangingPunct="1">
+              <a:defRPr sz="1800" kern="1200">
+                <a:solidFill>
+                  <a:schemeClr val="lt1"/>
+                </a:solidFill>
+                <a:latin typeface="+mn-lt"/>
+                <a:ea typeface="+mn-ea"/>
+                <a:cs typeface="+mn-cs"/>
+              </a:defRPr>
+            </a:lvl9pPr>
+          </a:lstStyle>
+          <a:p>
+            <a:pPr algn="ctr"/>
+            <a:endParaRPr lang="en-IN" dirty="0"/>
+          </a:p>
+        </p:txBody>
+      </p:sp>
+      <p:grpSp>
+        <p:nvGrpSpPr>
+          <p:cNvPr id="3" name="Group 2">
+            <a:extLst>
+              <a:ext uri="{FF2B5EF4-FFF2-40B4-BE49-F238E27FC236}">
+                <a16:creationId xmlns:a16="http://schemas.microsoft.com/office/drawing/2014/main" id="{C2074742-B5D5-B851-8F3A-ADD120F47E35}"/>
+              </a:ext>
+            </a:extLst>
+          </p:cNvPr>
+          <p:cNvGrpSpPr/>
+          <p:nvPr/>
+        </p:nvGrpSpPr>
+        <p:grpSpPr>
+          <a:xfrm>
+            <a:off x="3100388" y="370560"/>
+            <a:ext cx="5991224" cy="6354090"/>
+            <a:chOff x="2433638" y="370560"/>
+            <a:chExt cx="5991224" cy="6354090"/>
+          </a:xfrm>
+        </p:grpSpPr>
+        <p:sp>
+          <p:nvSpPr>
+            <p:cNvPr id="6" name="Oval 5">
+              <a:extLst>
+                <a:ext uri="{FF2B5EF4-FFF2-40B4-BE49-F238E27FC236}">
+                  <a16:creationId xmlns:a16="http://schemas.microsoft.com/office/drawing/2014/main" id="{6E1D1A32-36CB-1123-2704-DF52D5C3FBBF}"/>
+                </a:ext>
+              </a:extLst>
+            </p:cNvPr>
+            <p:cNvSpPr/>
+            <p:nvPr/>
+          </p:nvSpPr>
+          <p:spPr>
+            <a:xfrm rot="313311">
+              <a:off x="2433638" y="370560"/>
+              <a:ext cx="5991224" cy="5920119"/>
+            </a:xfrm>
+            <a:prstGeom prst="ellipse">
+              <a:avLst/>
+            </a:prstGeom>
+            <a:noFill/>
+            <a:ln w="228600">
+              <a:solidFill>
+                <a:schemeClr val="bg1"/>
+              </a:solidFill>
+            </a:ln>
+            <a:effectLst/>
+          </p:spPr>
+          <p:style>
+            <a:lnRef idx="2">
+              <a:schemeClr val="accent1">
+                <a:shade val="15000"/>
+              </a:schemeClr>
+            </a:lnRef>
+            <a:fillRef idx="1">
+              <a:schemeClr val="accent1"/>
+            </a:fillRef>
+            <a:effectRef idx="0">
+              <a:schemeClr val="accent1"/>
+            </a:effectRef>
+            <a:fontRef idx="minor">
+              <a:schemeClr val="lt1"/>
+            </a:fontRef>
+          </p:style>
+          <p:txBody>
+            <a:bodyPr rtlCol="0" anchor="ctr"/>
+            <a:lstStyle>
+              <a:defPPr>
+                <a:defRPr lang="en-US"/>
+              </a:defPPr>
+              <a:lvl1pPr marL="0" algn="l" defTabSz="914400" rtl="0" eaLnBrk="1" latinLnBrk="0" hangingPunct="1">
+                <a:defRPr sz="1800" kern="1200">
+                  <a:solidFill>
+                    <a:schemeClr val="lt1"/>
+                  </a:solidFill>
+                  <a:latin typeface="+mn-lt"/>
+                  <a:ea typeface="+mn-ea"/>
+                  <a:cs typeface="+mn-cs"/>
+                </a:defRPr>
+              </a:lvl1pPr>
+              <a:lvl2pPr marL="457200" algn="l" defTabSz="914400" rtl="0" eaLnBrk="1" latinLnBrk="0" hangingPunct="1">
+                <a:defRPr sz="1800" kern="1200">
+                  <a:solidFill>
+                    <a:schemeClr val="lt1"/>
+                  </a:solidFill>
+                  <a:latin typeface="+mn-lt"/>
+                  <a:ea typeface="+mn-ea"/>
+                  <a:cs typeface="+mn-cs"/>
+                </a:defRPr>
+              </a:lvl2pPr>
+              <a:lvl3pPr marL="914400" algn="l" defTabSz="914400" rtl="0" eaLnBrk="1" latinLnBrk="0" hangingPunct="1">
+                <a:defRPr sz="1800" kern="1200">
+                  <a:solidFill>
+                    <a:schemeClr val="lt1"/>
+                  </a:solidFill>
+                  <a:latin typeface="+mn-lt"/>
+                  <a:ea typeface="+mn-ea"/>
+                  <a:cs typeface="+mn-cs"/>
+                </a:defRPr>
+              </a:lvl3pPr>
+              <a:lvl4pPr marL="1371600" algn="l" defTabSz="914400" rtl="0" eaLnBrk="1" latinLnBrk="0" hangingPunct="1">
+                <a:defRPr sz="1800" kern="1200">
+                  <a:solidFill>
+                    <a:schemeClr val="lt1"/>
+                  </a:solidFill>
+                  <a:latin typeface="+mn-lt"/>
+                  <a:ea typeface="+mn-ea"/>
+                  <a:cs typeface="+mn-cs"/>
+                </a:defRPr>
+              </a:lvl4pPr>
+              <a:lvl5pPr marL="1828800" algn="l" defTabSz="914400" rtl="0" eaLnBrk="1" latinLnBrk="0" hangingPunct="1">
+                <a:defRPr sz="1800" kern="1200">
+                  <a:solidFill>
+                    <a:schemeClr val="lt1"/>
+                  </a:solidFill>
+                  <a:latin typeface="+mn-lt"/>
+                  <a:ea typeface="+mn-ea"/>
+                  <a:cs typeface="+mn-cs"/>
+                </a:defRPr>
+              </a:lvl5pPr>
+              <a:lvl6pPr marL="2286000" algn="l" defTabSz="914400" rtl="0" eaLnBrk="1" latinLnBrk="0" hangingPunct="1">
+                <a:defRPr sz="1800" kern="1200">
+                  <a:solidFill>
+                    <a:schemeClr val="lt1"/>
+                  </a:solidFill>
+                  <a:latin typeface="+mn-lt"/>
+                  <a:ea typeface="+mn-ea"/>
+                  <a:cs typeface="+mn-cs"/>
+                </a:defRPr>
+              </a:lvl6pPr>
+              <a:lvl7pPr marL="2743200" algn="l" defTabSz="914400" rtl="0" eaLnBrk="1" latinLnBrk="0" hangingPunct="1">
+                <a:defRPr sz="1800" kern="1200">
+                  <a:solidFill>
+                    <a:schemeClr val="lt1"/>
+                  </a:solidFill>
+                  <a:latin typeface="+mn-lt"/>
+                  <a:ea typeface="+mn-ea"/>
+                  <a:cs typeface="+mn-cs"/>
+                </a:defRPr>
+              </a:lvl7pPr>
+              <a:lvl8pPr marL="3200400" algn="l" defTabSz="914400" rtl="0" eaLnBrk="1" latinLnBrk="0" hangingPunct="1">
+                <a:defRPr sz="1800" kern="1200">
+                  <a:solidFill>
+                    <a:schemeClr val="lt1"/>
+                  </a:solidFill>
+                  <a:latin typeface="+mn-lt"/>
+                  <a:ea typeface="+mn-ea"/>
+                  <a:cs typeface="+mn-cs"/>
+                </a:defRPr>
+              </a:lvl8pPr>
+              <a:lvl9pPr marL="3657600" algn="l" defTabSz="914400" rtl="0" eaLnBrk="1" latinLnBrk="0" hangingPunct="1">
+                <a:defRPr sz="1800" kern="1200">
+                  <a:solidFill>
+                    <a:schemeClr val="lt1"/>
+                  </a:solidFill>
+                  <a:latin typeface="+mn-lt"/>
+                  <a:ea typeface="+mn-ea"/>
+                  <a:cs typeface="+mn-cs"/>
+                </a:defRPr>
+              </a:lvl9pPr>
+            </a:lstStyle>
+            <a:p>
+              <a:pPr algn="ctr"/>
+              <a:endParaRPr lang="en-IN" dirty="0">
+                <a:ln w="0"/>
+                <a:solidFill>
+                  <a:schemeClr val="tx1"/>
+                </a:solidFill>
+                <a:effectLst>
+                  <a:outerShdw blurRad="38100" dist="19050" dir="2700000" algn="tl" rotWithShape="0">
+                    <a:schemeClr val="dk1">
+                      <a:alpha val="40000"/>
+                    </a:schemeClr>
+                  </a:outerShdw>
+                </a:effectLst>
+              </a:endParaRPr>
+            </a:p>
+          </p:txBody>
+        </p:sp>
+        <p:sp>
+          <p:nvSpPr>
+            <p:cNvPr id="8" name="Rectangle 4">
+              <a:extLst>
+                <a:ext uri="{FF2B5EF4-FFF2-40B4-BE49-F238E27FC236}">
+                  <a16:creationId xmlns:a16="http://schemas.microsoft.com/office/drawing/2014/main" id="{8F41DCEA-5F8E-94CF-2C3C-6DCFC35DAE63}"/>
+                </a:ext>
+              </a:extLst>
+            </p:cNvPr>
+            <p:cNvSpPr/>
+            <p:nvPr/>
+          </p:nvSpPr>
+          <p:spPr>
+            <a:xfrm rot="19649320">
+              <a:off x="3405706" y="2046187"/>
+              <a:ext cx="487811" cy="4613964"/>
+            </a:xfrm>
+            <a:custGeom>
+              <a:avLst/>
+              <a:gdLst>
+                <a:gd name="connsiteX0" fmla="*/ 0 w 417282"/>
+                <a:gd name="connsiteY0" fmla="*/ 0 h 4119367"/>
+                <a:gd name="connsiteX1" fmla="*/ 417282 w 417282"/>
+                <a:gd name="connsiteY1" fmla="*/ 0 h 4119367"/>
+                <a:gd name="connsiteX2" fmla="*/ 417282 w 417282"/>
+                <a:gd name="connsiteY2" fmla="*/ 4119367 h 4119367"/>
+                <a:gd name="connsiteX3" fmla="*/ 0 w 417282"/>
+                <a:gd name="connsiteY3" fmla="*/ 4119367 h 4119367"/>
+                <a:gd name="connsiteX4" fmla="*/ 0 w 417282"/>
+                <a:gd name="connsiteY4" fmla="*/ 0 h 4119367"/>
+                <a:gd name="connsiteX0" fmla="*/ 0 w 419794"/>
+                <a:gd name="connsiteY0" fmla="*/ 335280 h 4119367"/>
+                <a:gd name="connsiteX1" fmla="*/ 419794 w 419794"/>
+                <a:gd name="connsiteY1" fmla="*/ 0 h 4119367"/>
+                <a:gd name="connsiteX2" fmla="*/ 419794 w 419794"/>
+                <a:gd name="connsiteY2" fmla="*/ 4119367 h 4119367"/>
+                <a:gd name="connsiteX3" fmla="*/ 2512 w 419794"/>
+                <a:gd name="connsiteY3" fmla="*/ 4119367 h 4119367"/>
+                <a:gd name="connsiteX4" fmla="*/ 0 w 419794"/>
+                <a:gd name="connsiteY4" fmla="*/ 335280 h 4119367"/>
+                <a:gd name="connsiteX0" fmla="*/ 0 w 422424"/>
+                <a:gd name="connsiteY0" fmla="*/ 335280 h 4281985"/>
+                <a:gd name="connsiteX1" fmla="*/ 419794 w 422424"/>
+                <a:gd name="connsiteY1" fmla="*/ 0 h 4281985"/>
+                <a:gd name="connsiteX2" fmla="*/ 422424 w 422424"/>
+                <a:gd name="connsiteY2" fmla="*/ 4281985 h 4281985"/>
+                <a:gd name="connsiteX3" fmla="*/ 2512 w 422424"/>
+                <a:gd name="connsiteY3" fmla="*/ 4119367 h 4281985"/>
+                <a:gd name="connsiteX4" fmla="*/ 0 w 422424"/>
+                <a:gd name="connsiteY4" fmla="*/ 335280 h 4281985"/>
+              </a:gdLst>
+              <a:ahLst/>
+              <a:cxnLst>
+                <a:cxn ang="0">
+                  <a:pos x="connsiteX0" y="connsiteY0"/>
+                </a:cxn>
+                <a:cxn ang="0">
+                  <a:pos x="connsiteX1" y="connsiteY1"/>
+                </a:cxn>
+                <a:cxn ang="0">
+                  <a:pos x="connsiteX2" y="connsiteY2"/>
+                </a:cxn>
+                <a:cxn ang="0">
+                  <a:pos x="connsiteX3" y="connsiteY3"/>
+                </a:cxn>
+                <a:cxn ang="0">
+                  <a:pos x="connsiteX4" y="connsiteY4"/>
+                </a:cxn>
+              </a:cxnLst>
+              <a:rect l="l" t="t" r="r" b="b"/>
+              <a:pathLst>
+                <a:path w="422424" h="4281985">
+                  <a:moveTo>
+                    <a:pt x="0" y="335280"/>
+                  </a:moveTo>
+                  <a:lnTo>
+                    <a:pt x="419794" y="0"/>
+                  </a:lnTo>
+                  <a:cubicBezTo>
+                    <a:pt x="420671" y="1427328"/>
+                    <a:pt x="421547" y="2854657"/>
+                    <a:pt x="422424" y="4281985"/>
+                  </a:cubicBezTo>
+                  <a:lnTo>
+                    <a:pt x="2512" y="4119367"/>
+                  </a:lnTo>
+                  <a:cubicBezTo>
+                    <a:pt x="1675" y="2858005"/>
+                    <a:pt x="837" y="1596642"/>
+                    <a:pt x="0" y="335280"/>
+                  </a:cubicBezTo>
+                  <a:close/>
+                </a:path>
+              </a:pathLst>
+            </a:custGeom>
+            <a:solidFill>
+              <a:schemeClr val="bg1"/>
+            </a:solidFill>
+            <a:ln>
+              <a:solidFill>
+                <a:schemeClr val="bg1"/>
+              </a:solidFill>
+            </a:ln>
+          </p:spPr>
+          <p:style>
+            <a:lnRef idx="2">
+              <a:schemeClr val="accent1">
+                <a:shade val="15000"/>
+              </a:schemeClr>
+            </a:lnRef>
+            <a:fillRef idx="1">
+              <a:schemeClr val="accent1"/>
+            </a:fillRef>
+            <a:effectRef idx="0">
+              <a:schemeClr val="accent1"/>
+            </a:effectRef>
+            <a:fontRef idx="minor">
+              <a:schemeClr val="lt1"/>
+            </a:fontRef>
+          </p:style>
+          <p:txBody>
+            <a:bodyPr rtlCol="0" anchor="ctr"/>
+            <a:lstStyle>
+              <a:defPPr>
+                <a:defRPr lang="en-US"/>
+              </a:defPPr>
+              <a:lvl1pPr marL="0" algn="l" defTabSz="914400" rtl="0" eaLnBrk="1" latinLnBrk="0" hangingPunct="1">
+                <a:defRPr sz="1800" kern="1200">
+                  <a:solidFill>
+                    <a:schemeClr val="lt1"/>
+                  </a:solidFill>
+                  <a:latin typeface="+mn-lt"/>
+                  <a:ea typeface="+mn-ea"/>
+                  <a:cs typeface="+mn-cs"/>
+                </a:defRPr>
+              </a:lvl1pPr>
+              <a:lvl2pPr marL="457200" algn="l" defTabSz="914400" rtl="0" eaLnBrk="1" latinLnBrk="0" hangingPunct="1">
+                <a:defRPr sz="1800" kern="1200">
+                  <a:solidFill>
+                    <a:schemeClr val="lt1"/>
+                  </a:solidFill>
+                  <a:latin typeface="+mn-lt"/>
+                  <a:ea typeface="+mn-ea"/>
+                  <a:cs typeface="+mn-cs"/>
+                </a:defRPr>
+              </a:lvl2pPr>
+              <a:lvl3pPr marL="914400" algn="l" defTabSz="914400" rtl="0" eaLnBrk="1" latinLnBrk="0" hangingPunct="1">
+                <a:defRPr sz="1800" kern="1200">
+                  <a:solidFill>
+                    <a:schemeClr val="lt1"/>
+                  </a:solidFill>
+                  <a:latin typeface="+mn-lt"/>
+                  <a:ea typeface="+mn-ea"/>
+                  <a:cs typeface="+mn-cs"/>
+                </a:defRPr>
+              </a:lvl3pPr>
+              <a:lvl4pPr marL="1371600" algn="l" defTabSz="914400" rtl="0" eaLnBrk="1" latinLnBrk="0" hangingPunct="1">
+                <a:defRPr sz="1800" kern="1200">
+                  <a:solidFill>
+                    <a:schemeClr val="lt1"/>
+                  </a:solidFill>
+                  <a:latin typeface="+mn-lt"/>
+                  <a:ea typeface="+mn-ea"/>
+                  <a:cs typeface="+mn-cs"/>
+                </a:defRPr>
+              </a:lvl4pPr>
+              <a:lvl5pPr marL="1828800" algn="l" defTabSz="914400" rtl="0" eaLnBrk="1" latinLnBrk="0" hangingPunct="1">
+                <a:defRPr sz="1800" kern="1200">
+                  <a:solidFill>
+                    <a:schemeClr val="lt1"/>
+                  </a:solidFill>
+                  <a:latin typeface="+mn-lt"/>
+                  <a:ea typeface="+mn-ea"/>
+                  <a:cs typeface="+mn-cs"/>
+                </a:defRPr>
+              </a:lvl5pPr>
+              <a:lvl6pPr marL="2286000" algn="l" defTabSz="914400" rtl="0" eaLnBrk="1" latinLnBrk="0" hangingPunct="1">
+                <a:defRPr sz="1800" kern="1200">
+                  <a:solidFill>
+                    <a:schemeClr val="lt1"/>
+                  </a:solidFill>
+                  <a:latin typeface="+mn-lt"/>
+                  <a:ea typeface="+mn-ea"/>
+                  <a:cs typeface="+mn-cs"/>
+                </a:defRPr>
+              </a:lvl6pPr>
+              <a:lvl7pPr marL="2743200" algn="l" defTabSz="914400" rtl="0" eaLnBrk="1" latinLnBrk="0" hangingPunct="1">
+                <a:defRPr sz="1800" kern="1200">
+                  <a:solidFill>
+                    <a:schemeClr val="lt1"/>
+                  </a:solidFill>
+                  <a:latin typeface="+mn-lt"/>
+                  <a:ea typeface="+mn-ea"/>
+                  <a:cs typeface="+mn-cs"/>
+                </a:defRPr>
+              </a:lvl7pPr>
+              <a:lvl8pPr marL="3200400" algn="l" defTabSz="914400" rtl="0" eaLnBrk="1" latinLnBrk="0" hangingPunct="1">
+                <a:defRPr sz="1800" kern="1200">
+                  <a:solidFill>
+                    <a:schemeClr val="lt1"/>
+                  </a:solidFill>
+                  <a:latin typeface="+mn-lt"/>
+                  <a:ea typeface="+mn-ea"/>
+                  <a:cs typeface="+mn-cs"/>
+                </a:defRPr>
+              </a:lvl8pPr>
+              <a:lvl9pPr marL="3657600" algn="l" defTabSz="914400" rtl="0" eaLnBrk="1" latinLnBrk="0" hangingPunct="1">
+                <a:defRPr sz="1800" kern="1200">
+                  <a:solidFill>
+                    <a:schemeClr val="lt1"/>
+                  </a:solidFill>
+                  <a:latin typeface="+mn-lt"/>
+                  <a:ea typeface="+mn-ea"/>
+                  <a:cs typeface="+mn-cs"/>
+                </a:defRPr>
+              </a:lvl9pPr>
+            </a:lstStyle>
+            <a:p>
+              <a:pPr algn="ctr"/>
+              <a:endParaRPr lang="en-IN" dirty="0"/>
+            </a:p>
+          </p:txBody>
+        </p:sp>
+        <p:sp>
+          <p:nvSpPr>
+            <p:cNvPr id="10" name="Rectangle 4">
+              <a:extLst>
+                <a:ext uri="{FF2B5EF4-FFF2-40B4-BE49-F238E27FC236}">
+                  <a16:creationId xmlns:a16="http://schemas.microsoft.com/office/drawing/2014/main" id="{E51A5B58-85C1-7270-059D-4C17EB8D2B6F}"/>
+                </a:ext>
+              </a:extLst>
+            </p:cNvPr>
+            <p:cNvSpPr/>
+            <p:nvPr/>
+          </p:nvSpPr>
+          <p:spPr>
+            <a:xfrm rot="19649320">
+              <a:off x="3943890" y="1343340"/>
+              <a:ext cx="477199" cy="5381310"/>
+            </a:xfrm>
+            <a:custGeom>
+              <a:avLst/>
+              <a:gdLst>
+                <a:gd name="connsiteX0" fmla="*/ 0 w 417282"/>
+                <a:gd name="connsiteY0" fmla="*/ 0 h 4119367"/>
+                <a:gd name="connsiteX1" fmla="*/ 417282 w 417282"/>
+                <a:gd name="connsiteY1" fmla="*/ 0 h 4119367"/>
+                <a:gd name="connsiteX2" fmla="*/ 417282 w 417282"/>
+                <a:gd name="connsiteY2" fmla="*/ 4119367 h 4119367"/>
+                <a:gd name="connsiteX3" fmla="*/ 0 w 417282"/>
+                <a:gd name="connsiteY3" fmla="*/ 4119367 h 4119367"/>
+                <a:gd name="connsiteX4" fmla="*/ 0 w 417282"/>
+                <a:gd name="connsiteY4" fmla="*/ 0 h 4119367"/>
+                <a:gd name="connsiteX0" fmla="*/ 0 w 419794"/>
+                <a:gd name="connsiteY0" fmla="*/ 335280 h 4119367"/>
+                <a:gd name="connsiteX1" fmla="*/ 419794 w 419794"/>
+                <a:gd name="connsiteY1" fmla="*/ 0 h 4119367"/>
+                <a:gd name="connsiteX2" fmla="*/ 419794 w 419794"/>
+                <a:gd name="connsiteY2" fmla="*/ 4119367 h 4119367"/>
+                <a:gd name="connsiteX3" fmla="*/ 2512 w 419794"/>
+                <a:gd name="connsiteY3" fmla="*/ 4119367 h 4119367"/>
+                <a:gd name="connsiteX4" fmla="*/ 0 w 419794"/>
+                <a:gd name="connsiteY4" fmla="*/ 335280 h 4119367"/>
+                <a:gd name="connsiteX0" fmla="*/ 0 w 422424"/>
+                <a:gd name="connsiteY0" fmla="*/ 335280 h 4281985"/>
+                <a:gd name="connsiteX1" fmla="*/ 419794 w 422424"/>
+                <a:gd name="connsiteY1" fmla="*/ 0 h 4281985"/>
+                <a:gd name="connsiteX2" fmla="*/ 422424 w 422424"/>
+                <a:gd name="connsiteY2" fmla="*/ 4281985 h 4281985"/>
+                <a:gd name="connsiteX3" fmla="*/ 2512 w 422424"/>
+                <a:gd name="connsiteY3" fmla="*/ 4119367 h 4281985"/>
+                <a:gd name="connsiteX4" fmla="*/ 0 w 422424"/>
+                <a:gd name="connsiteY4" fmla="*/ 335280 h 4281985"/>
+              </a:gdLst>
+              <a:ahLst/>
+              <a:cxnLst>
+                <a:cxn ang="0">
+                  <a:pos x="connsiteX0" y="connsiteY0"/>
+                </a:cxn>
+                <a:cxn ang="0">
+                  <a:pos x="connsiteX1" y="connsiteY1"/>
+                </a:cxn>
+                <a:cxn ang="0">
+                  <a:pos x="connsiteX2" y="connsiteY2"/>
+                </a:cxn>
+                <a:cxn ang="0">
+                  <a:pos x="connsiteX3" y="connsiteY3"/>
+                </a:cxn>
+                <a:cxn ang="0">
+                  <a:pos x="connsiteX4" y="connsiteY4"/>
+                </a:cxn>
+              </a:cxnLst>
+              <a:rect l="l" t="t" r="r" b="b"/>
+              <a:pathLst>
+                <a:path w="422424" h="4281985">
+                  <a:moveTo>
+                    <a:pt x="0" y="335280"/>
+                  </a:moveTo>
+                  <a:lnTo>
+                    <a:pt x="419794" y="0"/>
+                  </a:lnTo>
+                  <a:cubicBezTo>
+                    <a:pt x="420671" y="1427328"/>
+                    <a:pt x="421547" y="2854657"/>
+                    <a:pt x="422424" y="4281985"/>
+                  </a:cubicBezTo>
+                  <a:lnTo>
+                    <a:pt x="2512" y="4119367"/>
+                  </a:lnTo>
+                  <a:cubicBezTo>
+                    <a:pt x="1675" y="2858005"/>
+                    <a:pt x="837" y="1596642"/>
+                    <a:pt x="0" y="335280"/>
+                  </a:cubicBezTo>
+                  <a:close/>
+                </a:path>
+              </a:pathLst>
+            </a:custGeom>
+            <a:solidFill>
+              <a:schemeClr val="bg1"/>
+            </a:solidFill>
+            <a:ln>
+              <a:solidFill>
+                <a:schemeClr val="bg1"/>
+              </a:solidFill>
+            </a:ln>
+          </p:spPr>
+          <p:style>
+            <a:lnRef idx="2">
+              <a:schemeClr val="accent1">
+                <a:shade val="15000"/>
+              </a:schemeClr>
+            </a:lnRef>
+            <a:fillRef idx="1">
+              <a:schemeClr val="accent1"/>
+            </a:fillRef>
+            <a:effectRef idx="0">
+              <a:schemeClr val="accent1"/>
+            </a:effectRef>
+            <a:fontRef idx="minor">
+              <a:schemeClr val="lt1"/>
+            </a:fontRef>
+          </p:style>
+          <p:txBody>
+            <a:bodyPr rtlCol="0" anchor="ctr"/>
+            <a:lstStyle>
+              <a:defPPr>
+                <a:defRPr lang="en-US"/>
+              </a:defPPr>
+              <a:lvl1pPr marL="0" algn="l" defTabSz="914400" rtl="0" eaLnBrk="1" latinLnBrk="0" hangingPunct="1">
+                <a:defRPr sz="1800" kern="1200">
+                  <a:solidFill>
+                    <a:schemeClr val="lt1"/>
+                  </a:solidFill>
+                  <a:latin typeface="+mn-lt"/>
+                  <a:ea typeface="+mn-ea"/>
+                  <a:cs typeface="+mn-cs"/>
+                </a:defRPr>
+              </a:lvl1pPr>
+              <a:lvl2pPr marL="457200" algn="l" defTabSz="914400" rtl="0" eaLnBrk="1" latinLnBrk="0" hangingPunct="1">
+                <a:defRPr sz="1800" kern="1200">
+                  <a:solidFill>
+                    <a:schemeClr val="lt1"/>
+                  </a:solidFill>
+                  <a:latin typeface="+mn-lt"/>
+                  <a:ea typeface="+mn-ea"/>
+                  <a:cs typeface="+mn-cs"/>
+                </a:defRPr>
+              </a:lvl2pPr>
+              <a:lvl3pPr marL="914400" algn="l" defTabSz="914400" rtl="0" eaLnBrk="1" latinLnBrk="0" hangingPunct="1">
+                <a:defRPr sz="1800" kern="1200">
+                  <a:solidFill>
+                    <a:schemeClr val="lt1"/>
+                  </a:solidFill>
+                  <a:latin typeface="+mn-lt"/>
+                  <a:ea typeface="+mn-ea"/>
+                  <a:cs typeface="+mn-cs"/>
+                </a:defRPr>
+              </a:lvl3pPr>
+              <a:lvl4pPr marL="1371600" algn="l" defTabSz="914400" rtl="0" eaLnBrk="1" latinLnBrk="0" hangingPunct="1">
+                <a:defRPr sz="1800" kern="1200">
+                  <a:solidFill>
+                    <a:schemeClr val="lt1"/>
+                  </a:solidFill>
+                  <a:latin typeface="+mn-lt"/>
+                  <a:ea typeface="+mn-ea"/>
+                  <a:cs typeface="+mn-cs"/>
+                </a:defRPr>
+              </a:lvl4pPr>
+              <a:lvl5pPr marL="1828800" algn="l" defTabSz="914400" rtl="0" eaLnBrk="1" latinLnBrk="0" hangingPunct="1">
+                <a:defRPr sz="1800" kern="1200">
+                  <a:solidFill>
+                    <a:schemeClr val="lt1"/>
+                  </a:solidFill>
+                  <a:latin typeface="+mn-lt"/>
+                  <a:ea typeface="+mn-ea"/>
+                  <a:cs typeface="+mn-cs"/>
+                </a:defRPr>
+              </a:lvl5pPr>
+              <a:lvl6pPr marL="2286000" algn="l" defTabSz="914400" rtl="0" eaLnBrk="1" latinLnBrk="0" hangingPunct="1">
+                <a:defRPr sz="1800" kern="1200">
+                  <a:solidFill>
+                    <a:schemeClr val="lt1"/>
+                  </a:solidFill>
+                  <a:latin typeface="+mn-lt"/>
+                  <a:ea typeface="+mn-ea"/>
+                  <a:cs typeface="+mn-cs"/>
+                </a:defRPr>
+              </a:lvl6pPr>
+              <a:lvl7pPr marL="2743200" algn="l" defTabSz="914400" rtl="0" eaLnBrk="1" latinLnBrk="0" hangingPunct="1">
+                <a:defRPr sz="1800" kern="1200">
+                  <a:solidFill>
+                    <a:schemeClr val="lt1"/>
+                  </a:solidFill>
+                  <a:latin typeface="+mn-lt"/>
+                  <a:ea typeface="+mn-ea"/>
+                  <a:cs typeface="+mn-cs"/>
+                </a:defRPr>
+              </a:lvl7pPr>
+              <a:lvl8pPr marL="3200400" algn="l" defTabSz="914400" rtl="0" eaLnBrk="1" latinLnBrk="0" hangingPunct="1">
+                <a:defRPr sz="1800" kern="1200">
+                  <a:solidFill>
+                    <a:schemeClr val="lt1"/>
+                  </a:solidFill>
+                  <a:latin typeface="+mn-lt"/>
+                  <a:ea typeface="+mn-ea"/>
+                  <a:cs typeface="+mn-cs"/>
+                </a:defRPr>
+              </a:lvl8pPr>
+              <a:lvl9pPr marL="3657600" algn="l" defTabSz="914400" rtl="0" eaLnBrk="1" latinLnBrk="0" hangingPunct="1">
+                <a:defRPr sz="1800" kern="1200">
+                  <a:solidFill>
+                    <a:schemeClr val="lt1"/>
+                  </a:solidFill>
+                  <a:latin typeface="+mn-lt"/>
+                  <a:ea typeface="+mn-ea"/>
+                  <a:cs typeface="+mn-cs"/>
+                </a:defRPr>
+              </a:lvl9pPr>
+            </a:lstStyle>
+            <a:p>
+              <a:pPr algn="ctr"/>
+              <a:endParaRPr lang="en-IN" dirty="0"/>
+            </a:p>
+          </p:txBody>
+        </p:sp>
+        <p:sp>
+          <p:nvSpPr>
+            <p:cNvPr id="11" name="Freeform: Shape 10">
+              <a:extLst>
+                <a:ext uri="{FF2B5EF4-FFF2-40B4-BE49-F238E27FC236}">
+                  <a16:creationId xmlns:a16="http://schemas.microsoft.com/office/drawing/2014/main" id="{563EE6A8-81BC-AC9F-716A-6DB18CCA5934}"/>
+                </a:ext>
+              </a:extLst>
+            </p:cNvPr>
+            <p:cNvSpPr/>
+            <p:nvPr/>
+          </p:nvSpPr>
+          <p:spPr>
+            <a:xfrm rot="15999561">
+              <a:off x="4370385" y="2332037"/>
+              <a:ext cx="4604324" cy="3238237"/>
+            </a:xfrm>
+            <a:custGeom>
+              <a:avLst/>
+              <a:gdLst>
+                <a:gd name="connsiteX0" fmla="*/ 1748927 w 5059656"/>
+                <a:gd name="connsiteY0" fmla="*/ 1170842 h 3516241"/>
+                <a:gd name="connsiteX1" fmla="*/ 1685465 w 5059656"/>
+                <a:gd name="connsiteY1" fmla="*/ 1260604 h 3516241"/>
+                <a:gd name="connsiteX2" fmla="*/ 1573064 w 5059656"/>
+                <a:gd name="connsiteY2" fmla="*/ 1479631 h 3516241"/>
+                <a:gd name="connsiteX3" fmla="*/ 1525632 w 5059656"/>
+                <a:gd name="connsiteY3" fmla="*/ 1641246 h 3516241"/>
+                <a:gd name="connsiteX4" fmla="*/ 88642 w 5059656"/>
+                <a:gd name="connsiteY4" fmla="*/ 679328 h 3516241"/>
+                <a:gd name="connsiteX5" fmla="*/ 0 w 5059656"/>
+                <a:gd name="connsiteY5" fmla="*/ 0 h 3516241"/>
+                <a:gd name="connsiteX6" fmla="*/ 1918153 w 5059656"/>
+                <a:gd name="connsiteY6" fmla="*/ 3270953 h 3516241"/>
+                <a:gd name="connsiteX7" fmla="*/ 1477261 w 5059656"/>
+                <a:gd name="connsiteY7" fmla="*/ 3270953 h 3516241"/>
+                <a:gd name="connsiteX8" fmla="*/ 1477261 w 5059656"/>
+                <a:gd name="connsiteY8" fmla="*/ 1981532 h 3516241"/>
+                <a:gd name="connsiteX9" fmla="*/ 1502029 w 5059656"/>
+                <a:gd name="connsiteY9" fmla="*/ 1721668 h 3516241"/>
+                <a:gd name="connsiteX10" fmla="*/ 1525632 w 5059656"/>
+                <a:gd name="connsiteY10" fmla="*/ 1641246 h 3516241"/>
+                <a:gd name="connsiteX11" fmla="*/ 1928174 w 5059656"/>
+                <a:gd name="connsiteY11" fmla="*/ 1910707 h 3516241"/>
+                <a:gd name="connsiteX12" fmla="*/ 1918153 w 5059656"/>
+                <a:gd name="connsiteY12" fmla="*/ 2015844 h 3516241"/>
+                <a:gd name="connsiteX13" fmla="*/ 4702667 w 5059656"/>
+                <a:gd name="connsiteY13" fmla="*/ 3270953 h 3516241"/>
+                <a:gd name="connsiteX14" fmla="*/ 4326652 w 5059656"/>
+                <a:gd name="connsiteY14" fmla="*/ 3516241 h 3516241"/>
+                <a:gd name="connsiteX15" fmla="*/ 1928174 w 5059656"/>
+                <a:gd name="connsiteY15" fmla="*/ 1910707 h 3516241"/>
+                <a:gd name="connsiteX16" fmla="*/ 1935819 w 5059656"/>
+                <a:gd name="connsiteY16" fmla="*/ 1830498 h 3516241"/>
+                <a:gd name="connsiteX17" fmla="*/ 2066653 w 5059656"/>
+                <a:gd name="connsiteY17" fmla="*/ 1501647 h 3516241"/>
+                <a:gd name="connsiteX18" fmla="*/ 2127174 w 5059656"/>
+                <a:gd name="connsiteY18" fmla="*/ 1424064 h 3516241"/>
+                <a:gd name="connsiteX19" fmla="*/ 4618764 w 5059656"/>
+                <a:gd name="connsiteY19" fmla="*/ 3092092 h 3516241"/>
+                <a:gd name="connsiteX20" fmla="*/ 4618764 w 5059656"/>
+                <a:gd name="connsiteY20" fmla="*/ 3270953 h 3516241"/>
+                <a:gd name="connsiteX21" fmla="*/ 5059655 w 5059656"/>
+                <a:gd name="connsiteY21" fmla="*/ 3270953 h 3516241"/>
+                <a:gd name="connsiteX22" fmla="*/ 4702667 w 5059656"/>
+                <a:gd name="connsiteY22" fmla="*/ 3270953 h 3516241"/>
+                <a:gd name="connsiteX23" fmla="*/ 4795488 w 5059656"/>
+                <a:gd name="connsiteY23" fmla="*/ 3210402 h 3516241"/>
+                <a:gd name="connsiteX24" fmla="*/ 4618764 w 5059656"/>
+                <a:gd name="connsiteY24" fmla="*/ 3092092 h 3516241"/>
+                <a:gd name="connsiteX25" fmla="*/ 4618764 w 5059656"/>
+                <a:gd name="connsiteY25" fmla="*/ 2015844 h 3516241"/>
+                <a:gd name="connsiteX26" fmla="*/ 3749246 w 5059656"/>
+                <a:gd name="connsiteY26" fmla="*/ 1096172 h 3516241"/>
+                <a:gd name="connsiteX27" fmla="*/ 2787672 w 5059656"/>
+                <a:gd name="connsiteY27" fmla="*/ 1096172 h 3516241"/>
+                <a:gd name="connsiteX28" fmla="*/ 2172829 w 5059656"/>
+                <a:gd name="connsiteY28" fmla="*/ 1365537 h 3516241"/>
+                <a:gd name="connsiteX29" fmla="*/ 2127174 w 5059656"/>
+                <a:gd name="connsiteY29" fmla="*/ 1424064 h 3516241"/>
+                <a:gd name="connsiteX30" fmla="*/ 1748927 w 5059656"/>
+                <a:gd name="connsiteY30" fmla="*/ 1170842 h 3516241"/>
+                <a:gd name="connsiteX31" fmla="*/ 1755645 w 5059656"/>
+                <a:gd name="connsiteY31" fmla="*/ 1161340 h 3516241"/>
+                <a:gd name="connsiteX32" fmla="*/ 2696365 w 5059656"/>
+                <a:gd name="connsiteY32" fmla="*/ 692110 h 3516241"/>
+                <a:gd name="connsiteX33" fmla="*/ 3840552 w 5059656"/>
+                <a:gd name="connsiteY33" fmla="*/ 692110 h 3516241"/>
+                <a:gd name="connsiteX34" fmla="*/ 5059656 w 5059656"/>
+                <a:gd name="connsiteY34" fmla="*/ 1981532 h 3516241"/>
+                <a:gd name="connsiteX35" fmla="*/ 5059655 w 5059656"/>
+                <a:gd name="connsiteY35" fmla="*/ 3270953 h 3516241"/>
+              </a:gdLst>
+              <a:ahLst/>
+              <a:cxnLst>
+                <a:cxn ang="0">
+                  <a:pos x="connsiteX0" y="connsiteY0"/>
+                </a:cxn>
+                <a:cxn ang="0">
+                  <a:pos x="connsiteX1" y="connsiteY1"/>
+                </a:cxn>
+                <a:cxn ang="0">
+                  <a:pos x="connsiteX2" y="connsiteY2"/>
+                </a:cxn>
+                <a:cxn ang="0">
+                  <a:pos x="connsiteX3" y="connsiteY3"/>
+                </a:cxn>
+                <a:cxn ang="0">
+                  <a:pos x="connsiteX4" y="connsiteY4"/>
+                </a:cxn>
+                <a:cxn ang="0">
+                  <a:pos x="connsiteX5" y="connsiteY5"/>
+                </a:cxn>
+                <a:cxn ang="0">
+                  <a:pos x="connsiteX6" y="connsiteY6"/>
+                </a:cxn>
+                <a:cxn ang="0">
+                  <a:pos x="connsiteX7" y="connsiteY7"/>
+                </a:cxn>
+                <a:cxn ang="0">
+                  <a:pos x="connsiteX8" y="connsiteY8"/>
+                </a:cxn>
+                <a:cxn ang="0">
+                  <a:pos x="connsiteX9" y="connsiteY9"/>
+                </a:cxn>
+                <a:cxn ang="0">
+                  <a:pos x="connsiteX10" y="connsiteY10"/>
+                </a:cxn>
+                <a:cxn ang="0">
+                  <a:pos x="connsiteX11" y="connsiteY11"/>
+                </a:cxn>
+                <a:cxn ang="0">
+                  <a:pos x="connsiteX12" y="connsiteY12"/>
+                </a:cxn>
+                <a:cxn ang="0">
+                  <a:pos x="connsiteX13" y="connsiteY13"/>
+                </a:cxn>
+                <a:cxn ang="0">
+                  <a:pos x="connsiteX14" y="connsiteY14"/>
+                </a:cxn>
+                <a:cxn ang="0">
+                  <a:pos x="connsiteX15" y="connsiteY15"/>
+                </a:cxn>
+                <a:cxn ang="0">
+                  <a:pos x="connsiteX16" y="connsiteY16"/>
+                </a:cxn>
+                <a:cxn ang="0">
+                  <a:pos x="connsiteX17" y="connsiteY17"/>
+                </a:cxn>
+                <a:cxn ang="0">
+                  <a:pos x="connsiteX18" y="connsiteY18"/>
+                </a:cxn>
+                <a:cxn ang="0">
+                  <a:pos x="connsiteX19" y="connsiteY19"/>
+                </a:cxn>
+                <a:cxn ang="0">
+                  <a:pos x="connsiteX20" y="connsiteY20"/>
+                </a:cxn>
+                <a:cxn ang="0">
+                  <a:pos x="connsiteX21" y="connsiteY21"/>
+                </a:cxn>
+                <a:cxn ang="0">
+                  <a:pos x="connsiteX22" y="connsiteY22"/>
+                </a:cxn>
+                <a:cxn ang="0">
+                  <a:pos x="connsiteX23" y="connsiteY23"/>
+                </a:cxn>
+                <a:cxn ang="0">
+                  <a:pos x="connsiteX24" y="connsiteY24"/>
+                </a:cxn>
+                <a:cxn ang="0">
+                  <a:pos x="connsiteX25" y="connsiteY25"/>
+                </a:cxn>
+                <a:cxn ang="0">
+                  <a:pos x="connsiteX26" y="connsiteY26"/>
+                </a:cxn>
+                <a:cxn ang="0">
+                  <a:pos x="connsiteX27" y="connsiteY27"/>
+                </a:cxn>
+                <a:cxn ang="0">
+                  <a:pos x="connsiteX28" y="connsiteY28"/>
+                </a:cxn>
+                <a:cxn ang="0">
+                  <a:pos x="connsiteX29" y="connsiteY29"/>
+                </a:cxn>
+                <a:cxn ang="0">
+                  <a:pos x="connsiteX30" y="connsiteY30"/>
+                </a:cxn>
+                <a:cxn ang="0">
+                  <a:pos x="connsiteX31" y="connsiteY31"/>
+                </a:cxn>
+                <a:cxn ang="0">
+                  <a:pos x="connsiteX32" y="connsiteY32"/>
+                </a:cxn>
+                <a:cxn ang="0">
+                  <a:pos x="connsiteX33" y="connsiteY33"/>
+                </a:cxn>
+                <a:cxn ang="0">
+                  <a:pos x="connsiteX34" y="connsiteY34"/>
+                </a:cxn>
+                <a:cxn ang="0">
+                  <a:pos x="connsiteX35" y="connsiteY35"/>
+                </a:cxn>
+              </a:cxnLst>
+              <a:rect l="l" t="t" r="r" b="b"/>
+              <a:pathLst>
+                <a:path w="5059656" h="3516241">
+                  <a:moveTo>
+                    <a:pt x="1748927" y="1170842"/>
+                  </a:moveTo>
+                  <a:lnTo>
+                    <a:pt x="1685465" y="1260604"/>
+                  </a:lnTo>
+                  <a:cubicBezTo>
+                    <a:pt x="1641649" y="1329202"/>
+                    <a:pt x="1603910" y="1402498"/>
+                    <a:pt x="1573064" y="1479631"/>
+                  </a:cubicBezTo>
+                  <a:lnTo>
+                    <a:pt x="1525632" y="1641246"/>
+                  </a:lnTo>
+                  <a:lnTo>
+                    <a:pt x="88642" y="679328"/>
+                  </a:lnTo>
+                  <a:lnTo>
+                    <a:pt x="0" y="0"/>
+                  </a:lnTo>
+                  <a:close/>
+                  <a:moveTo>
+                    <a:pt x="1918153" y="3270953"/>
+                  </a:moveTo>
+                  <a:lnTo>
+                    <a:pt x="1477261" y="3270953"/>
+                  </a:lnTo>
+                  <a:lnTo>
+                    <a:pt x="1477261" y="1981532"/>
+                  </a:lnTo>
+                  <a:cubicBezTo>
+                    <a:pt x="1477261" y="1892516"/>
+                    <a:pt x="1485789" y="1805607"/>
+                    <a:pt x="1502029" y="1721668"/>
+                  </a:cubicBezTo>
+                  <a:lnTo>
+                    <a:pt x="1525632" y="1641246"/>
+                  </a:lnTo>
+                  <a:lnTo>
+                    <a:pt x="1928174" y="1910707"/>
+                  </a:lnTo>
+                  <a:lnTo>
+                    <a:pt x="1918153" y="2015844"/>
+                  </a:lnTo>
+                  <a:close/>
+                  <a:moveTo>
+                    <a:pt x="4702667" y="3270953"/>
+                  </a:moveTo>
+                  <a:lnTo>
+                    <a:pt x="4326652" y="3516241"/>
+                  </a:lnTo>
+                  <a:lnTo>
+                    <a:pt x="1928174" y="1910707"/>
+                  </a:lnTo>
+                  <a:lnTo>
+                    <a:pt x="1935819" y="1830498"/>
+                  </a:lnTo>
+                  <a:cubicBezTo>
+                    <a:pt x="1958984" y="1710761"/>
+                    <a:pt x="2004150" y="1599500"/>
+                    <a:pt x="2066653" y="1501647"/>
+                  </a:cubicBezTo>
+                  <a:lnTo>
+                    <a:pt x="2127174" y="1424064"/>
+                  </a:lnTo>
+                  <a:lnTo>
+                    <a:pt x="4618764" y="3092092"/>
+                  </a:lnTo>
+                  <a:lnTo>
+                    <a:pt x="4618764" y="3270953"/>
+                  </a:lnTo>
+                  <a:close/>
+                  <a:moveTo>
+                    <a:pt x="5059655" y="3270953"/>
+                  </a:moveTo>
+                  <a:lnTo>
+                    <a:pt x="4702667" y="3270953"/>
+                  </a:lnTo>
+                  <a:lnTo>
+                    <a:pt x="4795488" y="3210402"/>
+                  </a:lnTo>
+                  <a:lnTo>
+                    <a:pt x="4618764" y="3092092"/>
+                  </a:lnTo>
+                  <a:lnTo>
+                    <a:pt x="4618764" y="2015844"/>
+                  </a:lnTo>
+                  <a:cubicBezTo>
+                    <a:pt x="4618764" y="1507923"/>
+                    <a:pt x="4229468" y="1096172"/>
+                    <a:pt x="3749246" y="1096172"/>
+                  </a:cubicBezTo>
+                  <a:lnTo>
+                    <a:pt x="2787672" y="1096172"/>
+                  </a:lnTo>
+                  <a:cubicBezTo>
+                    <a:pt x="2547560" y="1096172"/>
+                    <a:pt x="2330181" y="1199110"/>
+                    <a:pt x="2172829" y="1365537"/>
+                  </a:cubicBezTo>
+                  <a:lnTo>
+                    <a:pt x="2127174" y="1424064"/>
+                  </a:lnTo>
+                  <a:lnTo>
+                    <a:pt x="1748927" y="1170842"/>
+                  </a:lnTo>
+                  <a:lnTo>
+                    <a:pt x="1755645" y="1161340"/>
+                  </a:lnTo>
+                  <a:cubicBezTo>
+                    <a:pt x="1979247" y="874769"/>
+                    <a:pt x="2317638" y="692110"/>
+                    <a:pt x="2696365" y="692110"/>
+                  </a:cubicBezTo>
+                  <a:lnTo>
+                    <a:pt x="3840552" y="692110"/>
+                  </a:lnTo>
+                  <a:cubicBezTo>
+                    <a:pt x="4513844" y="692110"/>
+                    <a:pt x="5059656" y="1269404"/>
+                    <a:pt x="5059656" y="1981532"/>
+                  </a:cubicBezTo>
+                  <a:cubicBezTo>
+                    <a:pt x="5059656" y="2411339"/>
+                    <a:pt x="5059655" y="2841146"/>
+                    <a:pt x="5059655" y="3270953"/>
+                  </a:cubicBezTo>
+                  <a:close/>
+                </a:path>
+              </a:pathLst>
+            </a:custGeom>
+            <a:solidFill>
+              <a:schemeClr val="bg1"/>
+            </a:solidFill>
+            <a:ln>
+              <a:solidFill>
+                <a:schemeClr val="bg1"/>
+              </a:solidFill>
+            </a:ln>
+          </p:spPr>
+          <p:style>
+            <a:lnRef idx="2">
+              <a:schemeClr val="accent1">
+                <a:shade val="15000"/>
+              </a:schemeClr>
+            </a:lnRef>
+            <a:fillRef idx="1">
+              <a:schemeClr val="accent1"/>
+            </a:fillRef>
+            <a:effectRef idx="0">
+              <a:schemeClr val="accent1"/>
+            </a:effectRef>
+            <a:fontRef idx="minor">
+              <a:schemeClr val="lt1"/>
+            </a:fontRef>
+          </p:style>
+          <p:txBody>
+            <a:bodyPr wrap="square" rtlCol="0" anchor="ctr">
+              <a:noAutofit/>
+            </a:bodyPr>
+            <a:lstStyle>
+              <a:defPPr>
+                <a:defRPr lang="en-US"/>
+              </a:defPPr>
+              <a:lvl1pPr marL="0" algn="l" defTabSz="914400" rtl="0" eaLnBrk="1" latinLnBrk="0" hangingPunct="1">
+                <a:defRPr sz="1800" kern="1200">
+                  <a:solidFill>
+                    <a:schemeClr val="lt1"/>
+                  </a:solidFill>
+                  <a:latin typeface="+mn-lt"/>
+                  <a:ea typeface="+mn-ea"/>
+                  <a:cs typeface="+mn-cs"/>
+                </a:defRPr>
+              </a:lvl1pPr>
+              <a:lvl2pPr marL="457200" algn="l" defTabSz="914400" rtl="0" eaLnBrk="1" latinLnBrk="0" hangingPunct="1">
+                <a:defRPr sz="1800" kern="1200">
+                  <a:solidFill>
+                    <a:schemeClr val="lt1"/>
+                  </a:solidFill>
+                  <a:latin typeface="+mn-lt"/>
+                  <a:ea typeface="+mn-ea"/>
+                  <a:cs typeface="+mn-cs"/>
+                </a:defRPr>
+              </a:lvl2pPr>
+              <a:lvl3pPr marL="914400" algn="l" defTabSz="914400" rtl="0" eaLnBrk="1" latinLnBrk="0" hangingPunct="1">
+                <a:defRPr sz="1800" kern="1200">
+                  <a:solidFill>
+                    <a:schemeClr val="lt1"/>
+                  </a:solidFill>
+                  <a:latin typeface="+mn-lt"/>
+                  <a:ea typeface="+mn-ea"/>
+                  <a:cs typeface="+mn-cs"/>
+                </a:defRPr>
+              </a:lvl3pPr>
+              <a:lvl4pPr marL="1371600" algn="l" defTabSz="914400" rtl="0" eaLnBrk="1" latinLnBrk="0" hangingPunct="1">
+                <a:defRPr sz="1800" kern="1200">
+                  <a:solidFill>
+                    <a:schemeClr val="lt1"/>
+                  </a:solidFill>
+                  <a:latin typeface="+mn-lt"/>
+                  <a:ea typeface="+mn-ea"/>
+                  <a:cs typeface="+mn-cs"/>
+                </a:defRPr>
+              </a:lvl4pPr>
+              <a:lvl5pPr marL="1828800" algn="l" defTabSz="914400" rtl="0" eaLnBrk="1" latinLnBrk="0" hangingPunct="1">
+                <a:defRPr sz="1800" kern="1200">
+                  <a:solidFill>
+                    <a:schemeClr val="lt1"/>
+                  </a:solidFill>
+                  <a:latin typeface="+mn-lt"/>
+                  <a:ea typeface="+mn-ea"/>
+                  <a:cs typeface="+mn-cs"/>
+                </a:defRPr>
+              </a:lvl5pPr>
+              <a:lvl6pPr marL="2286000" algn="l" defTabSz="914400" rtl="0" eaLnBrk="1" latinLnBrk="0" hangingPunct="1">
+                <a:defRPr sz="1800" kern="1200">
+                  <a:solidFill>
+                    <a:schemeClr val="lt1"/>
+                  </a:solidFill>
+                  <a:latin typeface="+mn-lt"/>
+                  <a:ea typeface="+mn-ea"/>
+                  <a:cs typeface="+mn-cs"/>
+                </a:defRPr>
+              </a:lvl6pPr>
+              <a:lvl7pPr marL="2743200" algn="l" defTabSz="914400" rtl="0" eaLnBrk="1" latinLnBrk="0" hangingPunct="1">
+                <a:defRPr sz="1800" kern="1200">
+                  <a:solidFill>
+                    <a:schemeClr val="lt1"/>
+                  </a:solidFill>
+                  <a:latin typeface="+mn-lt"/>
+                  <a:ea typeface="+mn-ea"/>
+                  <a:cs typeface="+mn-cs"/>
+                </a:defRPr>
+              </a:lvl7pPr>
+              <a:lvl8pPr marL="3200400" algn="l" defTabSz="914400" rtl="0" eaLnBrk="1" latinLnBrk="0" hangingPunct="1">
+                <a:defRPr sz="1800" kern="1200">
+                  <a:solidFill>
+                    <a:schemeClr val="lt1"/>
+                  </a:solidFill>
+                  <a:latin typeface="+mn-lt"/>
+                  <a:ea typeface="+mn-ea"/>
+                  <a:cs typeface="+mn-cs"/>
+                </a:defRPr>
+              </a:lvl8pPr>
+              <a:lvl9pPr marL="3657600" algn="l" defTabSz="914400" rtl="0" eaLnBrk="1" latinLnBrk="0" hangingPunct="1">
+                <a:defRPr sz="1800" kern="1200">
+                  <a:solidFill>
+                    <a:schemeClr val="lt1"/>
+                  </a:solidFill>
+                  <a:latin typeface="+mn-lt"/>
+                  <a:ea typeface="+mn-ea"/>
+                  <a:cs typeface="+mn-cs"/>
+                </a:defRPr>
+              </a:lvl9pPr>
+            </a:lstStyle>
+            <a:p>
+              <a:pPr algn="ctr"/>
+              <a:endParaRPr lang="en-IN" dirty="0"/>
+            </a:p>
+          </p:txBody>
+        </p:sp>
+      </p:grpSp>
+    </p:spTree>
+    <p:extLst>
+      <p:ext uri="{BB962C8B-B14F-4D97-AF65-F5344CB8AC3E}">
+        <p14:creationId xmlns:p14="http://schemas.microsoft.com/office/powerpoint/2010/main" val="3768966666"/>
       </p:ext>
     </p:extLst>
   </p:cSld>

</xml_diff>

<commit_message>
Added nav html and connected
</commit_message>
<xml_diff>
--- a/Frontend/Assets/Images/Logo/logo.pptx
+++ b/Frontend/Assets/Images/Logo/logo.pptx
@@ -6,6 +6,8 @@
   </p:sldMasterIdLst>
   <p:sldIdLst>
     <p:sldId id="256" r:id="rId2"/>
+    <p:sldId id="258" r:id="rId3"/>
+    <p:sldId id="257" r:id="rId4"/>
   </p:sldIdLst>
   <p:sldSz cx="12192000" cy="6858000"/>
   <p:notesSz cx="6858000" cy="9144000"/>
@@ -261,7 +263,7 @@
           <a:p>
             <a:fld id="{01388C3B-F653-40C1-A75A-A31762BB095D}" type="datetimeFigureOut">
               <a:rPr lang="en-IN" smtClean="0"/>
-              <a:t>24-01-2025</a:t>
+              <a:t>31-01-2025</a:t>
             </a:fld>
             <a:endParaRPr lang="en-IN"/>
           </a:p>
@@ -461,7 +463,7 @@
           <a:p>
             <a:fld id="{01388C3B-F653-40C1-A75A-A31762BB095D}" type="datetimeFigureOut">
               <a:rPr lang="en-IN" smtClean="0"/>
-              <a:t>24-01-2025</a:t>
+              <a:t>31-01-2025</a:t>
             </a:fld>
             <a:endParaRPr lang="en-IN"/>
           </a:p>
@@ -671,7 +673,7 @@
           <a:p>
             <a:fld id="{01388C3B-F653-40C1-A75A-A31762BB095D}" type="datetimeFigureOut">
               <a:rPr lang="en-IN" smtClean="0"/>
-              <a:t>24-01-2025</a:t>
+              <a:t>31-01-2025</a:t>
             </a:fld>
             <a:endParaRPr lang="en-IN"/>
           </a:p>
@@ -871,7 +873,7 @@
           <a:p>
             <a:fld id="{01388C3B-F653-40C1-A75A-A31762BB095D}" type="datetimeFigureOut">
               <a:rPr lang="en-IN" smtClean="0"/>
-              <a:t>24-01-2025</a:t>
+              <a:t>31-01-2025</a:t>
             </a:fld>
             <a:endParaRPr lang="en-IN"/>
           </a:p>
@@ -1147,7 +1149,7 @@
           <a:p>
             <a:fld id="{01388C3B-F653-40C1-A75A-A31762BB095D}" type="datetimeFigureOut">
               <a:rPr lang="en-IN" smtClean="0"/>
-              <a:t>24-01-2025</a:t>
+              <a:t>31-01-2025</a:t>
             </a:fld>
             <a:endParaRPr lang="en-IN"/>
           </a:p>
@@ -1415,7 +1417,7 @@
           <a:p>
             <a:fld id="{01388C3B-F653-40C1-A75A-A31762BB095D}" type="datetimeFigureOut">
               <a:rPr lang="en-IN" smtClean="0"/>
-              <a:t>24-01-2025</a:t>
+              <a:t>31-01-2025</a:t>
             </a:fld>
             <a:endParaRPr lang="en-IN"/>
           </a:p>
@@ -1830,7 +1832,7 @@
           <a:p>
             <a:fld id="{01388C3B-F653-40C1-A75A-A31762BB095D}" type="datetimeFigureOut">
               <a:rPr lang="en-IN" smtClean="0"/>
-              <a:t>24-01-2025</a:t>
+              <a:t>31-01-2025</a:t>
             </a:fld>
             <a:endParaRPr lang="en-IN"/>
           </a:p>
@@ -1972,7 +1974,7 @@
           <a:p>
             <a:fld id="{01388C3B-F653-40C1-A75A-A31762BB095D}" type="datetimeFigureOut">
               <a:rPr lang="en-IN" smtClean="0"/>
-              <a:t>24-01-2025</a:t>
+              <a:t>31-01-2025</a:t>
             </a:fld>
             <a:endParaRPr lang="en-IN"/>
           </a:p>
@@ -2085,7 +2087,7 @@
           <a:p>
             <a:fld id="{01388C3B-F653-40C1-A75A-A31762BB095D}" type="datetimeFigureOut">
               <a:rPr lang="en-IN" smtClean="0"/>
-              <a:t>24-01-2025</a:t>
+              <a:t>31-01-2025</a:t>
             </a:fld>
             <a:endParaRPr lang="en-IN"/>
           </a:p>
@@ -2398,7 +2400,7 @@
           <a:p>
             <a:fld id="{01388C3B-F653-40C1-A75A-A31762BB095D}" type="datetimeFigureOut">
               <a:rPr lang="en-IN" smtClean="0"/>
-              <a:t>24-01-2025</a:t>
+              <a:t>31-01-2025</a:t>
             </a:fld>
             <a:endParaRPr lang="en-IN"/>
           </a:p>
@@ -2687,7 +2689,7 @@
           <a:p>
             <a:fld id="{01388C3B-F653-40C1-A75A-A31762BB095D}" type="datetimeFigureOut">
               <a:rPr lang="en-IN" smtClean="0"/>
-              <a:t>24-01-2025</a:t>
+              <a:t>31-01-2025</a:t>
             </a:fld>
             <a:endParaRPr lang="en-IN"/>
           </a:p>
@@ -2930,7 +2932,7 @@
           <a:p>
             <a:fld id="{01388C3B-F653-40C1-A75A-A31762BB095D}" type="datetimeFigureOut">
               <a:rPr lang="en-IN" smtClean="0"/>
-              <a:t>24-01-2025</a:t>
+              <a:t>31-01-2025</a:t>
             </a:fld>
             <a:endParaRPr lang="en-IN"/>
           </a:p>
@@ -3347,77 +3349,696 @@
           <a:chExt cx="0" cy="0"/>
         </a:xfrm>
       </p:grpSpPr>
-      <p:sp>
-        <p:nvSpPr>
-          <p:cNvPr id="4" name="Oval 3">
-            <a:extLst>
-              <a:ext uri="{FF2B5EF4-FFF2-40B4-BE49-F238E27FC236}">
-                <a16:creationId xmlns:a16="http://schemas.microsoft.com/office/drawing/2014/main" id="{6E1D1A32-36CB-1123-2704-DF52D5C3FBBF}"/>
-              </a:ext>
-            </a:extLst>
-          </p:cNvPr>
-          <p:cNvSpPr/>
+      <p:grpSp>
+        <p:nvGrpSpPr>
+          <p:cNvPr id="42" name="Group 41">
+            <a:extLst>
+              <a:ext uri="{FF2B5EF4-FFF2-40B4-BE49-F238E27FC236}">
+                <a16:creationId xmlns:a16="http://schemas.microsoft.com/office/drawing/2014/main" id="{01EC0C9B-7B36-FC0D-8305-440E03EFF53A}"/>
+              </a:ext>
+            </a:extLst>
+          </p:cNvPr>
+          <p:cNvGrpSpPr/>
           <p:nvPr/>
-        </p:nvSpPr>
-        <p:spPr>
-          <a:xfrm rot="313311">
-            <a:off x="2505076" y="171729"/>
-            <a:ext cx="6505574" cy="6505574"/>
+        </p:nvGrpSpPr>
+        <p:grpSpPr>
+          <a:xfrm>
+            <a:off x="1484504" y="742599"/>
+            <a:ext cx="2033396" cy="2221220"/>
+            <a:chOff x="2614804" y="2050699"/>
+            <a:chExt cx="2033396" cy="2221220"/>
           </a:xfrm>
-          <a:prstGeom prst="ellipse">
-            <a:avLst/>
-          </a:prstGeom>
-          <a:noFill/>
-          <a:ln w="228600">
+        </p:grpSpPr>
+        <p:sp>
+          <p:nvSpPr>
+            <p:cNvPr id="4" name="Oval 3">
+              <a:extLst>
+                <a:ext uri="{FF2B5EF4-FFF2-40B4-BE49-F238E27FC236}">
+                  <a16:creationId xmlns:a16="http://schemas.microsoft.com/office/drawing/2014/main" id="{6E1D1A32-36CB-1123-2704-DF52D5C3FBBF}"/>
+                </a:ext>
+              </a:extLst>
+            </p:cNvPr>
+            <p:cNvSpPr/>
+            <p:nvPr/>
+          </p:nvSpPr>
+          <p:spPr>
+            <a:xfrm rot="313311">
+              <a:off x="2614804" y="2050699"/>
+              <a:ext cx="2033396" cy="2078431"/>
+            </a:xfrm>
+            <a:prstGeom prst="ellipse">
+              <a:avLst/>
+            </a:prstGeom>
+            <a:noFill/>
+            <a:ln w="228600">
+              <a:solidFill>
+                <a:schemeClr val="tx1"/>
+              </a:solidFill>
+            </a:ln>
+            <a:effectLst/>
+          </p:spPr>
+          <p:style>
+            <a:lnRef idx="2">
+              <a:schemeClr val="accent1">
+                <a:shade val="15000"/>
+              </a:schemeClr>
+            </a:lnRef>
+            <a:fillRef idx="1">
+              <a:schemeClr val="accent1"/>
+            </a:fillRef>
+            <a:effectRef idx="0">
+              <a:schemeClr val="accent1"/>
+            </a:effectRef>
+            <a:fontRef idx="minor">
+              <a:schemeClr val="lt1"/>
+            </a:fontRef>
+          </p:style>
+          <p:txBody>
+            <a:bodyPr rtlCol="0" anchor="ctr"/>
+            <a:lstStyle/>
+            <a:p>
+              <a:pPr algn="ctr"/>
+              <a:endParaRPr lang="en-IN" dirty="0">
+                <a:ln w="0"/>
+                <a:solidFill>
+                  <a:schemeClr val="tx1"/>
+                </a:solidFill>
+                <a:effectLst>
+                  <a:outerShdw blurRad="38100" dist="19050" dir="2700000" algn="tl" rotWithShape="0">
+                    <a:schemeClr val="dk1">
+                      <a:alpha val="40000"/>
+                    </a:schemeClr>
+                  </a:outerShdw>
+                </a:effectLst>
+              </a:endParaRPr>
+            </a:p>
+          </p:txBody>
+        </p:sp>
+        <p:sp>
+          <p:nvSpPr>
+            <p:cNvPr id="7" name="Rectangle 4">
+              <a:extLst>
+                <a:ext uri="{FF2B5EF4-FFF2-40B4-BE49-F238E27FC236}">
+                  <a16:creationId xmlns:a16="http://schemas.microsoft.com/office/drawing/2014/main" id="{E51A5B58-85C1-7270-059D-4C17EB8D2B6F}"/>
+                </a:ext>
+              </a:extLst>
+            </p:cNvPr>
+            <p:cNvSpPr/>
+            <p:nvPr/>
+          </p:nvSpPr>
+          <p:spPr>
+            <a:xfrm rot="19649320">
+              <a:off x="3177401" y="2339465"/>
+              <a:ext cx="245480" cy="1889266"/>
+            </a:xfrm>
+            <a:custGeom>
+              <a:avLst/>
+              <a:gdLst>
+                <a:gd name="connsiteX0" fmla="*/ 0 w 417282"/>
+                <a:gd name="connsiteY0" fmla="*/ 0 h 4119367"/>
+                <a:gd name="connsiteX1" fmla="*/ 417282 w 417282"/>
+                <a:gd name="connsiteY1" fmla="*/ 0 h 4119367"/>
+                <a:gd name="connsiteX2" fmla="*/ 417282 w 417282"/>
+                <a:gd name="connsiteY2" fmla="*/ 4119367 h 4119367"/>
+                <a:gd name="connsiteX3" fmla="*/ 0 w 417282"/>
+                <a:gd name="connsiteY3" fmla="*/ 4119367 h 4119367"/>
+                <a:gd name="connsiteX4" fmla="*/ 0 w 417282"/>
+                <a:gd name="connsiteY4" fmla="*/ 0 h 4119367"/>
+                <a:gd name="connsiteX0" fmla="*/ 0 w 419794"/>
+                <a:gd name="connsiteY0" fmla="*/ 335280 h 4119367"/>
+                <a:gd name="connsiteX1" fmla="*/ 419794 w 419794"/>
+                <a:gd name="connsiteY1" fmla="*/ 0 h 4119367"/>
+                <a:gd name="connsiteX2" fmla="*/ 419794 w 419794"/>
+                <a:gd name="connsiteY2" fmla="*/ 4119367 h 4119367"/>
+                <a:gd name="connsiteX3" fmla="*/ 2512 w 419794"/>
+                <a:gd name="connsiteY3" fmla="*/ 4119367 h 4119367"/>
+                <a:gd name="connsiteX4" fmla="*/ 0 w 419794"/>
+                <a:gd name="connsiteY4" fmla="*/ 335280 h 4119367"/>
+                <a:gd name="connsiteX0" fmla="*/ 0 w 422424"/>
+                <a:gd name="connsiteY0" fmla="*/ 335280 h 4281985"/>
+                <a:gd name="connsiteX1" fmla="*/ 419794 w 422424"/>
+                <a:gd name="connsiteY1" fmla="*/ 0 h 4281985"/>
+                <a:gd name="connsiteX2" fmla="*/ 422424 w 422424"/>
+                <a:gd name="connsiteY2" fmla="*/ 4281985 h 4281985"/>
+                <a:gd name="connsiteX3" fmla="*/ 2512 w 422424"/>
+                <a:gd name="connsiteY3" fmla="*/ 4119367 h 4281985"/>
+                <a:gd name="connsiteX4" fmla="*/ 0 w 422424"/>
+                <a:gd name="connsiteY4" fmla="*/ 335280 h 4281985"/>
+              </a:gdLst>
+              <a:ahLst/>
+              <a:cxnLst>
+                <a:cxn ang="0">
+                  <a:pos x="connsiteX0" y="connsiteY0"/>
+                </a:cxn>
+                <a:cxn ang="0">
+                  <a:pos x="connsiteX1" y="connsiteY1"/>
+                </a:cxn>
+                <a:cxn ang="0">
+                  <a:pos x="connsiteX2" y="connsiteY2"/>
+                </a:cxn>
+                <a:cxn ang="0">
+                  <a:pos x="connsiteX3" y="connsiteY3"/>
+                </a:cxn>
+                <a:cxn ang="0">
+                  <a:pos x="connsiteX4" y="connsiteY4"/>
+                </a:cxn>
+              </a:cxnLst>
+              <a:rect l="l" t="t" r="r" b="b"/>
+              <a:pathLst>
+                <a:path w="422424" h="4281985">
+                  <a:moveTo>
+                    <a:pt x="0" y="335280"/>
+                  </a:moveTo>
+                  <a:lnTo>
+                    <a:pt x="419794" y="0"/>
+                  </a:lnTo>
+                  <a:cubicBezTo>
+                    <a:pt x="420671" y="1427328"/>
+                    <a:pt x="421547" y="2854657"/>
+                    <a:pt x="422424" y="4281985"/>
+                  </a:cubicBezTo>
+                  <a:lnTo>
+                    <a:pt x="2512" y="4119367"/>
+                  </a:lnTo>
+                  <a:cubicBezTo>
+                    <a:pt x="1675" y="2858005"/>
+                    <a:pt x="837" y="1596642"/>
+                    <a:pt x="0" y="335280"/>
+                  </a:cubicBezTo>
+                  <a:close/>
+                </a:path>
+              </a:pathLst>
+            </a:custGeom>
             <a:solidFill>
               <a:schemeClr val="tx1"/>
             </a:solidFill>
-          </a:ln>
-          <a:effectLst/>
-        </p:spPr>
-        <p:style>
-          <a:lnRef idx="2">
-            <a:schemeClr val="accent1">
-              <a:shade val="15000"/>
-            </a:schemeClr>
-          </a:lnRef>
-          <a:fillRef idx="1">
-            <a:schemeClr val="accent1"/>
-          </a:fillRef>
-          <a:effectRef idx="0">
-            <a:schemeClr val="accent1"/>
-          </a:effectRef>
-          <a:fontRef idx="minor">
-            <a:schemeClr val="lt1"/>
-          </a:fontRef>
-        </p:style>
-        <p:txBody>
-          <a:bodyPr rtlCol="0" anchor="ctr"/>
-          <a:lstStyle/>
-          <a:p>
-            <a:pPr algn="ctr"/>
-            <a:endParaRPr lang="en-IN" dirty="0">
-              <a:ln w="0"/>
-              <a:solidFill>
-                <a:schemeClr val="tx1"/>
-              </a:solidFill>
-              <a:effectLst>
-                <a:outerShdw blurRad="38100" dist="19050" dir="2700000" algn="tl" rotWithShape="0">
-                  <a:schemeClr val="dk1">
-                    <a:alpha val="40000"/>
-                  </a:schemeClr>
-                </a:outerShdw>
-              </a:effectLst>
-            </a:endParaRPr>
-          </a:p>
-        </p:txBody>
-      </p:sp>
-      <p:sp>
-        <p:nvSpPr>
-          <p:cNvPr id="5" name="Rectangle 4">
-            <a:extLst>
-              <a:ext uri="{FF2B5EF4-FFF2-40B4-BE49-F238E27FC236}">
-                <a16:creationId xmlns:a16="http://schemas.microsoft.com/office/drawing/2014/main" id="{8F41DCEA-5F8E-94CF-2C3C-6DCFC35DAE63}"/>
+            <a:ln>
+              <a:noFill/>
+            </a:ln>
+          </p:spPr>
+          <p:style>
+            <a:lnRef idx="2">
+              <a:schemeClr val="accent1">
+                <a:shade val="15000"/>
+              </a:schemeClr>
+            </a:lnRef>
+            <a:fillRef idx="1">
+              <a:schemeClr val="accent1"/>
+            </a:fillRef>
+            <a:effectRef idx="0">
+              <a:schemeClr val="accent1"/>
+            </a:effectRef>
+            <a:fontRef idx="minor">
+              <a:schemeClr val="lt1"/>
+            </a:fontRef>
+          </p:style>
+          <p:txBody>
+            <a:bodyPr rtlCol="0" anchor="ctr"/>
+            <a:lstStyle/>
+            <a:p>
+              <a:pPr algn="ctr"/>
+              <a:endParaRPr lang="en-IN" dirty="0"/>
+            </a:p>
+          </p:txBody>
+        </p:sp>
+        <p:sp>
+          <p:nvSpPr>
+            <p:cNvPr id="3" name="Rectangle 4">
+              <a:extLst>
+                <a:ext uri="{FF2B5EF4-FFF2-40B4-BE49-F238E27FC236}">
+                  <a16:creationId xmlns:a16="http://schemas.microsoft.com/office/drawing/2014/main" id="{5B583220-F69D-BD02-61AD-0B67DDA54ECA}"/>
+                </a:ext>
+              </a:extLst>
+            </p:cNvPr>
+            <p:cNvSpPr/>
+            <p:nvPr/>
+          </p:nvSpPr>
+          <p:spPr>
+            <a:xfrm rot="19649320">
+              <a:off x="2881686" y="2664170"/>
+              <a:ext cx="245480" cy="1607749"/>
+            </a:xfrm>
+            <a:custGeom>
+              <a:avLst/>
+              <a:gdLst>
+                <a:gd name="connsiteX0" fmla="*/ 0 w 417282"/>
+                <a:gd name="connsiteY0" fmla="*/ 0 h 4119367"/>
+                <a:gd name="connsiteX1" fmla="*/ 417282 w 417282"/>
+                <a:gd name="connsiteY1" fmla="*/ 0 h 4119367"/>
+                <a:gd name="connsiteX2" fmla="*/ 417282 w 417282"/>
+                <a:gd name="connsiteY2" fmla="*/ 4119367 h 4119367"/>
+                <a:gd name="connsiteX3" fmla="*/ 0 w 417282"/>
+                <a:gd name="connsiteY3" fmla="*/ 4119367 h 4119367"/>
+                <a:gd name="connsiteX4" fmla="*/ 0 w 417282"/>
+                <a:gd name="connsiteY4" fmla="*/ 0 h 4119367"/>
+                <a:gd name="connsiteX0" fmla="*/ 0 w 419794"/>
+                <a:gd name="connsiteY0" fmla="*/ 335280 h 4119367"/>
+                <a:gd name="connsiteX1" fmla="*/ 419794 w 419794"/>
+                <a:gd name="connsiteY1" fmla="*/ 0 h 4119367"/>
+                <a:gd name="connsiteX2" fmla="*/ 419794 w 419794"/>
+                <a:gd name="connsiteY2" fmla="*/ 4119367 h 4119367"/>
+                <a:gd name="connsiteX3" fmla="*/ 2512 w 419794"/>
+                <a:gd name="connsiteY3" fmla="*/ 4119367 h 4119367"/>
+                <a:gd name="connsiteX4" fmla="*/ 0 w 419794"/>
+                <a:gd name="connsiteY4" fmla="*/ 335280 h 4119367"/>
+                <a:gd name="connsiteX0" fmla="*/ 0 w 422424"/>
+                <a:gd name="connsiteY0" fmla="*/ 335280 h 4281985"/>
+                <a:gd name="connsiteX1" fmla="*/ 419794 w 422424"/>
+                <a:gd name="connsiteY1" fmla="*/ 0 h 4281985"/>
+                <a:gd name="connsiteX2" fmla="*/ 422424 w 422424"/>
+                <a:gd name="connsiteY2" fmla="*/ 4281985 h 4281985"/>
+                <a:gd name="connsiteX3" fmla="*/ 2512 w 422424"/>
+                <a:gd name="connsiteY3" fmla="*/ 4119367 h 4281985"/>
+                <a:gd name="connsiteX4" fmla="*/ 0 w 422424"/>
+                <a:gd name="connsiteY4" fmla="*/ 335280 h 4281985"/>
+              </a:gdLst>
+              <a:ahLst/>
+              <a:cxnLst>
+                <a:cxn ang="0">
+                  <a:pos x="connsiteX0" y="connsiteY0"/>
+                </a:cxn>
+                <a:cxn ang="0">
+                  <a:pos x="connsiteX1" y="connsiteY1"/>
+                </a:cxn>
+                <a:cxn ang="0">
+                  <a:pos x="connsiteX2" y="connsiteY2"/>
+                </a:cxn>
+                <a:cxn ang="0">
+                  <a:pos x="connsiteX3" y="connsiteY3"/>
+                </a:cxn>
+                <a:cxn ang="0">
+                  <a:pos x="connsiteX4" y="connsiteY4"/>
+                </a:cxn>
+              </a:cxnLst>
+              <a:rect l="l" t="t" r="r" b="b"/>
+              <a:pathLst>
+                <a:path w="422424" h="4281985">
+                  <a:moveTo>
+                    <a:pt x="0" y="335280"/>
+                  </a:moveTo>
+                  <a:lnTo>
+                    <a:pt x="419794" y="0"/>
+                  </a:lnTo>
+                  <a:cubicBezTo>
+                    <a:pt x="420671" y="1427328"/>
+                    <a:pt x="421547" y="2854657"/>
+                    <a:pt x="422424" y="4281985"/>
+                  </a:cubicBezTo>
+                  <a:lnTo>
+                    <a:pt x="2512" y="4119367"/>
+                  </a:lnTo>
+                  <a:cubicBezTo>
+                    <a:pt x="1675" y="2858005"/>
+                    <a:pt x="837" y="1596642"/>
+                    <a:pt x="0" y="335280"/>
+                  </a:cubicBezTo>
+                  <a:close/>
+                </a:path>
+              </a:pathLst>
+            </a:custGeom>
+            <a:solidFill>
+              <a:schemeClr val="tx1"/>
+            </a:solidFill>
+            <a:ln>
+              <a:noFill/>
+            </a:ln>
+          </p:spPr>
+          <p:style>
+            <a:lnRef idx="2">
+              <a:schemeClr val="accent1">
+                <a:shade val="15000"/>
+              </a:schemeClr>
+            </a:lnRef>
+            <a:fillRef idx="1">
+              <a:schemeClr val="accent1"/>
+            </a:fillRef>
+            <a:effectRef idx="0">
+              <a:schemeClr val="accent1"/>
+            </a:effectRef>
+            <a:fontRef idx="minor">
+              <a:schemeClr val="lt1"/>
+            </a:fontRef>
+          </p:style>
+          <p:txBody>
+            <a:bodyPr rtlCol="0" anchor="ctr"/>
+            <a:lstStyle/>
+            <a:p>
+              <a:pPr algn="ctr"/>
+              <a:endParaRPr lang="en-IN" dirty="0"/>
+            </a:p>
+          </p:txBody>
+        </p:sp>
+        <p:sp>
+          <p:nvSpPr>
+            <p:cNvPr id="41" name="Freeform: Shape 40">
+              <a:extLst>
+                <a:ext uri="{FF2B5EF4-FFF2-40B4-BE49-F238E27FC236}">
+                  <a16:creationId xmlns:a16="http://schemas.microsoft.com/office/drawing/2014/main" id="{D6E34E70-52BA-148C-3D3B-6ADA7FEF0B2F}"/>
+                </a:ext>
+              </a:extLst>
+            </p:cNvPr>
+            <p:cNvSpPr/>
+            <p:nvPr/>
+          </p:nvSpPr>
+          <p:spPr>
+            <a:xfrm rot="16200000">
+              <a:off x="3323285" y="2800603"/>
+              <a:ext cx="1585797" cy="1035982"/>
+            </a:xfrm>
+            <a:custGeom>
+              <a:avLst/>
+              <a:gdLst>
+                <a:gd name="connsiteX0" fmla="*/ 602814 w 1585797"/>
+                <a:gd name="connsiteY0" fmla="*/ 265355 h 1035982"/>
+                <a:gd name="connsiteX1" fmla="*/ 602814 w 1585797"/>
+                <a:gd name="connsiteY1" fmla="*/ 533233 h 1035982"/>
+                <a:gd name="connsiteX2" fmla="*/ 0 w 1585797"/>
+                <a:gd name="connsiteY2" fmla="*/ 208911 h 1035982"/>
+                <a:gd name="connsiteX3" fmla="*/ 170311 w 1585797"/>
+                <a:gd name="connsiteY3" fmla="*/ 32701 h 1035982"/>
+                <a:gd name="connsiteX4" fmla="*/ 731739 w 1585797"/>
+                <a:gd name="connsiteY4" fmla="*/ 602597 h 1035982"/>
+                <a:gd name="connsiteX5" fmla="*/ 731739 w 1585797"/>
+                <a:gd name="connsiteY5" fmla="*/ 935040 h 1035982"/>
+                <a:gd name="connsiteX6" fmla="*/ 602814 w 1585797"/>
+                <a:gd name="connsiteY6" fmla="*/ 935040 h 1035982"/>
+                <a:gd name="connsiteX7" fmla="*/ 602814 w 1585797"/>
+                <a:gd name="connsiteY7" fmla="*/ 533233 h 1035982"/>
+                <a:gd name="connsiteX8" fmla="*/ 1537268 w 1585797"/>
+                <a:gd name="connsiteY8" fmla="*/ 1035982 h 1035982"/>
+                <a:gd name="connsiteX9" fmla="*/ 731739 w 1585797"/>
+                <a:gd name="connsiteY9" fmla="*/ 602597 h 1035982"/>
+                <a:gd name="connsiteX10" fmla="*/ 731739 w 1585797"/>
+                <a:gd name="connsiteY10" fmla="*/ 334707 h 1035982"/>
+                <a:gd name="connsiteX11" fmla="*/ 1456873 w 1585797"/>
+                <a:gd name="connsiteY11" fmla="*/ 724775 h 1035982"/>
+                <a:gd name="connsiteX12" fmla="*/ 1456873 w 1585797"/>
+                <a:gd name="connsiteY12" fmla="*/ 935040 h 1035982"/>
+                <a:gd name="connsiteX13" fmla="*/ 1534160 w 1585797"/>
+                <a:gd name="connsiteY13" fmla="*/ 935040 h 1035982"/>
+                <a:gd name="connsiteX14" fmla="*/ 1585797 w 1585797"/>
+                <a:gd name="connsiteY14" fmla="*/ 155843 h 1035982"/>
+                <a:gd name="connsiteX15" fmla="*/ 1585797 w 1585797"/>
+                <a:gd name="connsiteY15" fmla="*/ 935040 h 1035982"/>
+                <a:gd name="connsiteX16" fmla="*/ 1534160 w 1585797"/>
+                <a:gd name="connsiteY16" fmla="*/ 935040 h 1035982"/>
+                <a:gd name="connsiteX17" fmla="*/ 1528879 w 1585797"/>
+                <a:gd name="connsiteY17" fmla="*/ 763509 h 1035982"/>
+                <a:gd name="connsiteX18" fmla="*/ 1456873 w 1585797"/>
+                <a:gd name="connsiteY18" fmla="*/ 724775 h 1035982"/>
+                <a:gd name="connsiteX19" fmla="*/ 1456873 w 1585797"/>
+                <a:gd name="connsiteY19" fmla="*/ 255810 h 1035982"/>
+                <a:gd name="connsiteX20" fmla="*/ 1336015 w 1585797"/>
+                <a:gd name="connsiteY20" fmla="*/ 140847 h 1035982"/>
+                <a:gd name="connsiteX21" fmla="*/ 852598 w 1585797"/>
+                <a:gd name="connsiteY21" fmla="*/ 140847 h 1035982"/>
+                <a:gd name="connsiteX22" fmla="*/ 731739 w 1585797"/>
+                <a:gd name="connsiteY22" fmla="*/ 255810 h 1035982"/>
+                <a:gd name="connsiteX23" fmla="*/ 731739 w 1585797"/>
+                <a:gd name="connsiteY23" fmla="*/ 334707 h 1035982"/>
+                <a:gd name="connsiteX24" fmla="*/ 602814 w 1585797"/>
+                <a:gd name="connsiteY24" fmla="*/ 265355 h 1035982"/>
+                <a:gd name="connsiteX25" fmla="*/ 602814 w 1585797"/>
+                <a:gd name="connsiteY25" fmla="*/ 155843 h 1035982"/>
+                <a:gd name="connsiteX26" fmla="*/ 766648 w 1585797"/>
+                <a:gd name="connsiteY26" fmla="*/ 0 h 1035982"/>
+                <a:gd name="connsiteX27" fmla="*/ 1421963 w 1585797"/>
+                <a:gd name="connsiteY27" fmla="*/ 0 h 1035982"/>
+                <a:gd name="connsiteX28" fmla="*/ 1585797 w 1585797"/>
+                <a:gd name="connsiteY28" fmla="*/ 155843 h 1035982"/>
+              </a:gdLst>
+              <a:ahLst/>
+              <a:cxnLst>
+                <a:cxn ang="0">
+                  <a:pos x="connsiteX0" y="connsiteY0"/>
+                </a:cxn>
+                <a:cxn ang="0">
+                  <a:pos x="connsiteX1" y="connsiteY1"/>
+                </a:cxn>
+                <a:cxn ang="0">
+                  <a:pos x="connsiteX2" y="connsiteY2"/>
+                </a:cxn>
+                <a:cxn ang="0">
+                  <a:pos x="connsiteX3" y="connsiteY3"/>
+                </a:cxn>
+                <a:cxn ang="0">
+                  <a:pos x="connsiteX4" y="connsiteY4"/>
+                </a:cxn>
+                <a:cxn ang="0">
+                  <a:pos x="connsiteX5" y="connsiteY5"/>
+                </a:cxn>
+                <a:cxn ang="0">
+                  <a:pos x="connsiteX6" y="connsiteY6"/>
+                </a:cxn>
+                <a:cxn ang="0">
+                  <a:pos x="connsiteX7" y="connsiteY7"/>
+                </a:cxn>
+                <a:cxn ang="0">
+                  <a:pos x="connsiteX8" y="connsiteY8"/>
+                </a:cxn>
+                <a:cxn ang="0">
+                  <a:pos x="connsiteX9" y="connsiteY9"/>
+                </a:cxn>
+                <a:cxn ang="0">
+                  <a:pos x="connsiteX10" y="connsiteY10"/>
+                </a:cxn>
+                <a:cxn ang="0">
+                  <a:pos x="connsiteX11" y="connsiteY11"/>
+                </a:cxn>
+                <a:cxn ang="0">
+                  <a:pos x="connsiteX12" y="connsiteY12"/>
+                </a:cxn>
+                <a:cxn ang="0">
+                  <a:pos x="connsiteX13" y="connsiteY13"/>
+                </a:cxn>
+                <a:cxn ang="0">
+                  <a:pos x="connsiteX14" y="connsiteY14"/>
+                </a:cxn>
+                <a:cxn ang="0">
+                  <a:pos x="connsiteX15" y="connsiteY15"/>
+                </a:cxn>
+                <a:cxn ang="0">
+                  <a:pos x="connsiteX16" y="connsiteY16"/>
+                </a:cxn>
+                <a:cxn ang="0">
+                  <a:pos x="connsiteX17" y="connsiteY17"/>
+                </a:cxn>
+                <a:cxn ang="0">
+                  <a:pos x="connsiteX18" y="connsiteY18"/>
+                </a:cxn>
+                <a:cxn ang="0">
+                  <a:pos x="connsiteX19" y="connsiteY19"/>
+                </a:cxn>
+                <a:cxn ang="0">
+                  <a:pos x="connsiteX20" y="connsiteY20"/>
+                </a:cxn>
+                <a:cxn ang="0">
+                  <a:pos x="connsiteX21" y="connsiteY21"/>
+                </a:cxn>
+                <a:cxn ang="0">
+                  <a:pos x="connsiteX22" y="connsiteY22"/>
+                </a:cxn>
+                <a:cxn ang="0">
+                  <a:pos x="connsiteX23" y="connsiteY23"/>
+                </a:cxn>
+                <a:cxn ang="0">
+                  <a:pos x="connsiteX24" y="connsiteY24"/>
+                </a:cxn>
+                <a:cxn ang="0">
+                  <a:pos x="connsiteX25" y="connsiteY25"/>
+                </a:cxn>
+                <a:cxn ang="0">
+                  <a:pos x="connsiteX26" y="connsiteY26"/>
+                </a:cxn>
+                <a:cxn ang="0">
+                  <a:pos x="connsiteX27" y="connsiteY27"/>
+                </a:cxn>
+                <a:cxn ang="0">
+                  <a:pos x="connsiteX28" y="connsiteY28"/>
+                </a:cxn>
+              </a:cxnLst>
+              <a:rect l="l" t="t" r="r" b="b"/>
+              <a:pathLst>
+                <a:path w="1585797" h="1035982">
+                  <a:moveTo>
+                    <a:pt x="602814" y="265355"/>
+                  </a:moveTo>
+                  <a:lnTo>
+                    <a:pt x="602814" y="533233"/>
+                  </a:lnTo>
+                  <a:lnTo>
+                    <a:pt x="0" y="208911"/>
+                  </a:lnTo>
+                  <a:lnTo>
+                    <a:pt x="170311" y="32701"/>
+                  </a:lnTo>
+                  <a:close/>
+                  <a:moveTo>
+                    <a:pt x="731739" y="602597"/>
+                  </a:moveTo>
+                  <a:lnTo>
+                    <a:pt x="731739" y="935040"/>
+                  </a:lnTo>
+                  <a:lnTo>
+                    <a:pt x="602814" y="935040"/>
+                  </a:lnTo>
+                  <a:lnTo>
+                    <a:pt x="602814" y="533233"/>
+                  </a:lnTo>
+                  <a:close/>
+                  <a:moveTo>
+                    <a:pt x="1537268" y="1035982"/>
+                  </a:moveTo>
+                  <a:lnTo>
+                    <a:pt x="731739" y="602597"/>
+                  </a:lnTo>
+                  <a:lnTo>
+                    <a:pt x="731739" y="334707"/>
+                  </a:lnTo>
+                  <a:lnTo>
+                    <a:pt x="1456873" y="724775"/>
+                  </a:lnTo>
+                  <a:lnTo>
+                    <a:pt x="1456873" y="935040"/>
+                  </a:lnTo>
+                  <a:lnTo>
+                    <a:pt x="1534160" y="935040"/>
+                  </a:lnTo>
+                  <a:close/>
+                  <a:moveTo>
+                    <a:pt x="1585797" y="155843"/>
+                  </a:moveTo>
+                  <a:lnTo>
+                    <a:pt x="1585797" y="935040"/>
+                  </a:lnTo>
+                  <a:lnTo>
+                    <a:pt x="1534160" y="935040"/>
+                  </a:lnTo>
+                  <a:lnTo>
+                    <a:pt x="1528879" y="763509"/>
+                  </a:lnTo>
+                  <a:lnTo>
+                    <a:pt x="1456873" y="724775"/>
+                  </a:lnTo>
+                  <a:lnTo>
+                    <a:pt x="1456873" y="255810"/>
+                  </a:lnTo>
+                  <a:cubicBezTo>
+                    <a:pt x="1456873" y="192318"/>
+                    <a:pt x="1402763" y="140847"/>
+                    <a:pt x="1336015" y="140847"/>
+                  </a:cubicBezTo>
+                  <a:lnTo>
+                    <a:pt x="852598" y="140847"/>
+                  </a:lnTo>
+                  <a:cubicBezTo>
+                    <a:pt x="785849" y="140847"/>
+                    <a:pt x="731739" y="192318"/>
+                    <a:pt x="731739" y="255810"/>
+                  </a:cubicBezTo>
+                  <a:lnTo>
+                    <a:pt x="731739" y="334707"/>
+                  </a:lnTo>
+                  <a:lnTo>
+                    <a:pt x="602814" y="265355"/>
+                  </a:lnTo>
+                  <a:lnTo>
+                    <a:pt x="602814" y="155843"/>
+                  </a:lnTo>
+                  <a:cubicBezTo>
+                    <a:pt x="602814" y="69773"/>
+                    <a:pt x="676165" y="0"/>
+                    <a:pt x="766648" y="0"/>
+                  </a:cubicBezTo>
+                  <a:lnTo>
+                    <a:pt x="1421963" y="0"/>
+                  </a:lnTo>
+                  <a:cubicBezTo>
+                    <a:pt x="1512446" y="0"/>
+                    <a:pt x="1585797" y="69773"/>
+                    <a:pt x="1585797" y="155843"/>
+                  </a:cubicBezTo>
+                  <a:close/>
+                </a:path>
+              </a:pathLst>
+            </a:custGeom>
+            <a:solidFill>
+              <a:schemeClr val="tx1"/>
+            </a:solidFill>
+            <a:ln>
+              <a:noFill/>
+            </a:ln>
+          </p:spPr>
+          <p:style>
+            <a:lnRef idx="2">
+              <a:schemeClr val="accent1">
+                <a:shade val="15000"/>
+              </a:schemeClr>
+            </a:lnRef>
+            <a:fillRef idx="1">
+              <a:schemeClr val="accent1"/>
+            </a:fillRef>
+            <a:effectRef idx="0">
+              <a:schemeClr val="accent1"/>
+            </a:effectRef>
+            <a:fontRef idx="minor">
+              <a:schemeClr val="lt1"/>
+            </a:fontRef>
+          </p:style>
+          <p:txBody>
+            <a:bodyPr wrap="square" rtlCol="0" anchor="ctr">
+              <a:noAutofit/>
+            </a:bodyPr>
+            <a:lstStyle/>
+            <a:p>
+              <a:pPr algn="ctr"/>
+              <a:endParaRPr lang="en-IN"/>
+            </a:p>
+          </p:txBody>
+        </p:sp>
+      </p:grpSp>
+    </p:spTree>
+    <p:extLst>
+      <p:ext uri="{BB962C8B-B14F-4D97-AF65-F5344CB8AC3E}">
+        <p14:creationId xmlns:p14="http://schemas.microsoft.com/office/powerpoint/2010/main" val="2447756666"/>
+      </p:ext>
+    </p:extLst>
+  </p:cSld>
+  <p:clrMapOvr>
+    <a:masterClrMapping/>
+  </p:clrMapOvr>
+</p:sld>
+</file>
+
+<file path=ppt/slides/slide2.xml><?xml version="1.0" encoding="utf-8"?>
+<p:sld xmlns:a="http://schemas.openxmlformats.org/drawingml/2006/main" xmlns:r="http://schemas.openxmlformats.org/officeDocument/2006/relationships" xmlns:p="http://schemas.openxmlformats.org/presentationml/2006/main">
+  <p:cSld>
+    <p:spTree>
+      <p:nvGrpSpPr>
+        <p:cNvPr id="1" name="">
+          <a:extLst>
+            <a:ext uri="{FF2B5EF4-FFF2-40B4-BE49-F238E27FC236}">
+              <a16:creationId xmlns:a16="http://schemas.microsoft.com/office/drawing/2014/main" id="{EC64311E-9577-3A7C-3D11-74DC901E6270}"/>
+            </a:ext>
+          </a:extLst>
+        </p:cNvPr>
+        <p:cNvGrpSpPr/>
+        <p:nvPr/>
+      </p:nvGrpSpPr>
+      <p:grpSpPr>
+        <a:xfrm>
+          <a:off x="0" y="0"/>
+          <a:ext cx="0" cy="0"/>
+          <a:chOff x="0" y="0"/>
+          <a:chExt cx="0" cy="0"/>
+        </a:xfrm>
+      </p:grpSpPr>
+      <p:sp>
+        <p:nvSpPr>
+          <p:cNvPr id="9" name="Freeform: Shape 8">
+            <a:extLst>
+              <a:ext uri="{FF2B5EF4-FFF2-40B4-BE49-F238E27FC236}">
+                <a16:creationId xmlns:a16="http://schemas.microsoft.com/office/drawing/2014/main" id="{004230EE-13CA-FB80-7B92-6652FAAF9DE4}"/>
               </a:ext>
             </a:extLst>
           </p:cNvPr>
@@ -3425,263 +4046,9 @@
           <p:nvPr/>
         </p:nvSpPr>
         <p:spPr>
-          <a:xfrm rot="19649320">
-            <a:off x="3560597" y="2013063"/>
-            <a:ext cx="529690" cy="5070250"/>
-          </a:xfrm>
-          <a:custGeom>
-            <a:avLst/>
-            <a:gdLst>
-              <a:gd name="connsiteX0" fmla="*/ 0 w 417282"/>
-              <a:gd name="connsiteY0" fmla="*/ 0 h 4119367"/>
-              <a:gd name="connsiteX1" fmla="*/ 417282 w 417282"/>
-              <a:gd name="connsiteY1" fmla="*/ 0 h 4119367"/>
-              <a:gd name="connsiteX2" fmla="*/ 417282 w 417282"/>
-              <a:gd name="connsiteY2" fmla="*/ 4119367 h 4119367"/>
-              <a:gd name="connsiteX3" fmla="*/ 0 w 417282"/>
-              <a:gd name="connsiteY3" fmla="*/ 4119367 h 4119367"/>
-              <a:gd name="connsiteX4" fmla="*/ 0 w 417282"/>
-              <a:gd name="connsiteY4" fmla="*/ 0 h 4119367"/>
-              <a:gd name="connsiteX0" fmla="*/ 0 w 419794"/>
-              <a:gd name="connsiteY0" fmla="*/ 335280 h 4119367"/>
-              <a:gd name="connsiteX1" fmla="*/ 419794 w 419794"/>
-              <a:gd name="connsiteY1" fmla="*/ 0 h 4119367"/>
-              <a:gd name="connsiteX2" fmla="*/ 419794 w 419794"/>
-              <a:gd name="connsiteY2" fmla="*/ 4119367 h 4119367"/>
-              <a:gd name="connsiteX3" fmla="*/ 2512 w 419794"/>
-              <a:gd name="connsiteY3" fmla="*/ 4119367 h 4119367"/>
-              <a:gd name="connsiteX4" fmla="*/ 0 w 419794"/>
-              <a:gd name="connsiteY4" fmla="*/ 335280 h 4119367"/>
-              <a:gd name="connsiteX0" fmla="*/ 0 w 422424"/>
-              <a:gd name="connsiteY0" fmla="*/ 335280 h 4281985"/>
-              <a:gd name="connsiteX1" fmla="*/ 419794 w 422424"/>
-              <a:gd name="connsiteY1" fmla="*/ 0 h 4281985"/>
-              <a:gd name="connsiteX2" fmla="*/ 422424 w 422424"/>
-              <a:gd name="connsiteY2" fmla="*/ 4281985 h 4281985"/>
-              <a:gd name="connsiteX3" fmla="*/ 2512 w 422424"/>
-              <a:gd name="connsiteY3" fmla="*/ 4119367 h 4281985"/>
-              <a:gd name="connsiteX4" fmla="*/ 0 w 422424"/>
-              <a:gd name="connsiteY4" fmla="*/ 335280 h 4281985"/>
-            </a:gdLst>
-            <a:ahLst/>
-            <a:cxnLst>
-              <a:cxn ang="0">
-                <a:pos x="connsiteX0" y="connsiteY0"/>
-              </a:cxn>
-              <a:cxn ang="0">
-                <a:pos x="connsiteX1" y="connsiteY1"/>
-              </a:cxn>
-              <a:cxn ang="0">
-                <a:pos x="connsiteX2" y="connsiteY2"/>
-              </a:cxn>
-              <a:cxn ang="0">
-                <a:pos x="connsiteX3" y="connsiteY3"/>
-              </a:cxn>
-              <a:cxn ang="0">
-                <a:pos x="connsiteX4" y="connsiteY4"/>
-              </a:cxn>
-            </a:cxnLst>
-            <a:rect l="l" t="t" r="r" b="b"/>
-            <a:pathLst>
-              <a:path w="422424" h="4281985">
-                <a:moveTo>
-                  <a:pt x="0" y="335280"/>
-                </a:moveTo>
-                <a:lnTo>
-                  <a:pt x="419794" y="0"/>
-                </a:lnTo>
-                <a:cubicBezTo>
-                  <a:pt x="420671" y="1427328"/>
-                  <a:pt x="421547" y="2854657"/>
-                  <a:pt x="422424" y="4281985"/>
-                </a:cubicBezTo>
-                <a:lnTo>
-                  <a:pt x="2512" y="4119367"/>
-                </a:lnTo>
-                <a:cubicBezTo>
-                  <a:pt x="1675" y="2858005"/>
-                  <a:pt x="837" y="1596642"/>
-                  <a:pt x="0" y="335280"/>
-                </a:cubicBezTo>
-                <a:close/>
-              </a:path>
-            </a:pathLst>
-          </a:custGeom>
-          <a:solidFill>
-            <a:schemeClr val="tx1"/>
-          </a:solidFill>
-          <a:ln>
-            <a:noFill/>
-          </a:ln>
-        </p:spPr>
-        <p:style>
-          <a:lnRef idx="2">
-            <a:schemeClr val="accent1">
-              <a:shade val="15000"/>
-            </a:schemeClr>
-          </a:lnRef>
-          <a:fillRef idx="1">
-            <a:schemeClr val="accent1"/>
-          </a:fillRef>
-          <a:effectRef idx="0">
-            <a:schemeClr val="accent1"/>
-          </a:effectRef>
-          <a:fontRef idx="minor">
-            <a:schemeClr val="lt1"/>
-          </a:fontRef>
-        </p:style>
-        <p:txBody>
-          <a:bodyPr rtlCol="0" anchor="ctr"/>
-          <a:lstStyle/>
-          <a:p>
-            <a:pPr algn="ctr"/>
-            <a:endParaRPr lang="en-IN" dirty="0"/>
-          </a:p>
-        </p:txBody>
-      </p:sp>
-      <p:sp>
-        <p:nvSpPr>
-          <p:cNvPr id="7" name="Rectangle 4">
-            <a:extLst>
-              <a:ext uri="{FF2B5EF4-FFF2-40B4-BE49-F238E27FC236}">
-                <a16:creationId xmlns:a16="http://schemas.microsoft.com/office/drawing/2014/main" id="{E51A5B58-85C1-7270-059D-4C17EB8D2B6F}"/>
-              </a:ext>
-            </a:extLst>
-          </p:cNvPr>
-          <p:cNvSpPr/>
-          <p:nvPr/>
-        </p:nvSpPr>
-        <p:spPr>
-          <a:xfrm rot="19649320">
-            <a:off x="4144984" y="1240710"/>
-            <a:ext cx="518167" cy="5913480"/>
-          </a:xfrm>
-          <a:custGeom>
-            <a:avLst/>
-            <a:gdLst>
-              <a:gd name="connsiteX0" fmla="*/ 0 w 417282"/>
-              <a:gd name="connsiteY0" fmla="*/ 0 h 4119367"/>
-              <a:gd name="connsiteX1" fmla="*/ 417282 w 417282"/>
-              <a:gd name="connsiteY1" fmla="*/ 0 h 4119367"/>
-              <a:gd name="connsiteX2" fmla="*/ 417282 w 417282"/>
-              <a:gd name="connsiteY2" fmla="*/ 4119367 h 4119367"/>
-              <a:gd name="connsiteX3" fmla="*/ 0 w 417282"/>
-              <a:gd name="connsiteY3" fmla="*/ 4119367 h 4119367"/>
-              <a:gd name="connsiteX4" fmla="*/ 0 w 417282"/>
-              <a:gd name="connsiteY4" fmla="*/ 0 h 4119367"/>
-              <a:gd name="connsiteX0" fmla="*/ 0 w 419794"/>
-              <a:gd name="connsiteY0" fmla="*/ 335280 h 4119367"/>
-              <a:gd name="connsiteX1" fmla="*/ 419794 w 419794"/>
-              <a:gd name="connsiteY1" fmla="*/ 0 h 4119367"/>
-              <a:gd name="connsiteX2" fmla="*/ 419794 w 419794"/>
-              <a:gd name="connsiteY2" fmla="*/ 4119367 h 4119367"/>
-              <a:gd name="connsiteX3" fmla="*/ 2512 w 419794"/>
-              <a:gd name="connsiteY3" fmla="*/ 4119367 h 4119367"/>
-              <a:gd name="connsiteX4" fmla="*/ 0 w 419794"/>
-              <a:gd name="connsiteY4" fmla="*/ 335280 h 4119367"/>
-              <a:gd name="connsiteX0" fmla="*/ 0 w 422424"/>
-              <a:gd name="connsiteY0" fmla="*/ 335280 h 4281985"/>
-              <a:gd name="connsiteX1" fmla="*/ 419794 w 422424"/>
-              <a:gd name="connsiteY1" fmla="*/ 0 h 4281985"/>
-              <a:gd name="connsiteX2" fmla="*/ 422424 w 422424"/>
-              <a:gd name="connsiteY2" fmla="*/ 4281985 h 4281985"/>
-              <a:gd name="connsiteX3" fmla="*/ 2512 w 422424"/>
-              <a:gd name="connsiteY3" fmla="*/ 4119367 h 4281985"/>
-              <a:gd name="connsiteX4" fmla="*/ 0 w 422424"/>
-              <a:gd name="connsiteY4" fmla="*/ 335280 h 4281985"/>
-            </a:gdLst>
-            <a:ahLst/>
-            <a:cxnLst>
-              <a:cxn ang="0">
-                <a:pos x="connsiteX0" y="connsiteY0"/>
-              </a:cxn>
-              <a:cxn ang="0">
-                <a:pos x="connsiteX1" y="connsiteY1"/>
-              </a:cxn>
-              <a:cxn ang="0">
-                <a:pos x="connsiteX2" y="connsiteY2"/>
-              </a:cxn>
-              <a:cxn ang="0">
-                <a:pos x="connsiteX3" y="connsiteY3"/>
-              </a:cxn>
-              <a:cxn ang="0">
-                <a:pos x="connsiteX4" y="connsiteY4"/>
-              </a:cxn>
-            </a:cxnLst>
-            <a:rect l="l" t="t" r="r" b="b"/>
-            <a:pathLst>
-              <a:path w="422424" h="4281985">
-                <a:moveTo>
-                  <a:pt x="0" y="335280"/>
-                </a:moveTo>
-                <a:lnTo>
-                  <a:pt x="419794" y="0"/>
-                </a:lnTo>
-                <a:cubicBezTo>
-                  <a:pt x="420671" y="1427328"/>
-                  <a:pt x="421547" y="2854657"/>
-                  <a:pt x="422424" y="4281985"/>
-                </a:cubicBezTo>
-                <a:lnTo>
-                  <a:pt x="2512" y="4119367"/>
-                </a:lnTo>
-                <a:cubicBezTo>
-                  <a:pt x="1675" y="2858005"/>
-                  <a:pt x="837" y="1596642"/>
-                  <a:pt x="0" y="335280"/>
-                </a:cubicBezTo>
-                <a:close/>
-              </a:path>
-            </a:pathLst>
-          </a:custGeom>
-          <a:solidFill>
-            <a:schemeClr val="tx1"/>
-          </a:solidFill>
-          <a:ln>
-            <a:noFill/>
-          </a:ln>
-        </p:spPr>
-        <p:style>
-          <a:lnRef idx="2">
-            <a:schemeClr val="accent1">
-              <a:shade val="15000"/>
-            </a:schemeClr>
-          </a:lnRef>
-          <a:fillRef idx="1">
-            <a:schemeClr val="accent1"/>
-          </a:fillRef>
-          <a:effectRef idx="0">
-            <a:schemeClr val="accent1"/>
-          </a:effectRef>
-          <a:fontRef idx="minor">
-            <a:schemeClr val="lt1"/>
-          </a:fontRef>
-        </p:style>
-        <p:txBody>
-          <a:bodyPr rtlCol="0" anchor="ctr"/>
-          <a:lstStyle/>
-          <a:p>
-            <a:pPr algn="ctr"/>
-            <a:endParaRPr lang="en-IN" dirty="0"/>
-          </a:p>
-        </p:txBody>
-      </p:sp>
-      <p:sp>
-        <p:nvSpPr>
-          <p:cNvPr id="9" name="Freeform: Shape 8">
-            <a:extLst>
-              <a:ext uri="{FF2B5EF4-FFF2-40B4-BE49-F238E27FC236}">
-                <a16:creationId xmlns:a16="http://schemas.microsoft.com/office/drawing/2014/main" id="{563EE6A8-81BC-AC9F-716A-6DB18CCA5934}"/>
-              </a:ext>
-            </a:extLst>
-          </p:cNvPr>
-          <p:cNvSpPr/>
-          <p:nvPr/>
-        </p:nvSpPr>
-        <p:spPr>
           <a:xfrm rot="15999561">
-            <a:off x="4578069" y="2348297"/>
-            <a:ext cx="5059656" cy="3516241"/>
+            <a:off x="4723282" y="1926929"/>
+            <a:ext cx="1616482" cy="1708738"/>
           </a:xfrm>
           <a:custGeom>
             <a:avLst/>
@@ -4038,10 +4405,1340 @@
           </a:p>
         </p:txBody>
       </p:sp>
+      <p:sp>
+        <p:nvSpPr>
+          <p:cNvPr id="11" name="Block Arc 10">
+            <a:extLst>
+              <a:ext uri="{FF2B5EF4-FFF2-40B4-BE49-F238E27FC236}">
+                <a16:creationId xmlns:a16="http://schemas.microsoft.com/office/drawing/2014/main" id="{745D6ED8-5B09-A4EE-A54A-D4AAEED3660A}"/>
+              </a:ext>
+            </a:extLst>
+          </p:cNvPr>
+          <p:cNvSpPr/>
+          <p:nvPr/>
+        </p:nvSpPr>
+        <p:spPr>
+          <a:xfrm rot="15921863">
+            <a:off x="1981698" y="2268673"/>
+            <a:ext cx="1362075" cy="1354814"/>
+          </a:xfrm>
+          <a:prstGeom prst="blockArc">
+            <a:avLst>
+              <a:gd name="adj1" fmla="val 10800000"/>
+              <a:gd name="adj2" fmla="val 1245465"/>
+              <a:gd name="adj3" fmla="val 5595"/>
+            </a:avLst>
+          </a:prstGeom>
+        </p:spPr>
+        <p:style>
+          <a:lnRef idx="2">
+            <a:schemeClr val="accent1">
+              <a:shade val="15000"/>
+            </a:schemeClr>
+          </a:lnRef>
+          <a:fillRef idx="1">
+            <a:schemeClr val="accent1"/>
+          </a:fillRef>
+          <a:effectRef idx="0">
+            <a:schemeClr val="accent1"/>
+          </a:effectRef>
+          <a:fontRef idx="minor">
+            <a:schemeClr val="lt1"/>
+          </a:fontRef>
+        </p:style>
+        <p:txBody>
+          <a:bodyPr rtlCol="0" anchor="ctr"/>
+          <a:lstStyle/>
+          <a:p>
+            <a:pPr algn="ctr"/>
+            <a:endParaRPr lang="en-IN">
+              <a:solidFill>
+                <a:schemeClr val="tx1"/>
+              </a:solidFill>
+            </a:endParaRPr>
+          </a:p>
+        </p:txBody>
+      </p:sp>
     </p:spTree>
     <p:extLst>
       <p:ext uri="{BB962C8B-B14F-4D97-AF65-F5344CB8AC3E}">
-        <p14:creationId xmlns:p14="http://schemas.microsoft.com/office/powerpoint/2010/main" val="2447756666"/>
+        <p14:creationId xmlns:p14="http://schemas.microsoft.com/office/powerpoint/2010/main" val="3311745448"/>
+      </p:ext>
+    </p:extLst>
+  </p:cSld>
+  <p:clrMapOvr>
+    <a:masterClrMapping/>
+  </p:clrMapOvr>
+</p:sld>
+</file>
+
+<file path=ppt/slides/slide3.xml><?xml version="1.0" encoding="utf-8"?>
+<p:sld xmlns:a="http://schemas.openxmlformats.org/drawingml/2006/main" xmlns:r="http://schemas.openxmlformats.org/officeDocument/2006/relationships" xmlns:p="http://schemas.openxmlformats.org/presentationml/2006/main">
+  <p:cSld>
+    <p:spTree>
+      <p:nvGrpSpPr>
+        <p:cNvPr id="1" name="">
+          <a:extLst>
+            <a:ext uri="{FF2B5EF4-FFF2-40B4-BE49-F238E27FC236}">
+              <a16:creationId xmlns:a16="http://schemas.microsoft.com/office/drawing/2014/main" id="{B960BFAE-7BA3-697B-FBEB-428298303F9E}"/>
+            </a:ext>
+          </a:extLst>
+        </p:cNvPr>
+        <p:cNvGrpSpPr/>
+        <p:nvPr/>
+      </p:nvGrpSpPr>
+      <p:grpSpPr>
+        <a:xfrm>
+          <a:off x="0" y="0"/>
+          <a:ext cx="0" cy="0"/>
+          <a:chOff x="0" y="0"/>
+          <a:chExt cx="0" cy="0"/>
+        </a:xfrm>
+      </p:grpSpPr>
+      <p:sp>
+        <p:nvSpPr>
+          <p:cNvPr id="2" name="Rectangle: Rounded Corners 1">
+            <a:extLst>
+              <a:ext uri="{FF2B5EF4-FFF2-40B4-BE49-F238E27FC236}">
+                <a16:creationId xmlns:a16="http://schemas.microsoft.com/office/drawing/2014/main" id="{B98C684C-879C-31E0-AF32-6F4C796F0747}"/>
+              </a:ext>
+            </a:extLst>
+          </p:cNvPr>
+          <p:cNvSpPr/>
+          <p:nvPr/>
+        </p:nvSpPr>
+        <p:spPr>
+          <a:xfrm>
+            <a:off x="2843418" y="133350"/>
+            <a:ext cx="6505164" cy="6440825"/>
+          </a:xfrm>
+          <a:prstGeom prst="roundRect">
+            <a:avLst/>
+          </a:prstGeom>
+          <a:solidFill>
+            <a:schemeClr val="tx1"/>
+          </a:solidFill>
+          <a:ln>
+            <a:noFill/>
+          </a:ln>
+        </p:spPr>
+        <p:style>
+          <a:lnRef idx="2">
+            <a:schemeClr val="accent1">
+              <a:shade val="15000"/>
+            </a:schemeClr>
+          </a:lnRef>
+          <a:fillRef idx="1">
+            <a:schemeClr val="accent1"/>
+          </a:fillRef>
+          <a:effectRef idx="0">
+            <a:schemeClr val="accent1"/>
+          </a:effectRef>
+          <a:fontRef idx="minor">
+            <a:schemeClr val="lt1"/>
+          </a:fontRef>
+        </p:style>
+        <p:txBody>
+          <a:bodyPr rtlCol="0" anchor="ctr"/>
+          <a:lstStyle>
+            <a:defPPr>
+              <a:defRPr lang="en-US"/>
+            </a:defPPr>
+            <a:lvl1pPr marL="0" algn="l" defTabSz="914400" rtl="0" eaLnBrk="1" latinLnBrk="0" hangingPunct="1">
+              <a:defRPr sz="1800" kern="1200">
+                <a:solidFill>
+                  <a:schemeClr val="lt1"/>
+                </a:solidFill>
+                <a:latin typeface="+mn-lt"/>
+                <a:ea typeface="+mn-ea"/>
+                <a:cs typeface="+mn-cs"/>
+              </a:defRPr>
+            </a:lvl1pPr>
+            <a:lvl2pPr marL="457200" algn="l" defTabSz="914400" rtl="0" eaLnBrk="1" latinLnBrk="0" hangingPunct="1">
+              <a:defRPr sz="1800" kern="1200">
+                <a:solidFill>
+                  <a:schemeClr val="lt1"/>
+                </a:solidFill>
+                <a:latin typeface="+mn-lt"/>
+                <a:ea typeface="+mn-ea"/>
+                <a:cs typeface="+mn-cs"/>
+              </a:defRPr>
+            </a:lvl2pPr>
+            <a:lvl3pPr marL="914400" algn="l" defTabSz="914400" rtl="0" eaLnBrk="1" latinLnBrk="0" hangingPunct="1">
+              <a:defRPr sz="1800" kern="1200">
+                <a:solidFill>
+                  <a:schemeClr val="lt1"/>
+                </a:solidFill>
+                <a:latin typeface="+mn-lt"/>
+                <a:ea typeface="+mn-ea"/>
+                <a:cs typeface="+mn-cs"/>
+              </a:defRPr>
+            </a:lvl3pPr>
+            <a:lvl4pPr marL="1371600" algn="l" defTabSz="914400" rtl="0" eaLnBrk="1" latinLnBrk="0" hangingPunct="1">
+              <a:defRPr sz="1800" kern="1200">
+                <a:solidFill>
+                  <a:schemeClr val="lt1"/>
+                </a:solidFill>
+                <a:latin typeface="+mn-lt"/>
+                <a:ea typeface="+mn-ea"/>
+                <a:cs typeface="+mn-cs"/>
+              </a:defRPr>
+            </a:lvl4pPr>
+            <a:lvl5pPr marL="1828800" algn="l" defTabSz="914400" rtl="0" eaLnBrk="1" latinLnBrk="0" hangingPunct="1">
+              <a:defRPr sz="1800" kern="1200">
+                <a:solidFill>
+                  <a:schemeClr val="lt1"/>
+                </a:solidFill>
+                <a:latin typeface="+mn-lt"/>
+                <a:ea typeface="+mn-ea"/>
+                <a:cs typeface="+mn-cs"/>
+              </a:defRPr>
+            </a:lvl5pPr>
+            <a:lvl6pPr marL="2286000" algn="l" defTabSz="914400" rtl="0" eaLnBrk="1" latinLnBrk="0" hangingPunct="1">
+              <a:defRPr sz="1800" kern="1200">
+                <a:solidFill>
+                  <a:schemeClr val="lt1"/>
+                </a:solidFill>
+                <a:latin typeface="+mn-lt"/>
+                <a:ea typeface="+mn-ea"/>
+                <a:cs typeface="+mn-cs"/>
+              </a:defRPr>
+            </a:lvl6pPr>
+            <a:lvl7pPr marL="2743200" algn="l" defTabSz="914400" rtl="0" eaLnBrk="1" latinLnBrk="0" hangingPunct="1">
+              <a:defRPr sz="1800" kern="1200">
+                <a:solidFill>
+                  <a:schemeClr val="lt1"/>
+                </a:solidFill>
+                <a:latin typeface="+mn-lt"/>
+                <a:ea typeface="+mn-ea"/>
+                <a:cs typeface="+mn-cs"/>
+              </a:defRPr>
+            </a:lvl7pPr>
+            <a:lvl8pPr marL="3200400" algn="l" defTabSz="914400" rtl="0" eaLnBrk="1" latinLnBrk="0" hangingPunct="1">
+              <a:defRPr sz="1800" kern="1200">
+                <a:solidFill>
+                  <a:schemeClr val="lt1"/>
+                </a:solidFill>
+                <a:latin typeface="+mn-lt"/>
+                <a:ea typeface="+mn-ea"/>
+                <a:cs typeface="+mn-cs"/>
+              </a:defRPr>
+            </a:lvl8pPr>
+            <a:lvl9pPr marL="3657600" algn="l" defTabSz="914400" rtl="0" eaLnBrk="1" latinLnBrk="0" hangingPunct="1">
+              <a:defRPr sz="1800" kern="1200">
+                <a:solidFill>
+                  <a:schemeClr val="lt1"/>
+                </a:solidFill>
+                <a:latin typeface="+mn-lt"/>
+                <a:ea typeface="+mn-ea"/>
+                <a:cs typeface="+mn-cs"/>
+              </a:defRPr>
+            </a:lvl9pPr>
+          </a:lstStyle>
+          <a:p>
+            <a:pPr algn="ctr"/>
+            <a:endParaRPr lang="en-IN" dirty="0"/>
+          </a:p>
+        </p:txBody>
+      </p:sp>
+      <p:grpSp>
+        <p:nvGrpSpPr>
+          <p:cNvPr id="3" name="Group 2">
+            <a:extLst>
+              <a:ext uri="{FF2B5EF4-FFF2-40B4-BE49-F238E27FC236}">
+                <a16:creationId xmlns:a16="http://schemas.microsoft.com/office/drawing/2014/main" id="{C2074742-B5D5-B851-8F3A-ADD120F47E35}"/>
+              </a:ext>
+            </a:extLst>
+          </p:cNvPr>
+          <p:cNvGrpSpPr/>
+          <p:nvPr/>
+        </p:nvGrpSpPr>
+        <p:grpSpPr>
+          <a:xfrm>
+            <a:off x="3100388" y="370560"/>
+            <a:ext cx="5991224" cy="6354090"/>
+            <a:chOff x="2433638" y="370560"/>
+            <a:chExt cx="5991224" cy="6354090"/>
+          </a:xfrm>
+        </p:grpSpPr>
+        <p:sp>
+          <p:nvSpPr>
+            <p:cNvPr id="6" name="Oval 5">
+              <a:extLst>
+                <a:ext uri="{FF2B5EF4-FFF2-40B4-BE49-F238E27FC236}">
+                  <a16:creationId xmlns:a16="http://schemas.microsoft.com/office/drawing/2014/main" id="{6E1D1A32-36CB-1123-2704-DF52D5C3FBBF}"/>
+                </a:ext>
+              </a:extLst>
+            </p:cNvPr>
+            <p:cNvSpPr/>
+            <p:nvPr/>
+          </p:nvSpPr>
+          <p:spPr>
+            <a:xfrm rot="313311">
+              <a:off x="2433638" y="370560"/>
+              <a:ext cx="5991224" cy="5920119"/>
+            </a:xfrm>
+            <a:prstGeom prst="ellipse">
+              <a:avLst/>
+            </a:prstGeom>
+            <a:noFill/>
+            <a:ln w="228600">
+              <a:solidFill>
+                <a:schemeClr val="bg1"/>
+              </a:solidFill>
+            </a:ln>
+            <a:effectLst/>
+          </p:spPr>
+          <p:style>
+            <a:lnRef idx="2">
+              <a:schemeClr val="accent1">
+                <a:shade val="15000"/>
+              </a:schemeClr>
+            </a:lnRef>
+            <a:fillRef idx="1">
+              <a:schemeClr val="accent1"/>
+            </a:fillRef>
+            <a:effectRef idx="0">
+              <a:schemeClr val="accent1"/>
+            </a:effectRef>
+            <a:fontRef idx="minor">
+              <a:schemeClr val="lt1"/>
+            </a:fontRef>
+          </p:style>
+          <p:txBody>
+            <a:bodyPr rtlCol="0" anchor="ctr"/>
+            <a:lstStyle>
+              <a:defPPr>
+                <a:defRPr lang="en-US"/>
+              </a:defPPr>
+              <a:lvl1pPr marL="0" algn="l" defTabSz="914400" rtl="0" eaLnBrk="1" latinLnBrk="0" hangingPunct="1">
+                <a:defRPr sz="1800" kern="1200">
+                  <a:solidFill>
+                    <a:schemeClr val="lt1"/>
+                  </a:solidFill>
+                  <a:latin typeface="+mn-lt"/>
+                  <a:ea typeface="+mn-ea"/>
+                  <a:cs typeface="+mn-cs"/>
+                </a:defRPr>
+              </a:lvl1pPr>
+              <a:lvl2pPr marL="457200" algn="l" defTabSz="914400" rtl="0" eaLnBrk="1" latinLnBrk="0" hangingPunct="1">
+                <a:defRPr sz="1800" kern="1200">
+                  <a:solidFill>
+                    <a:schemeClr val="lt1"/>
+                  </a:solidFill>
+                  <a:latin typeface="+mn-lt"/>
+                  <a:ea typeface="+mn-ea"/>
+                  <a:cs typeface="+mn-cs"/>
+                </a:defRPr>
+              </a:lvl2pPr>
+              <a:lvl3pPr marL="914400" algn="l" defTabSz="914400" rtl="0" eaLnBrk="1" latinLnBrk="0" hangingPunct="1">
+                <a:defRPr sz="1800" kern="1200">
+                  <a:solidFill>
+                    <a:schemeClr val="lt1"/>
+                  </a:solidFill>
+                  <a:latin typeface="+mn-lt"/>
+                  <a:ea typeface="+mn-ea"/>
+                  <a:cs typeface="+mn-cs"/>
+                </a:defRPr>
+              </a:lvl3pPr>
+              <a:lvl4pPr marL="1371600" algn="l" defTabSz="914400" rtl="0" eaLnBrk="1" latinLnBrk="0" hangingPunct="1">
+                <a:defRPr sz="1800" kern="1200">
+                  <a:solidFill>
+                    <a:schemeClr val="lt1"/>
+                  </a:solidFill>
+                  <a:latin typeface="+mn-lt"/>
+                  <a:ea typeface="+mn-ea"/>
+                  <a:cs typeface="+mn-cs"/>
+                </a:defRPr>
+              </a:lvl4pPr>
+              <a:lvl5pPr marL="1828800" algn="l" defTabSz="914400" rtl="0" eaLnBrk="1" latinLnBrk="0" hangingPunct="1">
+                <a:defRPr sz="1800" kern="1200">
+                  <a:solidFill>
+                    <a:schemeClr val="lt1"/>
+                  </a:solidFill>
+                  <a:latin typeface="+mn-lt"/>
+                  <a:ea typeface="+mn-ea"/>
+                  <a:cs typeface="+mn-cs"/>
+                </a:defRPr>
+              </a:lvl5pPr>
+              <a:lvl6pPr marL="2286000" algn="l" defTabSz="914400" rtl="0" eaLnBrk="1" latinLnBrk="0" hangingPunct="1">
+                <a:defRPr sz="1800" kern="1200">
+                  <a:solidFill>
+                    <a:schemeClr val="lt1"/>
+                  </a:solidFill>
+                  <a:latin typeface="+mn-lt"/>
+                  <a:ea typeface="+mn-ea"/>
+                  <a:cs typeface="+mn-cs"/>
+                </a:defRPr>
+              </a:lvl6pPr>
+              <a:lvl7pPr marL="2743200" algn="l" defTabSz="914400" rtl="0" eaLnBrk="1" latinLnBrk="0" hangingPunct="1">
+                <a:defRPr sz="1800" kern="1200">
+                  <a:solidFill>
+                    <a:schemeClr val="lt1"/>
+                  </a:solidFill>
+                  <a:latin typeface="+mn-lt"/>
+                  <a:ea typeface="+mn-ea"/>
+                  <a:cs typeface="+mn-cs"/>
+                </a:defRPr>
+              </a:lvl7pPr>
+              <a:lvl8pPr marL="3200400" algn="l" defTabSz="914400" rtl="0" eaLnBrk="1" latinLnBrk="0" hangingPunct="1">
+                <a:defRPr sz="1800" kern="1200">
+                  <a:solidFill>
+                    <a:schemeClr val="lt1"/>
+                  </a:solidFill>
+                  <a:latin typeface="+mn-lt"/>
+                  <a:ea typeface="+mn-ea"/>
+                  <a:cs typeface="+mn-cs"/>
+                </a:defRPr>
+              </a:lvl8pPr>
+              <a:lvl9pPr marL="3657600" algn="l" defTabSz="914400" rtl="0" eaLnBrk="1" latinLnBrk="0" hangingPunct="1">
+                <a:defRPr sz="1800" kern="1200">
+                  <a:solidFill>
+                    <a:schemeClr val="lt1"/>
+                  </a:solidFill>
+                  <a:latin typeface="+mn-lt"/>
+                  <a:ea typeface="+mn-ea"/>
+                  <a:cs typeface="+mn-cs"/>
+                </a:defRPr>
+              </a:lvl9pPr>
+            </a:lstStyle>
+            <a:p>
+              <a:pPr algn="ctr"/>
+              <a:endParaRPr lang="en-IN" dirty="0">
+                <a:ln w="0"/>
+                <a:solidFill>
+                  <a:schemeClr val="tx1"/>
+                </a:solidFill>
+                <a:effectLst>
+                  <a:outerShdw blurRad="38100" dist="19050" dir="2700000" algn="tl" rotWithShape="0">
+                    <a:schemeClr val="dk1">
+                      <a:alpha val="40000"/>
+                    </a:schemeClr>
+                  </a:outerShdw>
+                </a:effectLst>
+              </a:endParaRPr>
+            </a:p>
+          </p:txBody>
+        </p:sp>
+        <p:sp>
+          <p:nvSpPr>
+            <p:cNvPr id="8" name="Rectangle 4">
+              <a:extLst>
+                <a:ext uri="{FF2B5EF4-FFF2-40B4-BE49-F238E27FC236}">
+                  <a16:creationId xmlns:a16="http://schemas.microsoft.com/office/drawing/2014/main" id="{8F41DCEA-5F8E-94CF-2C3C-6DCFC35DAE63}"/>
+                </a:ext>
+              </a:extLst>
+            </p:cNvPr>
+            <p:cNvSpPr/>
+            <p:nvPr/>
+          </p:nvSpPr>
+          <p:spPr>
+            <a:xfrm rot="19649320">
+              <a:off x="3405706" y="2046187"/>
+              <a:ext cx="487811" cy="4613964"/>
+            </a:xfrm>
+            <a:custGeom>
+              <a:avLst/>
+              <a:gdLst>
+                <a:gd name="connsiteX0" fmla="*/ 0 w 417282"/>
+                <a:gd name="connsiteY0" fmla="*/ 0 h 4119367"/>
+                <a:gd name="connsiteX1" fmla="*/ 417282 w 417282"/>
+                <a:gd name="connsiteY1" fmla="*/ 0 h 4119367"/>
+                <a:gd name="connsiteX2" fmla="*/ 417282 w 417282"/>
+                <a:gd name="connsiteY2" fmla="*/ 4119367 h 4119367"/>
+                <a:gd name="connsiteX3" fmla="*/ 0 w 417282"/>
+                <a:gd name="connsiteY3" fmla="*/ 4119367 h 4119367"/>
+                <a:gd name="connsiteX4" fmla="*/ 0 w 417282"/>
+                <a:gd name="connsiteY4" fmla="*/ 0 h 4119367"/>
+                <a:gd name="connsiteX0" fmla="*/ 0 w 419794"/>
+                <a:gd name="connsiteY0" fmla="*/ 335280 h 4119367"/>
+                <a:gd name="connsiteX1" fmla="*/ 419794 w 419794"/>
+                <a:gd name="connsiteY1" fmla="*/ 0 h 4119367"/>
+                <a:gd name="connsiteX2" fmla="*/ 419794 w 419794"/>
+                <a:gd name="connsiteY2" fmla="*/ 4119367 h 4119367"/>
+                <a:gd name="connsiteX3" fmla="*/ 2512 w 419794"/>
+                <a:gd name="connsiteY3" fmla="*/ 4119367 h 4119367"/>
+                <a:gd name="connsiteX4" fmla="*/ 0 w 419794"/>
+                <a:gd name="connsiteY4" fmla="*/ 335280 h 4119367"/>
+                <a:gd name="connsiteX0" fmla="*/ 0 w 422424"/>
+                <a:gd name="connsiteY0" fmla="*/ 335280 h 4281985"/>
+                <a:gd name="connsiteX1" fmla="*/ 419794 w 422424"/>
+                <a:gd name="connsiteY1" fmla="*/ 0 h 4281985"/>
+                <a:gd name="connsiteX2" fmla="*/ 422424 w 422424"/>
+                <a:gd name="connsiteY2" fmla="*/ 4281985 h 4281985"/>
+                <a:gd name="connsiteX3" fmla="*/ 2512 w 422424"/>
+                <a:gd name="connsiteY3" fmla="*/ 4119367 h 4281985"/>
+                <a:gd name="connsiteX4" fmla="*/ 0 w 422424"/>
+                <a:gd name="connsiteY4" fmla="*/ 335280 h 4281985"/>
+              </a:gdLst>
+              <a:ahLst/>
+              <a:cxnLst>
+                <a:cxn ang="0">
+                  <a:pos x="connsiteX0" y="connsiteY0"/>
+                </a:cxn>
+                <a:cxn ang="0">
+                  <a:pos x="connsiteX1" y="connsiteY1"/>
+                </a:cxn>
+                <a:cxn ang="0">
+                  <a:pos x="connsiteX2" y="connsiteY2"/>
+                </a:cxn>
+                <a:cxn ang="0">
+                  <a:pos x="connsiteX3" y="connsiteY3"/>
+                </a:cxn>
+                <a:cxn ang="0">
+                  <a:pos x="connsiteX4" y="connsiteY4"/>
+                </a:cxn>
+              </a:cxnLst>
+              <a:rect l="l" t="t" r="r" b="b"/>
+              <a:pathLst>
+                <a:path w="422424" h="4281985">
+                  <a:moveTo>
+                    <a:pt x="0" y="335280"/>
+                  </a:moveTo>
+                  <a:lnTo>
+                    <a:pt x="419794" y="0"/>
+                  </a:lnTo>
+                  <a:cubicBezTo>
+                    <a:pt x="420671" y="1427328"/>
+                    <a:pt x="421547" y="2854657"/>
+                    <a:pt x="422424" y="4281985"/>
+                  </a:cubicBezTo>
+                  <a:lnTo>
+                    <a:pt x="2512" y="4119367"/>
+                  </a:lnTo>
+                  <a:cubicBezTo>
+                    <a:pt x="1675" y="2858005"/>
+                    <a:pt x="837" y="1596642"/>
+                    <a:pt x="0" y="335280"/>
+                  </a:cubicBezTo>
+                  <a:close/>
+                </a:path>
+              </a:pathLst>
+            </a:custGeom>
+            <a:solidFill>
+              <a:schemeClr val="bg1"/>
+            </a:solidFill>
+            <a:ln>
+              <a:solidFill>
+                <a:schemeClr val="bg1"/>
+              </a:solidFill>
+            </a:ln>
+          </p:spPr>
+          <p:style>
+            <a:lnRef idx="2">
+              <a:schemeClr val="accent1">
+                <a:shade val="15000"/>
+              </a:schemeClr>
+            </a:lnRef>
+            <a:fillRef idx="1">
+              <a:schemeClr val="accent1"/>
+            </a:fillRef>
+            <a:effectRef idx="0">
+              <a:schemeClr val="accent1"/>
+            </a:effectRef>
+            <a:fontRef idx="minor">
+              <a:schemeClr val="lt1"/>
+            </a:fontRef>
+          </p:style>
+          <p:txBody>
+            <a:bodyPr rtlCol="0" anchor="ctr"/>
+            <a:lstStyle>
+              <a:defPPr>
+                <a:defRPr lang="en-US"/>
+              </a:defPPr>
+              <a:lvl1pPr marL="0" algn="l" defTabSz="914400" rtl="0" eaLnBrk="1" latinLnBrk="0" hangingPunct="1">
+                <a:defRPr sz="1800" kern="1200">
+                  <a:solidFill>
+                    <a:schemeClr val="lt1"/>
+                  </a:solidFill>
+                  <a:latin typeface="+mn-lt"/>
+                  <a:ea typeface="+mn-ea"/>
+                  <a:cs typeface="+mn-cs"/>
+                </a:defRPr>
+              </a:lvl1pPr>
+              <a:lvl2pPr marL="457200" algn="l" defTabSz="914400" rtl="0" eaLnBrk="1" latinLnBrk="0" hangingPunct="1">
+                <a:defRPr sz="1800" kern="1200">
+                  <a:solidFill>
+                    <a:schemeClr val="lt1"/>
+                  </a:solidFill>
+                  <a:latin typeface="+mn-lt"/>
+                  <a:ea typeface="+mn-ea"/>
+                  <a:cs typeface="+mn-cs"/>
+                </a:defRPr>
+              </a:lvl2pPr>
+              <a:lvl3pPr marL="914400" algn="l" defTabSz="914400" rtl="0" eaLnBrk="1" latinLnBrk="0" hangingPunct="1">
+                <a:defRPr sz="1800" kern="1200">
+                  <a:solidFill>
+                    <a:schemeClr val="lt1"/>
+                  </a:solidFill>
+                  <a:latin typeface="+mn-lt"/>
+                  <a:ea typeface="+mn-ea"/>
+                  <a:cs typeface="+mn-cs"/>
+                </a:defRPr>
+              </a:lvl3pPr>
+              <a:lvl4pPr marL="1371600" algn="l" defTabSz="914400" rtl="0" eaLnBrk="1" latinLnBrk="0" hangingPunct="1">
+                <a:defRPr sz="1800" kern="1200">
+                  <a:solidFill>
+                    <a:schemeClr val="lt1"/>
+                  </a:solidFill>
+                  <a:latin typeface="+mn-lt"/>
+                  <a:ea typeface="+mn-ea"/>
+                  <a:cs typeface="+mn-cs"/>
+                </a:defRPr>
+              </a:lvl4pPr>
+              <a:lvl5pPr marL="1828800" algn="l" defTabSz="914400" rtl="0" eaLnBrk="1" latinLnBrk="0" hangingPunct="1">
+                <a:defRPr sz="1800" kern="1200">
+                  <a:solidFill>
+                    <a:schemeClr val="lt1"/>
+                  </a:solidFill>
+                  <a:latin typeface="+mn-lt"/>
+                  <a:ea typeface="+mn-ea"/>
+                  <a:cs typeface="+mn-cs"/>
+                </a:defRPr>
+              </a:lvl5pPr>
+              <a:lvl6pPr marL="2286000" algn="l" defTabSz="914400" rtl="0" eaLnBrk="1" latinLnBrk="0" hangingPunct="1">
+                <a:defRPr sz="1800" kern="1200">
+                  <a:solidFill>
+                    <a:schemeClr val="lt1"/>
+                  </a:solidFill>
+                  <a:latin typeface="+mn-lt"/>
+                  <a:ea typeface="+mn-ea"/>
+                  <a:cs typeface="+mn-cs"/>
+                </a:defRPr>
+              </a:lvl6pPr>
+              <a:lvl7pPr marL="2743200" algn="l" defTabSz="914400" rtl="0" eaLnBrk="1" latinLnBrk="0" hangingPunct="1">
+                <a:defRPr sz="1800" kern="1200">
+                  <a:solidFill>
+                    <a:schemeClr val="lt1"/>
+                  </a:solidFill>
+                  <a:latin typeface="+mn-lt"/>
+                  <a:ea typeface="+mn-ea"/>
+                  <a:cs typeface="+mn-cs"/>
+                </a:defRPr>
+              </a:lvl7pPr>
+              <a:lvl8pPr marL="3200400" algn="l" defTabSz="914400" rtl="0" eaLnBrk="1" latinLnBrk="0" hangingPunct="1">
+                <a:defRPr sz="1800" kern="1200">
+                  <a:solidFill>
+                    <a:schemeClr val="lt1"/>
+                  </a:solidFill>
+                  <a:latin typeface="+mn-lt"/>
+                  <a:ea typeface="+mn-ea"/>
+                  <a:cs typeface="+mn-cs"/>
+                </a:defRPr>
+              </a:lvl8pPr>
+              <a:lvl9pPr marL="3657600" algn="l" defTabSz="914400" rtl="0" eaLnBrk="1" latinLnBrk="0" hangingPunct="1">
+                <a:defRPr sz="1800" kern="1200">
+                  <a:solidFill>
+                    <a:schemeClr val="lt1"/>
+                  </a:solidFill>
+                  <a:latin typeface="+mn-lt"/>
+                  <a:ea typeface="+mn-ea"/>
+                  <a:cs typeface="+mn-cs"/>
+                </a:defRPr>
+              </a:lvl9pPr>
+            </a:lstStyle>
+            <a:p>
+              <a:pPr algn="ctr"/>
+              <a:endParaRPr lang="en-IN" dirty="0"/>
+            </a:p>
+          </p:txBody>
+        </p:sp>
+        <p:sp>
+          <p:nvSpPr>
+            <p:cNvPr id="10" name="Rectangle 4">
+              <a:extLst>
+                <a:ext uri="{FF2B5EF4-FFF2-40B4-BE49-F238E27FC236}">
+                  <a16:creationId xmlns:a16="http://schemas.microsoft.com/office/drawing/2014/main" id="{E51A5B58-85C1-7270-059D-4C17EB8D2B6F}"/>
+                </a:ext>
+              </a:extLst>
+            </p:cNvPr>
+            <p:cNvSpPr/>
+            <p:nvPr/>
+          </p:nvSpPr>
+          <p:spPr>
+            <a:xfrm rot="19649320">
+              <a:off x="3943890" y="1343340"/>
+              <a:ext cx="477199" cy="5381310"/>
+            </a:xfrm>
+            <a:custGeom>
+              <a:avLst/>
+              <a:gdLst>
+                <a:gd name="connsiteX0" fmla="*/ 0 w 417282"/>
+                <a:gd name="connsiteY0" fmla="*/ 0 h 4119367"/>
+                <a:gd name="connsiteX1" fmla="*/ 417282 w 417282"/>
+                <a:gd name="connsiteY1" fmla="*/ 0 h 4119367"/>
+                <a:gd name="connsiteX2" fmla="*/ 417282 w 417282"/>
+                <a:gd name="connsiteY2" fmla="*/ 4119367 h 4119367"/>
+                <a:gd name="connsiteX3" fmla="*/ 0 w 417282"/>
+                <a:gd name="connsiteY3" fmla="*/ 4119367 h 4119367"/>
+                <a:gd name="connsiteX4" fmla="*/ 0 w 417282"/>
+                <a:gd name="connsiteY4" fmla="*/ 0 h 4119367"/>
+                <a:gd name="connsiteX0" fmla="*/ 0 w 419794"/>
+                <a:gd name="connsiteY0" fmla="*/ 335280 h 4119367"/>
+                <a:gd name="connsiteX1" fmla="*/ 419794 w 419794"/>
+                <a:gd name="connsiteY1" fmla="*/ 0 h 4119367"/>
+                <a:gd name="connsiteX2" fmla="*/ 419794 w 419794"/>
+                <a:gd name="connsiteY2" fmla="*/ 4119367 h 4119367"/>
+                <a:gd name="connsiteX3" fmla="*/ 2512 w 419794"/>
+                <a:gd name="connsiteY3" fmla="*/ 4119367 h 4119367"/>
+                <a:gd name="connsiteX4" fmla="*/ 0 w 419794"/>
+                <a:gd name="connsiteY4" fmla="*/ 335280 h 4119367"/>
+                <a:gd name="connsiteX0" fmla="*/ 0 w 422424"/>
+                <a:gd name="connsiteY0" fmla="*/ 335280 h 4281985"/>
+                <a:gd name="connsiteX1" fmla="*/ 419794 w 422424"/>
+                <a:gd name="connsiteY1" fmla="*/ 0 h 4281985"/>
+                <a:gd name="connsiteX2" fmla="*/ 422424 w 422424"/>
+                <a:gd name="connsiteY2" fmla="*/ 4281985 h 4281985"/>
+                <a:gd name="connsiteX3" fmla="*/ 2512 w 422424"/>
+                <a:gd name="connsiteY3" fmla="*/ 4119367 h 4281985"/>
+                <a:gd name="connsiteX4" fmla="*/ 0 w 422424"/>
+                <a:gd name="connsiteY4" fmla="*/ 335280 h 4281985"/>
+              </a:gdLst>
+              <a:ahLst/>
+              <a:cxnLst>
+                <a:cxn ang="0">
+                  <a:pos x="connsiteX0" y="connsiteY0"/>
+                </a:cxn>
+                <a:cxn ang="0">
+                  <a:pos x="connsiteX1" y="connsiteY1"/>
+                </a:cxn>
+                <a:cxn ang="0">
+                  <a:pos x="connsiteX2" y="connsiteY2"/>
+                </a:cxn>
+                <a:cxn ang="0">
+                  <a:pos x="connsiteX3" y="connsiteY3"/>
+                </a:cxn>
+                <a:cxn ang="0">
+                  <a:pos x="connsiteX4" y="connsiteY4"/>
+                </a:cxn>
+              </a:cxnLst>
+              <a:rect l="l" t="t" r="r" b="b"/>
+              <a:pathLst>
+                <a:path w="422424" h="4281985">
+                  <a:moveTo>
+                    <a:pt x="0" y="335280"/>
+                  </a:moveTo>
+                  <a:lnTo>
+                    <a:pt x="419794" y="0"/>
+                  </a:lnTo>
+                  <a:cubicBezTo>
+                    <a:pt x="420671" y="1427328"/>
+                    <a:pt x="421547" y="2854657"/>
+                    <a:pt x="422424" y="4281985"/>
+                  </a:cubicBezTo>
+                  <a:lnTo>
+                    <a:pt x="2512" y="4119367"/>
+                  </a:lnTo>
+                  <a:cubicBezTo>
+                    <a:pt x="1675" y="2858005"/>
+                    <a:pt x="837" y="1596642"/>
+                    <a:pt x="0" y="335280"/>
+                  </a:cubicBezTo>
+                  <a:close/>
+                </a:path>
+              </a:pathLst>
+            </a:custGeom>
+            <a:solidFill>
+              <a:schemeClr val="bg1"/>
+            </a:solidFill>
+            <a:ln>
+              <a:solidFill>
+                <a:schemeClr val="bg1"/>
+              </a:solidFill>
+            </a:ln>
+          </p:spPr>
+          <p:style>
+            <a:lnRef idx="2">
+              <a:schemeClr val="accent1">
+                <a:shade val="15000"/>
+              </a:schemeClr>
+            </a:lnRef>
+            <a:fillRef idx="1">
+              <a:schemeClr val="accent1"/>
+            </a:fillRef>
+            <a:effectRef idx="0">
+              <a:schemeClr val="accent1"/>
+            </a:effectRef>
+            <a:fontRef idx="minor">
+              <a:schemeClr val="lt1"/>
+            </a:fontRef>
+          </p:style>
+          <p:txBody>
+            <a:bodyPr rtlCol="0" anchor="ctr"/>
+            <a:lstStyle>
+              <a:defPPr>
+                <a:defRPr lang="en-US"/>
+              </a:defPPr>
+              <a:lvl1pPr marL="0" algn="l" defTabSz="914400" rtl="0" eaLnBrk="1" latinLnBrk="0" hangingPunct="1">
+                <a:defRPr sz="1800" kern="1200">
+                  <a:solidFill>
+                    <a:schemeClr val="lt1"/>
+                  </a:solidFill>
+                  <a:latin typeface="+mn-lt"/>
+                  <a:ea typeface="+mn-ea"/>
+                  <a:cs typeface="+mn-cs"/>
+                </a:defRPr>
+              </a:lvl1pPr>
+              <a:lvl2pPr marL="457200" algn="l" defTabSz="914400" rtl="0" eaLnBrk="1" latinLnBrk="0" hangingPunct="1">
+                <a:defRPr sz="1800" kern="1200">
+                  <a:solidFill>
+                    <a:schemeClr val="lt1"/>
+                  </a:solidFill>
+                  <a:latin typeface="+mn-lt"/>
+                  <a:ea typeface="+mn-ea"/>
+                  <a:cs typeface="+mn-cs"/>
+                </a:defRPr>
+              </a:lvl2pPr>
+              <a:lvl3pPr marL="914400" algn="l" defTabSz="914400" rtl="0" eaLnBrk="1" latinLnBrk="0" hangingPunct="1">
+                <a:defRPr sz="1800" kern="1200">
+                  <a:solidFill>
+                    <a:schemeClr val="lt1"/>
+                  </a:solidFill>
+                  <a:latin typeface="+mn-lt"/>
+                  <a:ea typeface="+mn-ea"/>
+                  <a:cs typeface="+mn-cs"/>
+                </a:defRPr>
+              </a:lvl3pPr>
+              <a:lvl4pPr marL="1371600" algn="l" defTabSz="914400" rtl="0" eaLnBrk="1" latinLnBrk="0" hangingPunct="1">
+                <a:defRPr sz="1800" kern="1200">
+                  <a:solidFill>
+                    <a:schemeClr val="lt1"/>
+                  </a:solidFill>
+                  <a:latin typeface="+mn-lt"/>
+                  <a:ea typeface="+mn-ea"/>
+                  <a:cs typeface="+mn-cs"/>
+                </a:defRPr>
+              </a:lvl4pPr>
+              <a:lvl5pPr marL="1828800" algn="l" defTabSz="914400" rtl="0" eaLnBrk="1" latinLnBrk="0" hangingPunct="1">
+                <a:defRPr sz="1800" kern="1200">
+                  <a:solidFill>
+                    <a:schemeClr val="lt1"/>
+                  </a:solidFill>
+                  <a:latin typeface="+mn-lt"/>
+                  <a:ea typeface="+mn-ea"/>
+                  <a:cs typeface="+mn-cs"/>
+                </a:defRPr>
+              </a:lvl5pPr>
+              <a:lvl6pPr marL="2286000" algn="l" defTabSz="914400" rtl="0" eaLnBrk="1" latinLnBrk="0" hangingPunct="1">
+                <a:defRPr sz="1800" kern="1200">
+                  <a:solidFill>
+                    <a:schemeClr val="lt1"/>
+                  </a:solidFill>
+                  <a:latin typeface="+mn-lt"/>
+                  <a:ea typeface="+mn-ea"/>
+                  <a:cs typeface="+mn-cs"/>
+                </a:defRPr>
+              </a:lvl6pPr>
+              <a:lvl7pPr marL="2743200" algn="l" defTabSz="914400" rtl="0" eaLnBrk="1" latinLnBrk="0" hangingPunct="1">
+                <a:defRPr sz="1800" kern="1200">
+                  <a:solidFill>
+                    <a:schemeClr val="lt1"/>
+                  </a:solidFill>
+                  <a:latin typeface="+mn-lt"/>
+                  <a:ea typeface="+mn-ea"/>
+                  <a:cs typeface="+mn-cs"/>
+                </a:defRPr>
+              </a:lvl7pPr>
+              <a:lvl8pPr marL="3200400" algn="l" defTabSz="914400" rtl="0" eaLnBrk="1" latinLnBrk="0" hangingPunct="1">
+                <a:defRPr sz="1800" kern="1200">
+                  <a:solidFill>
+                    <a:schemeClr val="lt1"/>
+                  </a:solidFill>
+                  <a:latin typeface="+mn-lt"/>
+                  <a:ea typeface="+mn-ea"/>
+                  <a:cs typeface="+mn-cs"/>
+                </a:defRPr>
+              </a:lvl8pPr>
+              <a:lvl9pPr marL="3657600" algn="l" defTabSz="914400" rtl="0" eaLnBrk="1" latinLnBrk="0" hangingPunct="1">
+                <a:defRPr sz="1800" kern="1200">
+                  <a:solidFill>
+                    <a:schemeClr val="lt1"/>
+                  </a:solidFill>
+                  <a:latin typeface="+mn-lt"/>
+                  <a:ea typeface="+mn-ea"/>
+                  <a:cs typeface="+mn-cs"/>
+                </a:defRPr>
+              </a:lvl9pPr>
+            </a:lstStyle>
+            <a:p>
+              <a:pPr algn="ctr"/>
+              <a:endParaRPr lang="en-IN" dirty="0"/>
+            </a:p>
+          </p:txBody>
+        </p:sp>
+        <p:sp>
+          <p:nvSpPr>
+            <p:cNvPr id="11" name="Freeform: Shape 10">
+              <a:extLst>
+                <a:ext uri="{FF2B5EF4-FFF2-40B4-BE49-F238E27FC236}">
+                  <a16:creationId xmlns:a16="http://schemas.microsoft.com/office/drawing/2014/main" id="{563EE6A8-81BC-AC9F-716A-6DB18CCA5934}"/>
+                </a:ext>
+              </a:extLst>
+            </p:cNvPr>
+            <p:cNvSpPr/>
+            <p:nvPr/>
+          </p:nvSpPr>
+          <p:spPr>
+            <a:xfrm rot="15999561">
+              <a:off x="4370385" y="2332037"/>
+              <a:ext cx="4604324" cy="3238237"/>
+            </a:xfrm>
+            <a:custGeom>
+              <a:avLst/>
+              <a:gdLst>
+                <a:gd name="connsiteX0" fmla="*/ 1748927 w 5059656"/>
+                <a:gd name="connsiteY0" fmla="*/ 1170842 h 3516241"/>
+                <a:gd name="connsiteX1" fmla="*/ 1685465 w 5059656"/>
+                <a:gd name="connsiteY1" fmla="*/ 1260604 h 3516241"/>
+                <a:gd name="connsiteX2" fmla="*/ 1573064 w 5059656"/>
+                <a:gd name="connsiteY2" fmla="*/ 1479631 h 3516241"/>
+                <a:gd name="connsiteX3" fmla="*/ 1525632 w 5059656"/>
+                <a:gd name="connsiteY3" fmla="*/ 1641246 h 3516241"/>
+                <a:gd name="connsiteX4" fmla="*/ 88642 w 5059656"/>
+                <a:gd name="connsiteY4" fmla="*/ 679328 h 3516241"/>
+                <a:gd name="connsiteX5" fmla="*/ 0 w 5059656"/>
+                <a:gd name="connsiteY5" fmla="*/ 0 h 3516241"/>
+                <a:gd name="connsiteX6" fmla="*/ 1918153 w 5059656"/>
+                <a:gd name="connsiteY6" fmla="*/ 3270953 h 3516241"/>
+                <a:gd name="connsiteX7" fmla="*/ 1477261 w 5059656"/>
+                <a:gd name="connsiteY7" fmla="*/ 3270953 h 3516241"/>
+                <a:gd name="connsiteX8" fmla="*/ 1477261 w 5059656"/>
+                <a:gd name="connsiteY8" fmla="*/ 1981532 h 3516241"/>
+                <a:gd name="connsiteX9" fmla="*/ 1502029 w 5059656"/>
+                <a:gd name="connsiteY9" fmla="*/ 1721668 h 3516241"/>
+                <a:gd name="connsiteX10" fmla="*/ 1525632 w 5059656"/>
+                <a:gd name="connsiteY10" fmla="*/ 1641246 h 3516241"/>
+                <a:gd name="connsiteX11" fmla="*/ 1928174 w 5059656"/>
+                <a:gd name="connsiteY11" fmla="*/ 1910707 h 3516241"/>
+                <a:gd name="connsiteX12" fmla="*/ 1918153 w 5059656"/>
+                <a:gd name="connsiteY12" fmla="*/ 2015844 h 3516241"/>
+                <a:gd name="connsiteX13" fmla="*/ 4702667 w 5059656"/>
+                <a:gd name="connsiteY13" fmla="*/ 3270953 h 3516241"/>
+                <a:gd name="connsiteX14" fmla="*/ 4326652 w 5059656"/>
+                <a:gd name="connsiteY14" fmla="*/ 3516241 h 3516241"/>
+                <a:gd name="connsiteX15" fmla="*/ 1928174 w 5059656"/>
+                <a:gd name="connsiteY15" fmla="*/ 1910707 h 3516241"/>
+                <a:gd name="connsiteX16" fmla="*/ 1935819 w 5059656"/>
+                <a:gd name="connsiteY16" fmla="*/ 1830498 h 3516241"/>
+                <a:gd name="connsiteX17" fmla="*/ 2066653 w 5059656"/>
+                <a:gd name="connsiteY17" fmla="*/ 1501647 h 3516241"/>
+                <a:gd name="connsiteX18" fmla="*/ 2127174 w 5059656"/>
+                <a:gd name="connsiteY18" fmla="*/ 1424064 h 3516241"/>
+                <a:gd name="connsiteX19" fmla="*/ 4618764 w 5059656"/>
+                <a:gd name="connsiteY19" fmla="*/ 3092092 h 3516241"/>
+                <a:gd name="connsiteX20" fmla="*/ 4618764 w 5059656"/>
+                <a:gd name="connsiteY20" fmla="*/ 3270953 h 3516241"/>
+                <a:gd name="connsiteX21" fmla="*/ 5059655 w 5059656"/>
+                <a:gd name="connsiteY21" fmla="*/ 3270953 h 3516241"/>
+                <a:gd name="connsiteX22" fmla="*/ 4702667 w 5059656"/>
+                <a:gd name="connsiteY22" fmla="*/ 3270953 h 3516241"/>
+                <a:gd name="connsiteX23" fmla="*/ 4795488 w 5059656"/>
+                <a:gd name="connsiteY23" fmla="*/ 3210402 h 3516241"/>
+                <a:gd name="connsiteX24" fmla="*/ 4618764 w 5059656"/>
+                <a:gd name="connsiteY24" fmla="*/ 3092092 h 3516241"/>
+                <a:gd name="connsiteX25" fmla="*/ 4618764 w 5059656"/>
+                <a:gd name="connsiteY25" fmla="*/ 2015844 h 3516241"/>
+                <a:gd name="connsiteX26" fmla="*/ 3749246 w 5059656"/>
+                <a:gd name="connsiteY26" fmla="*/ 1096172 h 3516241"/>
+                <a:gd name="connsiteX27" fmla="*/ 2787672 w 5059656"/>
+                <a:gd name="connsiteY27" fmla="*/ 1096172 h 3516241"/>
+                <a:gd name="connsiteX28" fmla="*/ 2172829 w 5059656"/>
+                <a:gd name="connsiteY28" fmla="*/ 1365537 h 3516241"/>
+                <a:gd name="connsiteX29" fmla="*/ 2127174 w 5059656"/>
+                <a:gd name="connsiteY29" fmla="*/ 1424064 h 3516241"/>
+                <a:gd name="connsiteX30" fmla="*/ 1748927 w 5059656"/>
+                <a:gd name="connsiteY30" fmla="*/ 1170842 h 3516241"/>
+                <a:gd name="connsiteX31" fmla="*/ 1755645 w 5059656"/>
+                <a:gd name="connsiteY31" fmla="*/ 1161340 h 3516241"/>
+                <a:gd name="connsiteX32" fmla="*/ 2696365 w 5059656"/>
+                <a:gd name="connsiteY32" fmla="*/ 692110 h 3516241"/>
+                <a:gd name="connsiteX33" fmla="*/ 3840552 w 5059656"/>
+                <a:gd name="connsiteY33" fmla="*/ 692110 h 3516241"/>
+                <a:gd name="connsiteX34" fmla="*/ 5059656 w 5059656"/>
+                <a:gd name="connsiteY34" fmla="*/ 1981532 h 3516241"/>
+                <a:gd name="connsiteX35" fmla="*/ 5059655 w 5059656"/>
+                <a:gd name="connsiteY35" fmla="*/ 3270953 h 3516241"/>
+              </a:gdLst>
+              <a:ahLst/>
+              <a:cxnLst>
+                <a:cxn ang="0">
+                  <a:pos x="connsiteX0" y="connsiteY0"/>
+                </a:cxn>
+                <a:cxn ang="0">
+                  <a:pos x="connsiteX1" y="connsiteY1"/>
+                </a:cxn>
+                <a:cxn ang="0">
+                  <a:pos x="connsiteX2" y="connsiteY2"/>
+                </a:cxn>
+                <a:cxn ang="0">
+                  <a:pos x="connsiteX3" y="connsiteY3"/>
+                </a:cxn>
+                <a:cxn ang="0">
+                  <a:pos x="connsiteX4" y="connsiteY4"/>
+                </a:cxn>
+                <a:cxn ang="0">
+                  <a:pos x="connsiteX5" y="connsiteY5"/>
+                </a:cxn>
+                <a:cxn ang="0">
+                  <a:pos x="connsiteX6" y="connsiteY6"/>
+                </a:cxn>
+                <a:cxn ang="0">
+                  <a:pos x="connsiteX7" y="connsiteY7"/>
+                </a:cxn>
+                <a:cxn ang="0">
+                  <a:pos x="connsiteX8" y="connsiteY8"/>
+                </a:cxn>
+                <a:cxn ang="0">
+                  <a:pos x="connsiteX9" y="connsiteY9"/>
+                </a:cxn>
+                <a:cxn ang="0">
+                  <a:pos x="connsiteX10" y="connsiteY10"/>
+                </a:cxn>
+                <a:cxn ang="0">
+                  <a:pos x="connsiteX11" y="connsiteY11"/>
+                </a:cxn>
+                <a:cxn ang="0">
+                  <a:pos x="connsiteX12" y="connsiteY12"/>
+                </a:cxn>
+                <a:cxn ang="0">
+                  <a:pos x="connsiteX13" y="connsiteY13"/>
+                </a:cxn>
+                <a:cxn ang="0">
+                  <a:pos x="connsiteX14" y="connsiteY14"/>
+                </a:cxn>
+                <a:cxn ang="0">
+                  <a:pos x="connsiteX15" y="connsiteY15"/>
+                </a:cxn>
+                <a:cxn ang="0">
+                  <a:pos x="connsiteX16" y="connsiteY16"/>
+                </a:cxn>
+                <a:cxn ang="0">
+                  <a:pos x="connsiteX17" y="connsiteY17"/>
+                </a:cxn>
+                <a:cxn ang="0">
+                  <a:pos x="connsiteX18" y="connsiteY18"/>
+                </a:cxn>
+                <a:cxn ang="0">
+                  <a:pos x="connsiteX19" y="connsiteY19"/>
+                </a:cxn>
+                <a:cxn ang="0">
+                  <a:pos x="connsiteX20" y="connsiteY20"/>
+                </a:cxn>
+                <a:cxn ang="0">
+                  <a:pos x="connsiteX21" y="connsiteY21"/>
+                </a:cxn>
+                <a:cxn ang="0">
+                  <a:pos x="connsiteX22" y="connsiteY22"/>
+                </a:cxn>
+                <a:cxn ang="0">
+                  <a:pos x="connsiteX23" y="connsiteY23"/>
+                </a:cxn>
+                <a:cxn ang="0">
+                  <a:pos x="connsiteX24" y="connsiteY24"/>
+                </a:cxn>
+                <a:cxn ang="0">
+                  <a:pos x="connsiteX25" y="connsiteY25"/>
+                </a:cxn>
+                <a:cxn ang="0">
+                  <a:pos x="connsiteX26" y="connsiteY26"/>
+                </a:cxn>
+                <a:cxn ang="0">
+                  <a:pos x="connsiteX27" y="connsiteY27"/>
+                </a:cxn>
+                <a:cxn ang="0">
+                  <a:pos x="connsiteX28" y="connsiteY28"/>
+                </a:cxn>
+                <a:cxn ang="0">
+                  <a:pos x="connsiteX29" y="connsiteY29"/>
+                </a:cxn>
+                <a:cxn ang="0">
+                  <a:pos x="connsiteX30" y="connsiteY30"/>
+                </a:cxn>
+                <a:cxn ang="0">
+                  <a:pos x="connsiteX31" y="connsiteY31"/>
+                </a:cxn>
+                <a:cxn ang="0">
+                  <a:pos x="connsiteX32" y="connsiteY32"/>
+                </a:cxn>
+                <a:cxn ang="0">
+                  <a:pos x="connsiteX33" y="connsiteY33"/>
+                </a:cxn>
+                <a:cxn ang="0">
+                  <a:pos x="connsiteX34" y="connsiteY34"/>
+                </a:cxn>
+                <a:cxn ang="0">
+                  <a:pos x="connsiteX35" y="connsiteY35"/>
+                </a:cxn>
+              </a:cxnLst>
+              <a:rect l="l" t="t" r="r" b="b"/>
+              <a:pathLst>
+                <a:path w="5059656" h="3516241">
+                  <a:moveTo>
+                    <a:pt x="1748927" y="1170842"/>
+                  </a:moveTo>
+                  <a:lnTo>
+                    <a:pt x="1685465" y="1260604"/>
+                  </a:lnTo>
+                  <a:cubicBezTo>
+                    <a:pt x="1641649" y="1329202"/>
+                    <a:pt x="1603910" y="1402498"/>
+                    <a:pt x="1573064" y="1479631"/>
+                  </a:cubicBezTo>
+                  <a:lnTo>
+                    <a:pt x="1525632" y="1641246"/>
+                  </a:lnTo>
+                  <a:lnTo>
+                    <a:pt x="88642" y="679328"/>
+                  </a:lnTo>
+                  <a:lnTo>
+                    <a:pt x="0" y="0"/>
+                  </a:lnTo>
+                  <a:close/>
+                  <a:moveTo>
+                    <a:pt x="1918153" y="3270953"/>
+                  </a:moveTo>
+                  <a:lnTo>
+                    <a:pt x="1477261" y="3270953"/>
+                  </a:lnTo>
+                  <a:lnTo>
+                    <a:pt x="1477261" y="1981532"/>
+                  </a:lnTo>
+                  <a:cubicBezTo>
+                    <a:pt x="1477261" y="1892516"/>
+                    <a:pt x="1485789" y="1805607"/>
+                    <a:pt x="1502029" y="1721668"/>
+                  </a:cubicBezTo>
+                  <a:lnTo>
+                    <a:pt x="1525632" y="1641246"/>
+                  </a:lnTo>
+                  <a:lnTo>
+                    <a:pt x="1928174" y="1910707"/>
+                  </a:lnTo>
+                  <a:lnTo>
+                    <a:pt x="1918153" y="2015844"/>
+                  </a:lnTo>
+                  <a:close/>
+                  <a:moveTo>
+                    <a:pt x="4702667" y="3270953"/>
+                  </a:moveTo>
+                  <a:lnTo>
+                    <a:pt x="4326652" y="3516241"/>
+                  </a:lnTo>
+                  <a:lnTo>
+                    <a:pt x="1928174" y="1910707"/>
+                  </a:lnTo>
+                  <a:lnTo>
+                    <a:pt x="1935819" y="1830498"/>
+                  </a:lnTo>
+                  <a:cubicBezTo>
+                    <a:pt x="1958984" y="1710761"/>
+                    <a:pt x="2004150" y="1599500"/>
+                    <a:pt x="2066653" y="1501647"/>
+                  </a:cubicBezTo>
+                  <a:lnTo>
+                    <a:pt x="2127174" y="1424064"/>
+                  </a:lnTo>
+                  <a:lnTo>
+                    <a:pt x="4618764" y="3092092"/>
+                  </a:lnTo>
+                  <a:lnTo>
+                    <a:pt x="4618764" y="3270953"/>
+                  </a:lnTo>
+                  <a:close/>
+                  <a:moveTo>
+                    <a:pt x="5059655" y="3270953"/>
+                  </a:moveTo>
+                  <a:lnTo>
+                    <a:pt x="4702667" y="3270953"/>
+                  </a:lnTo>
+                  <a:lnTo>
+                    <a:pt x="4795488" y="3210402"/>
+                  </a:lnTo>
+                  <a:lnTo>
+                    <a:pt x="4618764" y="3092092"/>
+                  </a:lnTo>
+                  <a:lnTo>
+                    <a:pt x="4618764" y="2015844"/>
+                  </a:lnTo>
+                  <a:cubicBezTo>
+                    <a:pt x="4618764" y="1507923"/>
+                    <a:pt x="4229468" y="1096172"/>
+                    <a:pt x="3749246" y="1096172"/>
+                  </a:cubicBezTo>
+                  <a:lnTo>
+                    <a:pt x="2787672" y="1096172"/>
+                  </a:lnTo>
+                  <a:cubicBezTo>
+                    <a:pt x="2547560" y="1096172"/>
+                    <a:pt x="2330181" y="1199110"/>
+                    <a:pt x="2172829" y="1365537"/>
+                  </a:cubicBezTo>
+                  <a:lnTo>
+                    <a:pt x="2127174" y="1424064"/>
+                  </a:lnTo>
+                  <a:lnTo>
+                    <a:pt x="1748927" y="1170842"/>
+                  </a:lnTo>
+                  <a:lnTo>
+                    <a:pt x="1755645" y="1161340"/>
+                  </a:lnTo>
+                  <a:cubicBezTo>
+                    <a:pt x="1979247" y="874769"/>
+                    <a:pt x="2317638" y="692110"/>
+                    <a:pt x="2696365" y="692110"/>
+                  </a:cubicBezTo>
+                  <a:lnTo>
+                    <a:pt x="3840552" y="692110"/>
+                  </a:lnTo>
+                  <a:cubicBezTo>
+                    <a:pt x="4513844" y="692110"/>
+                    <a:pt x="5059656" y="1269404"/>
+                    <a:pt x="5059656" y="1981532"/>
+                  </a:cubicBezTo>
+                  <a:cubicBezTo>
+                    <a:pt x="5059656" y="2411339"/>
+                    <a:pt x="5059655" y="2841146"/>
+                    <a:pt x="5059655" y="3270953"/>
+                  </a:cubicBezTo>
+                  <a:close/>
+                </a:path>
+              </a:pathLst>
+            </a:custGeom>
+            <a:solidFill>
+              <a:schemeClr val="bg1"/>
+            </a:solidFill>
+            <a:ln>
+              <a:solidFill>
+                <a:schemeClr val="bg1"/>
+              </a:solidFill>
+            </a:ln>
+          </p:spPr>
+          <p:style>
+            <a:lnRef idx="2">
+              <a:schemeClr val="accent1">
+                <a:shade val="15000"/>
+              </a:schemeClr>
+            </a:lnRef>
+            <a:fillRef idx="1">
+              <a:schemeClr val="accent1"/>
+            </a:fillRef>
+            <a:effectRef idx="0">
+              <a:schemeClr val="accent1"/>
+            </a:effectRef>
+            <a:fontRef idx="minor">
+              <a:schemeClr val="lt1"/>
+            </a:fontRef>
+          </p:style>
+          <p:txBody>
+            <a:bodyPr wrap="square" rtlCol="0" anchor="ctr">
+              <a:noAutofit/>
+            </a:bodyPr>
+            <a:lstStyle>
+              <a:defPPr>
+                <a:defRPr lang="en-US"/>
+              </a:defPPr>
+              <a:lvl1pPr marL="0" algn="l" defTabSz="914400" rtl="0" eaLnBrk="1" latinLnBrk="0" hangingPunct="1">
+                <a:defRPr sz="1800" kern="1200">
+                  <a:solidFill>
+                    <a:schemeClr val="lt1"/>
+                  </a:solidFill>
+                  <a:latin typeface="+mn-lt"/>
+                  <a:ea typeface="+mn-ea"/>
+                  <a:cs typeface="+mn-cs"/>
+                </a:defRPr>
+              </a:lvl1pPr>
+              <a:lvl2pPr marL="457200" algn="l" defTabSz="914400" rtl="0" eaLnBrk="1" latinLnBrk="0" hangingPunct="1">
+                <a:defRPr sz="1800" kern="1200">
+                  <a:solidFill>
+                    <a:schemeClr val="lt1"/>
+                  </a:solidFill>
+                  <a:latin typeface="+mn-lt"/>
+                  <a:ea typeface="+mn-ea"/>
+                  <a:cs typeface="+mn-cs"/>
+                </a:defRPr>
+              </a:lvl2pPr>
+              <a:lvl3pPr marL="914400" algn="l" defTabSz="914400" rtl="0" eaLnBrk="1" latinLnBrk="0" hangingPunct="1">
+                <a:defRPr sz="1800" kern="1200">
+                  <a:solidFill>
+                    <a:schemeClr val="lt1"/>
+                  </a:solidFill>
+                  <a:latin typeface="+mn-lt"/>
+                  <a:ea typeface="+mn-ea"/>
+                  <a:cs typeface="+mn-cs"/>
+                </a:defRPr>
+              </a:lvl3pPr>
+              <a:lvl4pPr marL="1371600" algn="l" defTabSz="914400" rtl="0" eaLnBrk="1" latinLnBrk="0" hangingPunct="1">
+                <a:defRPr sz="1800" kern="1200">
+                  <a:solidFill>
+                    <a:schemeClr val="lt1"/>
+                  </a:solidFill>
+                  <a:latin typeface="+mn-lt"/>
+                  <a:ea typeface="+mn-ea"/>
+                  <a:cs typeface="+mn-cs"/>
+                </a:defRPr>
+              </a:lvl4pPr>
+              <a:lvl5pPr marL="1828800" algn="l" defTabSz="914400" rtl="0" eaLnBrk="1" latinLnBrk="0" hangingPunct="1">
+                <a:defRPr sz="1800" kern="1200">
+                  <a:solidFill>
+                    <a:schemeClr val="lt1"/>
+                  </a:solidFill>
+                  <a:latin typeface="+mn-lt"/>
+                  <a:ea typeface="+mn-ea"/>
+                  <a:cs typeface="+mn-cs"/>
+                </a:defRPr>
+              </a:lvl5pPr>
+              <a:lvl6pPr marL="2286000" algn="l" defTabSz="914400" rtl="0" eaLnBrk="1" latinLnBrk="0" hangingPunct="1">
+                <a:defRPr sz="1800" kern="1200">
+                  <a:solidFill>
+                    <a:schemeClr val="lt1"/>
+                  </a:solidFill>
+                  <a:latin typeface="+mn-lt"/>
+                  <a:ea typeface="+mn-ea"/>
+                  <a:cs typeface="+mn-cs"/>
+                </a:defRPr>
+              </a:lvl6pPr>
+              <a:lvl7pPr marL="2743200" algn="l" defTabSz="914400" rtl="0" eaLnBrk="1" latinLnBrk="0" hangingPunct="1">
+                <a:defRPr sz="1800" kern="1200">
+                  <a:solidFill>
+                    <a:schemeClr val="lt1"/>
+                  </a:solidFill>
+                  <a:latin typeface="+mn-lt"/>
+                  <a:ea typeface="+mn-ea"/>
+                  <a:cs typeface="+mn-cs"/>
+                </a:defRPr>
+              </a:lvl7pPr>
+              <a:lvl8pPr marL="3200400" algn="l" defTabSz="914400" rtl="0" eaLnBrk="1" latinLnBrk="0" hangingPunct="1">
+                <a:defRPr sz="1800" kern="1200">
+                  <a:solidFill>
+                    <a:schemeClr val="lt1"/>
+                  </a:solidFill>
+                  <a:latin typeface="+mn-lt"/>
+                  <a:ea typeface="+mn-ea"/>
+                  <a:cs typeface="+mn-cs"/>
+                </a:defRPr>
+              </a:lvl8pPr>
+              <a:lvl9pPr marL="3657600" algn="l" defTabSz="914400" rtl="0" eaLnBrk="1" latinLnBrk="0" hangingPunct="1">
+                <a:defRPr sz="1800" kern="1200">
+                  <a:solidFill>
+                    <a:schemeClr val="lt1"/>
+                  </a:solidFill>
+                  <a:latin typeface="+mn-lt"/>
+                  <a:ea typeface="+mn-ea"/>
+                  <a:cs typeface="+mn-cs"/>
+                </a:defRPr>
+              </a:lvl9pPr>
+            </a:lstStyle>
+            <a:p>
+              <a:pPr algn="ctr"/>
+              <a:endParaRPr lang="en-IN" dirty="0"/>
+            </a:p>
+          </p:txBody>
+        </p:sp>
+      </p:grpSp>
+    </p:spTree>
+    <p:extLst>
+      <p:ext uri="{BB962C8B-B14F-4D97-AF65-F5344CB8AC3E}">
+        <p14:creationId xmlns:p14="http://schemas.microsoft.com/office/powerpoint/2010/main" val="3768966666"/>
       </p:ext>
     </p:extLst>
   </p:cSld>

</xml_diff>